<commit_message>
added two slides with "gotcha" examples
</commit_message>
<xml_diff>
--- a/Codefest Presentation.pptx
+++ b/Codefest Presentation.pptx
@@ -5,7 +5,7 @@
     <p:sldMasterId id="2147483677" r:id="rId1"/>
   </p:sldMasterIdLst>
   <p:notesMasterIdLst>
-    <p:notesMasterId r:id="rId21"/>
+    <p:notesMasterId r:id="rId23"/>
   </p:notesMasterIdLst>
   <p:sldIdLst>
     <p:sldId id="256" r:id="rId2"/>
@@ -15,18 +15,20 @@
     <p:sldId id="260" r:id="rId6"/>
     <p:sldId id="274" r:id="rId7"/>
     <p:sldId id="261" r:id="rId8"/>
-    <p:sldId id="265" r:id="rId9"/>
-    <p:sldId id="262" r:id="rId10"/>
-    <p:sldId id="264" r:id="rId11"/>
-    <p:sldId id="263" r:id="rId12"/>
-    <p:sldId id="266" r:id="rId13"/>
-    <p:sldId id="268" r:id="rId14"/>
-    <p:sldId id="267" r:id="rId15"/>
-    <p:sldId id="269" r:id="rId16"/>
-    <p:sldId id="270" r:id="rId17"/>
-    <p:sldId id="273" r:id="rId18"/>
-    <p:sldId id="271" r:id="rId19"/>
-    <p:sldId id="272" r:id="rId20"/>
+    <p:sldId id="276" r:id="rId9"/>
+    <p:sldId id="275" r:id="rId10"/>
+    <p:sldId id="265" r:id="rId11"/>
+    <p:sldId id="262" r:id="rId12"/>
+    <p:sldId id="264" r:id="rId13"/>
+    <p:sldId id="263" r:id="rId14"/>
+    <p:sldId id="266" r:id="rId15"/>
+    <p:sldId id="268" r:id="rId16"/>
+    <p:sldId id="267" r:id="rId17"/>
+    <p:sldId id="269" r:id="rId18"/>
+    <p:sldId id="270" r:id="rId19"/>
+    <p:sldId id="273" r:id="rId20"/>
+    <p:sldId id="271" r:id="rId21"/>
+    <p:sldId id="272" r:id="rId22"/>
   </p:sldIdLst>
   <p:sldSz cx="12192000" cy="6858000"/>
   <p:notesSz cx="6858000" cy="9144000"/>
@@ -215,7 +217,7 @@
           <a:p>
             <a:fld id="{A13B611B-96AC-4BD5-8EA9-B3805B7EAB0A}" type="datetimeFigureOut">
               <a:rPr lang="en-US" smtClean="0"/>
-              <a:t>3/18/2014</a:t>
+              <a:t>3/25/2014</a:t>
             </a:fld>
             <a:endParaRPr lang="en-US"/>
           </a:p>
@@ -613,25 +615,17 @@
           <a:p>
             <a:r>
               <a:rPr lang="ru-RU" dirty="0" smtClean="0"/>
-              <a:t>Что может</a:t>
+              <a:t>* Использование объекта внутри объекта - объяснить о том что нет join  в RavenDB</a:t>
+            </a:r>
+          </a:p>
+          <a:p>
+            <a:r>
+              <a:rPr lang="ru-RU" dirty="0" smtClean="0"/>
+              <a:t>* объяснить </a:t>
             </a:r>
             <a:r>
               <a:rPr lang="en-US" dirty="0" smtClean="0"/>
-              <a:t> </a:t>
-            </a:r>
-            <a:r>
-              <a:rPr lang="ru-RU" dirty="0" smtClean="0"/>
-              <a:t>Changes API </a:t>
-            </a:r>
-            <a:r>
-              <a:rPr lang="ru-RU" dirty="0" smtClean="0">
-                <a:sym typeface="Wingdings" panose="05000000000000000000" pitchFamily="2" charset="2"/>
-              </a:rPr>
-              <a:t></a:t>
-            </a:r>
-            <a:r>
-              <a:rPr lang="ru-RU" dirty="0" smtClean="0"/>
-              <a:t> объяснение</a:t>
+              <a:t>include</a:t>
             </a:r>
             <a:endParaRPr lang="en-US" dirty="0"/>
           </a:p>
@@ -663,7 +657,7 @@
     </p:spTree>
     <p:extLst>
       <p:ext uri="{BB962C8B-B14F-4D97-AF65-F5344CB8AC3E}">
-        <p14:creationId xmlns:p14="http://schemas.microsoft.com/office/powerpoint/2010/main" val="3741223618"/>
+        <p14:creationId xmlns:p14="http://schemas.microsoft.com/office/powerpoint/2010/main" val="287120232"/>
       </p:ext>
     </p:extLst>
   </p:cSld>
@@ -718,20 +712,19 @@
           <a:lstStyle/>
           <a:p>
             <a:r>
+              <a:rPr lang="en-US" dirty="0" smtClean="0"/>
+              <a:t>RavenDB vs SQL</a:t>
+            </a:r>
+          </a:p>
+          <a:p>
+            <a:pPr marL="0" indent="0">
+              <a:buFontTx/>
+              <a:buNone/>
+            </a:pPr>
+            <a:r>
               <a:rPr lang="ru-RU" dirty="0" smtClean="0"/>
-              <a:t>В RavenDB встроенный кэш</a:t>
-            </a:r>
-          </a:p>
-          <a:p>
-            <a:r>
-              <a:rPr lang="ru-RU" dirty="0" smtClean="0"/>
-              <a:t>- Http cache, если возможно предотвращает нагрузку на сервер</a:t>
-            </a:r>
-            <a:r>
-              <a:rPr lang="en-US" dirty="0" smtClean="0"/>
-              <a:t> (304 not modified)</a:t>
-            </a:r>
-            <a:endParaRPr lang="ru-RU" dirty="0" smtClean="0"/>
+              <a:t>- запрос на SQL сервер возвращает консистентные данные. Для этого требуется много дорогостоящих блокировок (locks)</a:t>
+            </a:r>
           </a:p>
           <a:p>
             <a:pPr marL="171450" indent="-171450">
@@ -740,7 +733,117 @@
             </a:pPr>
             <a:r>
               <a:rPr lang="ru-RU" dirty="0" smtClean="0"/>
-              <a:t>Агрессивный кэш, предотвращает запросы на сервер. Использует Changes API для cache invalidation</a:t>
+              <a:t>запрос на RavenDB возвращает то что имеется в наличии СЕЙЧАС (eventual consistency)</a:t>
+            </a:r>
+            <a:endParaRPr lang="en-US" dirty="0" smtClean="0"/>
+          </a:p>
+          <a:p>
+            <a:pPr marL="171450" indent="-171450">
+              <a:buFontTx/>
+              <a:buChar char="-"/>
+            </a:pPr>
+            <a:r>
+              <a:rPr lang="ru-RU" sz="1200" b="0" i="0" kern="1200" dirty="0" smtClean="0">
+                <a:solidFill>
+                  <a:schemeClr val="tx1"/>
+                </a:solidFill>
+                <a:effectLst/>
+                <a:latin typeface="+mn-lt"/>
+                <a:ea typeface="+mn-ea"/>
+                <a:cs typeface="+mn-cs"/>
+              </a:rPr>
+              <a:t>гарантии согласованности</a:t>
+            </a:r>
+            <a:r>
+              <a:rPr lang="en-US" sz="1200" b="0" i="0" kern="1200" dirty="0" smtClean="0">
+                <a:solidFill>
+                  <a:schemeClr val="tx1"/>
+                </a:solidFill>
+                <a:effectLst/>
+                <a:latin typeface="+mn-lt"/>
+                <a:ea typeface="+mn-ea"/>
+                <a:cs typeface="+mn-cs"/>
+              </a:rPr>
+              <a:t> ACID </a:t>
+            </a:r>
+            <a:r>
+              <a:rPr lang="ru-RU" dirty="0" smtClean="0"/>
+              <a:t>у</a:t>
+            </a:r>
+            <a:r>
+              <a:rPr lang="en-US" dirty="0" smtClean="0"/>
+              <a:t> </a:t>
+            </a:r>
+            <a:r>
+              <a:rPr lang="ru-RU" dirty="0" smtClean="0"/>
+              <a:t>RavenDB</a:t>
+            </a:r>
+          </a:p>
+          <a:p>
+            <a:pPr marL="171450" indent="-171450">
+              <a:buFontTx/>
+              <a:buChar char="-"/>
+            </a:pPr>
+            <a:r>
+              <a:rPr lang="ru-RU" dirty="0" smtClean="0"/>
+              <a:t>Объяснение</a:t>
+            </a:r>
+            <a:r>
+              <a:rPr lang="en-US" dirty="0" smtClean="0"/>
+              <a:t> </a:t>
+            </a:r>
+            <a:r>
+              <a:rPr lang="ru-RU" sz="1200" b="0" i="0" kern="1200" dirty="0" smtClean="0">
+                <a:solidFill>
+                  <a:schemeClr val="tx1"/>
+                </a:solidFill>
+                <a:effectLst/>
+                <a:latin typeface="+mn-lt"/>
+                <a:ea typeface="+mn-ea"/>
+                <a:cs typeface="+mn-cs"/>
+              </a:rPr>
+              <a:t>согласованности которая</a:t>
+            </a:r>
+            <a:r>
+              <a:rPr lang="en-US" sz="1200" b="0" i="0" kern="1200" dirty="0" smtClean="0">
+                <a:solidFill>
+                  <a:schemeClr val="tx1"/>
+                </a:solidFill>
+                <a:effectLst/>
+                <a:latin typeface="+mn-lt"/>
+                <a:ea typeface="+mn-ea"/>
+                <a:cs typeface="+mn-cs"/>
+              </a:rPr>
+              <a:t> </a:t>
+            </a:r>
+            <a:r>
+              <a:rPr lang="ru-RU" sz="1200" b="0" i="0" kern="1200" dirty="0" smtClean="0">
+                <a:solidFill>
+                  <a:schemeClr val="tx1"/>
+                </a:solidFill>
+                <a:effectLst/>
+                <a:latin typeface="+mn-lt"/>
+                <a:ea typeface="+mn-ea"/>
+                <a:cs typeface="+mn-cs"/>
+              </a:rPr>
+              <a:t>достигается со временем </a:t>
+            </a:r>
+            <a:r>
+              <a:rPr lang="en-US" sz="1200" b="0" i="0" kern="1200" dirty="0" smtClean="0">
+                <a:solidFill>
+                  <a:schemeClr val="tx1"/>
+                </a:solidFill>
+                <a:effectLst/>
+                <a:latin typeface="+mn-lt"/>
+                <a:ea typeface="+mn-ea"/>
+                <a:cs typeface="+mn-cs"/>
+                <a:sym typeface="Wingdings" panose="05000000000000000000" pitchFamily="2" charset="2"/>
+              </a:rPr>
+              <a:t> </a:t>
+            </a:r>
+            <a:r>
+              <a:rPr lang="ru-RU" dirty="0" smtClean="0"/>
+              <a:t>eventual consistency - пример банковской системы</a:t>
             </a:r>
             <a:endParaRPr lang="en-US" dirty="0" smtClean="0"/>
           </a:p>
@@ -750,54 +853,40 @@
               <a:buNone/>
             </a:pPr>
             <a:r>
-              <a:rPr lang="ru-RU" dirty="0" smtClean="0"/>
-              <a:t>* почему не использовать всегда агрессивный кэш</a:t>
-            </a:r>
-            <a:r>
-              <a:rPr lang="en-US" dirty="0" smtClean="0"/>
-              <a:t>?</a:t>
+              <a:rPr lang="en-US" baseline="0" dirty="0" smtClean="0"/>
+              <a:t>     * eventual consistency </a:t>
+            </a:r>
+            <a:r>
+              <a:rPr lang="az-Cyrl-AZ" baseline="0" dirty="0" smtClean="0"/>
+              <a:t>позволяет реализовать</a:t>
             </a:r>
             <a:r>
               <a:rPr lang="en-US" baseline="0" dirty="0" smtClean="0"/>
               <a:t> </a:t>
+            </a:r>
+            <a:r>
+              <a:rPr lang="az-Cyrl-AZ" baseline="0" dirty="0" smtClean="0"/>
+              <a:t>оптимизации</a:t>
+            </a:r>
+            <a:r>
+              <a:rPr lang="en-US" baseline="0" dirty="0" smtClean="0"/>
+              <a:t>, </a:t>
+            </a:r>
+            <a:r>
+              <a:rPr lang="az-Cyrl-AZ" baseline="0" dirty="0" smtClean="0"/>
+              <a:t>например </a:t>
+            </a:r>
+            <a:r>
+              <a:rPr lang="en-US" baseline="0" dirty="0" smtClean="0"/>
+              <a:t>low latency/low throughput </a:t>
             </a:r>
             <a:r>
               <a:rPr lang="en-US" baseline="0" dirty="0" smtClean="0">
                 <a:sym typeface="Wingdings" panose="05000000000000000000" pitchFamily="2" charset="2"/>
               </a:rPr>
-              <a:t> racing condition </a:t>
-            </a:r>
-            <a:r>
-              <a:rPr lang="az-Cyrl-AZ" baseline="0" dirty="0" smtClean="0">
-                <a:sym typeface="Wingdings" panose="05000000000000000000" pitchFamily="2" charset="2"/>
-              </a:rPr>
-              <a:t>между </a:t>
-            </a:r>
-            <a:r>
-              <a:rPr lang="en-US" baseline="0" dirty="0" smtClean="0">
-                <a:sym typeface="Wingdings" panose="05000000000000000000" pitchFamily="2" charset="2"/>
-              </a:rPr>
-              <a:t>query </a:t>
-            </a:r>
-            <a:r>
-              <a:rPr lang="az-Cyrl-AZ" baseline="0" dirty="0" smtClean="0">
-                <a:sym typeface="Wingdings" panose="05000000000000000000" pitchFamily="2" charset="2"/>
-              </a:rPr>
-              <a:t>и событием</a:t>
-            </a:r>
-            <a:r>
-              <a:rPr lang="en-US" baseline="0" dirty="0" smtClean="0">
-                <a:sym typeface="Wingdings" panose="05000000000000000000" pitchFamily="2" charset="2"/>
-              </a:rPr>
-              <a:t> Changes API </a:t>
-            </a:r>
-            <a:r>
-              <a:rPr lang="ru-RU" baseline="0" dirty="0" smtClean="0">
-                <a:sym typeface="Wingdings" panose="05000000000000000000" pitchFamily="2" charset="2"/>
-              </a:rPr>
-              <a:t>которое должно сделать invalidate на результат query</a:t>
-            </a:r>
-            <a:endParaRPr lang="en-US" dirty="0"/>
+              <a:t> high latency/high throughput</a:t>
+            </a:r>
+            <a:endParaRPr lang="en-US" dirty="0" smtClean="0"/>
           </a:p>
         </p:txBody>
       </p:sp>
@@ -827,7 +916,7 @@
     </p:spTree>
     <p:extLst>
       <p:ext uri="{BB962C8B-B14F-4D97-AF65-F5344CB8AC3E}">
-        <p14:creationId xmlns:p14="http://schemas.microsoft.com/office/powerpoint/2010/main" val="4085265875"/>
+        <p14:creationId xmlns:p14="http://schemas.microsoft.com/office/powerpoint/2010/main" val="1248110917"/>
       </p:ext>
     </p:extLst>
   </p:cSld>
@@ -883,42 +972,26 @@
           <a:p>
             <a:r>
               <a:rPr lang="ru-RU" dirty="0" smtClean="0"/>
-              <a:t>это совершенно не сложно, а в особенности в RavenDB.</a:t>
-            </a:r>
-            <a:endParaRPr lang="en-US" dirty="0" smtClean="0"/>
-          </a:p>
-          <a:p>
-            <a:pPr marL="0" marR="0" indent="0" algn="l" defTabSz="914400" rtl="0" eaLnBrk="1" fontAlgn="auto" latinLnBrk="0" hangingPunct="1">
-              <a:lnSpc>
-                <a:spcPct val="100000"/>
-              </a:lnSpc>
-              <a:spcBef>
-                <a:spcPts val="0"/>
-              </a:spcBef>
-              <a:spcAft>
-                <a:spcPts val="0"/>
-              </a:spcAft>
-              <a:buClrTx/>
-              <a:buSzTx/>
-              <a:buFontTx/>
-              <a:buNone/>
-              <a:tabLst/>
-              <a:defRPr/>
-            </a:pPr>
+              <a:t>Что может</a:t>
+            </a:r>
             <a:r>
               <a:rPr lang="en-US" dirty="0" smtClean="0"/>
-              <a:t>Map/reduce</a:t>
-            </a:r>
-            <a:r>
-              <a:rPr lang="en-US" baseline="0" dirty="0" smtClean="0"/>
-              <a:t> = </a:t>
+              <a:t> </a:t>
             </a:r>
             <a:r>
               <a:rPr lang="ru-RU" dirty="0" smtClean="0"/>
-              <a:t>group by.</a:t>
-            </a:r>
-          </a:p>
-          <a:p>
+              <a:t>Changes API </a:t>
+            </a:r>
+            <a:r>
+              <a:rPr lang="ru-RU" dirty="0" smtClean="0">
+                <a:sym typeface="Wingdings" panose="05000000000000000000" pitchFamily="2" charset="2"/>
+              </a:rPr>
+              <a:t></a:t>
+            </a:r>
+            <a:r>
+              <a:rPr lang="ru-RU" dirty="0" smtClean="0"/>
+              <a:t> объяснение</a:t>
+            </a:r>
             <a:endParaRPr lang="en-US" dirty="0"/>
           </a:p>
         </p:txBody>
@@ -949,7 +1022,7 @@
     </p:spTree>
     <p:extLst>
       <p:ext uri="{BB962C8B-B14F-4D97-AF65-F5344CB8AC3E}">
-        <p14:creationId xmlns:p14="http://schemas.microsoft.com/office/powerpoint/2010/main" val="4225355292"/>
+        <p14:creationId xmlns:p14="http://schemas.microsoft.com/office/powerpoint/2010/main" val="3741223618"/>
       </p:ext>
     </p:extLst>
   </p:cSld>
@@ -1005,8 +1078,30 @@
           <a:p>
             <a:r>
               <a:rPr lang="ru-RU" dirty="0" smtClean="0"/>
-              <a:t>- даже в простой БД как Northwind, нужно несколько join-ов</a:t>
-            </a:r>
+              <a:t>В RavenDB встроенный кэш</a:t>
+            </a:r>
+          </a:p>
+          <a:p>
+            <a:r>
+              <a:rPr lang="ru-RU" dirty="0" smtClean="0"/>
+              <a:t>- Http cache, если возможно предотвращает нагрузку на сервер</a:t>
+            </a:r>
+            <a:r>
+              <a:rPr lang="en-US" dirty="0" smtClean="0"/>
+              <a:t> (304 not modified)</a:t>
+            </a:r>
+            <a:endParaRPr lang="ru-RU" dirty="0" smtClean="0"/>
+          </a:p>
+          <a:p>
+            <a:pPr marL="171450" indent="-171450">
+              <a:buFontTx/>
+              <a:buChar char="-"/>
+            </a:pPr>
+            <a:r>
+              <a:rPr lang="ru-RU" dirty="0" smtClean="0"/>
+              <a:t>Агрессивный кэш, предотвращает запросы на сервер. Использует Changes API для cache invalidation</a:t>
+            </a:r>
+            <a:endParaRPr lang="en-US" dirty="0" smtClean="0"/>
           </a:p>
           <a:p>
             <a:pPr marL="0" indent="0">
@@ -1014,38 +1109,54 @@
               <a:buNone/>
             </a:pPr>
             <a:r>
+              <a:rPr lang="ru-RU" dirty="0" smtClean="0"/>
+              <a:t>* почему не использовать всегда агрессивный кэш</a:t>
+            </a:r>
+            <a:r>
               <a:rPr lang="en-US" dirty="0" smtClean="0"/>
-              <a:t>- </a:t>
-            </a:r>
-            <a:r>
-              <a:rPr lang="ru-RU" dirty="0" smtClean="0"/>
-              <a:t>каждый query - заново весь процесс</a:t>
-            </a:r>
-            <a:r>
-              <a:rPr lang="en-US" dirty="0" smtClean="0"/>
-              <a:t> (table scan</a:t>
-            </a:r>
-            <a:r>
-              <a:rPr lang="az-Cyrl-AZ" dirty="0" smtClean="0"/>
-              <a:t>/запрос индексов</a:t>
-            </a:r>
-            <a:r>
-              <a:rPr lang="en-US" dirty="0" smtClean="0"/>
-              <a:t>)</a:t>
-            </a:r>
-          </a:p>
-          <a:p>
-            <a:pPr marL="0" indent="0">
-              <a:buFontTx/>
-              <a:buNone/>
-            </a:pPr>
-            <a:endParaRPr lang="en-US" dirty="0" smtClean="0"/>
-          </a:p>
-          <a:p>
-            <a:r>
-              <a:rPr lang="ru-RU" dirty="0" smtClean="0"/>
-              <a:t>а что будет когда есть 50 миллионов заказов?</a:t>
-            </a:r>
+              <a:t>?</a:t>
+            </a:r>
+            <a:r>
+              <a:rPr lang="en-US" baseline="0" dirty="0" smtClean="0"/>
+              <a:t> </a:t>
+            </a:r>
+            <a:r>
+              <a:rPr lang="en-US" baseline="0" dirty="0" smtClean="0">
+                <a:sym typeface="Wingdings" panose="05000000000000000000" pitchFamily="2" charset="2"/>
+              </a:rPr>
+              <a:t> racing condition </a:t>
+            </a:r>
+            <a:r>
+              <a:rPr lang="az-Cyrl-AZ" baseline="0" dirty="0" smtClean="0">
+                <a:sym typeface="Wingdings" panose="05000000000000000000" pitchFamily="2" charset="2"/>
+              </a:rPr>
+              <a:t>между </a:t>
+            </a:r>
+            <a:r>
+              <a:rPr lang="en-US" baseline="0" dirty="0" smtClean="0">
+                <a:sym typeface="Wingdings" panose="05000000000000000000" pitchFamily="2" charset="2"/>
+              </a:rPr>
+              <a:t>query </a:t>
+            </a:r>
+            <a:r>
+              <a:rPr lang="az-Cyrl-AZ" baseline="0" dirty="0" smtClean="0">
+                <a:sym typeface="Wingdings" panose="05000000000000000000" pitchFamily="2" charset="2"/>
+              </a:rPr>
+              <a:t>и событием</a:t>
+            </a:r>
+            <a:r>
+              <a:rPr lang="en-US" baseline="0" dirty="0" smtClean="0">
+                <a:sym typeface="Wingdings" panose="05000000000000000000" pitchFamily="2" charset="2"/>
+              </a:rPr>
+              <a:t> Changes API </a:t>
+            </a:r>
+            <a:r>
+              <a:rPr lang="ru-RU" baseline="0" dirty="0" smtClean="0">
+                <a:sym typeface="Wingdings" panose="05000000000000000000" pitchFamily="2" charset="2"/>
+              </a:rPr>
+              <a:t>которое должно сделать invalidate на результат query</a:t>
+            </a:r>
+            <a:endParaRPr lang="en-US" dirty="0"/>
           </a:p>
         </p:txBody>
       </p:sp>
@@ -1075,7 +1186,7 @@
     </p:spTree>
     <p:extLst>
       <p:ext uri="{BB962C8B-B14F-4D97-AF65-F5344CB8AC3E}">
-        <p14:creationId xmlns:p14="http://schemas.microsoft.com/office/powerpoint/2010/main" val="1426339282"/>
+        <p14:creationId xmlns:p14="http://schemas.microsoft.com/office/powerpoint/2010/main" val="4085265875"/>
       </p:ext>
     </p:extLst>
   </p:cSld>
@@ -1130,54 +1241,9 @@
           <a:lstStyle/>
           <a:p>
             <a:r>
-              <a:rPr lang="az-Cyrl-AZ" dirty="0" smtClean="0"/>
-              <a:t>общее описание процесса индексации</a:t>
-            </a:r>
-            <a:endParaRPr lang="en-US" dirty="0" smtClean="0"/>
-          </a:p>
-          <a:p>
-            <a:pPr marL="171450" indent="-171450">
-              <a:buFont typeface="Arial" panose="020B0604020202020204" pitchFamily="34" charset="0"/>
-              <a:buChar char="•"/>
-            </a:pPr>
-            <a:r>
-              <a:rPr lang="az-Cyrl-AZ" dirty="0" smtClean="0"/>
-              <a:t>после индексации</a:t>
-            </a:r>
-            <a:r>
-              <a:rPr lang="en-US" dirty="0" smtClean="0"/>
-              <a:t>, </a:t>
-            </a:r>
-            <a:r>
-              <a:rPr lang="az-Cyrl-AZ" dirty="0" smtClean="0"/>
-              <a:t>запросы идут на</a:t>
-            </a:r>
-            <a:r>
-              <a:rPr lang="en-US" dirty="0" smtClean="0"/>
-              <a:t> pre-computed data - </a:t>
-            </a:r>
-            <a:r>
-              <a:rPr lang="az-Cyrl-AZ" dirty="0" smtClean="0"/>
-              <a:t>результат индексации</a:t>
-            </a:r>
-            <a:endParaRPr lang="en-US" dirty="0" smtClean="0"/>
-          </a:p>
-          <a:p>
-            <a:pPr marL="171450" indent="-171450">
-              <a:buFont typeface="Arial" panose="020B0604020202020204" pitchFamily="34" charset="0"/>
-              <a:buChar char="•"/>
-            </a:pPr>
-            <a:r>
               <a:rPr lang="ru-RU" dirty="0" smtClean="0"/>
-              <a:t>update не вызывает полную перестройку индекса, а только релевантную часть</a:t>
-            </a:r>
-            <a:endParaRPr lang="en-US" dirty="0" smtClean="0"/>
-          </a:p>
-          <a:p>
-            <a:pPr marL="0" indent="0">
-              <a:buFont typeface="Arial" panose="020B0604020202020204" pitchFamily="34" charset="0"/>
-              <a:buNone/>
-            </a:pPr>
+              <a:t>это совершенно не сложно, а в особенности в RavenDB.</a:t>
+            </a:r>
             <a:endParaRPr lang="en-US" dirty="0" smtClean="0"/>
           </a:p>
           <a:p>
@@ -1193,32 +1259,25 @@
               </a:spcAft>
               <a:buClrTx/>
               <a:buSzTx/>
-              <a:buFont typeface="Arial" panose="020B0604020202020204" pitchFamily="34" charset="0"/>
+              <a:buFontTx/>
               <a:buNone/>
               <a:tabLst/>
               <a:defRPr/>
             </a:pPr>
             <a:r>
-              <a:rPr lang="az-Cyrl-AZ" dirty="0" smtClean="0"/>
-              <a:t>определение индекса </a:t>
-            </a:r>
-            <a:r>
               <a:rPr lang="en-US" dirty="0" smtClean="0"/>
-              <a:t>map/reduce – Total orders by customer</a:t>
-            </a:r>
-          </a:p>
-          <a:p>
-            <a:pPr marL="0" indent="0">
-              <a:buFont typeface="Arial" panose="020B0604020202020204" pitchFamily="34" charset="0"/>
-              <a:buNone/>
-            </a:pPr>
-            <a:endParaRPr lang="en-US" dirty="0" smtClean="0"/>
-          </a:p>
-          <a:p>
-            <a:pPr marL="171450" indent="-171450">
-              <a:buFont typeface="Arial" panose="020B0604020202020204" pitchFamily="34" charset="0"/>
-              <a:buChar char="•"/>
-            </a:pPr>
+              <a:t>Map/reduce</a:t>
+            </a:r>
+            <a:r>
+              <a:rPr lang="en-US" baseline="0" dirty="0" smtClean="0"/>
+              <a:t> = </a:t>
+            </a:r>
+            <a:r>
+              <a:rPr lang="ru-RU" dirty="0" smtClean="0"/>
+              <a:t>group by.</a:t>
+            </a:r>
+          </a:p>
+          <a:p>
             <a:endParaRPr lang="en-US" dirty="0"/>
           </a:p>
         </p:txBody>
@@ -1249,7 +1308,7 @@
     </p:spTree>
     <p:extLst>
       <p:ext uri="{BB962C8B-B14F-4D97-AF65-F5344CB8AC3E}">
-        <p14:creationId xmlns:p14="http://schemas.microsoft.com/office/powerpoint/2010/main" val="1353083163"/>
+        <p14:creationId xmlns:p14="http://schemas.microsoft.com/office/powerpoint/2010/main" val="4225355292"/>
       </p:ext>
     </p:extLst>
   </p:cSld>
@@ -1305,29 +1364,47 @@
           <a:p>
             <a:r>
               <a:rPr lang="ru-RU" dirty="0" smtClean="0"/>
-              <a:t>этот запрос гораздо дешевле</a:t>
-            </a:r>
+              <a:t>- даже в простой БД как Northwind, нужно несколько join-ов</a:t>
+            </a:r>
+          </a:p>
+          <a:p>
+            <a:pPr marL="0" indent="0">
+              <a:buFontTx/>
+              <a:buNone/>
+            </a:pPr>
             <a:r>
               <a:rPr lang="en-US" dirty="0" smtClean="0"/>
-              <a:t> </a:t>
+              <a:t>- </a:t>
+            </a:r>
+            <a:r>
+              <a:rPr lang="ru-RU" dirty="0" smtClean="0"/>
+              <a:t>каждый query - заново весь процесс</a:t>
+            </a:r>
+            <a:r>
+              <a:rPr lang="en-US" dirty="0" smtClean="0"/>
+              <a:t> (table scan</a:t>
             </a:r>
             <a:r>
               <a:rPr lang="az-Cyrl-AZ" dirty="0" smtClean="0"/>
-              <a:t>чем в </a:t>
+              <a:t>/запрос индексов</a:t>
             </a:r>
             <a:r>
               <a:rPr lang="en-US" dirty="0" smtClean="0"/>
-              <a:t>SQL</a:t>
-            </a:r>
+              <a:t>)</a:t>
+            </a:r>
+          </a:p>
+          <a:p>
+            <a:pPr marL="0" indent="0">
+              <a:buFontTx/>
+              <a:buNone/>
+            </a:pPr>
+            <a:endParaRPr lang="en-US" dirty="0" smtClean="0"/>
+          </a:p>
+          <a:p>
             <a:r>
               <a:rPr lang="ru-RU" dirty="0" smtClean="0"/>
-              <a:t>, вне зависимости от количества данных.</a:t>
-            </a:r>
-            <a:r>
-              <a:rPr lang="en-US" baseline="0" dirty="0" smtClean="0"/>
-              <a:t> (query on pre-computed data)</a:t>
-            </a:r>
-            <a:endParaRPr lang="ru-RU" dirty="0" smtClean="0"/>
+              <a:t>а что будет когда есть 50 миллионов заказов?</a:t>
+            </a:r>
           </a:p>
         </p:txBody>
       </p:sp>
@@ -1357,7 +1434,7 @@
     </p:spTree>
     <p:extLst>
       <p:ext uri="{BB962C8B-B14F-4D97-AF65-F5344CB8AC3E}">
-        <p14:creationId xmlns:p14="http://schemas.microsoft.com/office/powerpoint/2010/main" val="1027095808"/>
+        <p14:creationId xmlns:p14="http://schemas.microsoft.com/office/powerpoint/2010/main" val="1426339282"/>
       </p:ext>
     </p:extLst>
   </p:cSld>
@@ -1412,27 +1489,95 @@
           <a:lstStyle/>
           <a:p>
             <a:r>
+              <a:rPr lang="az-Cyrl-AZ" dirty="0" smtClean="0"/>
+              <a:t>общее описание процесса индексации</a:t>
+            </a:r>
+            <a:endParaRPr lang="en-US" dirty="0" smtClean="0"/>
+          </a:p>
+          <a:p>
+            <a:pPr marL="171450" indent="-171450">
+              <a:buFont typeface="Arial" panose="020B0604020202020204" pitchFamily="34" charset="0"/>
+              <a:buChar char="•"/>
+            </a:pPr>
+            <a:r>
+              <a:rPr lang="az-Cyrl-AZ" dirty="0" smtClean="0"/>
+              <a:t>после индексации</a:t>
+            </a:r>
+            <a:r>
+              <a:rPr lang="en-US" dirty="0" smtClean="0"/>
+              <a:t>, </a:t>
+            </a:r>
+            <a:r>
+              <a:rPr lang="az-Cyrl-AZ" dirty="0" smtClean="0"/>
+              <a:t>запросы идут на</a:t>
+            </a:r>
+            <a:r>
+              <a:rPr lang="en-US" dirty="0" smtClean="0"/>
+              <a:t> pre-computed data - </a:t>
+            </a:r>
+            <a:r>
+              <a:rPr lang="az-Cyrl-AZ" dirty="0" smtClean="0"/>
+              <a:t>результат индексации</a:t>
+            </a:r>
+            <a:endParaRPr lang="en-US" dirty="0" smtClean="0"/>
+          </a:p>
+          <a:p>
+            <a:pPr marL="171450" indent="-171450">
+              <a:buFont typeface="Arial" panose="020B0604020202020204" pitchFamily="34" charset="0"/>
+              <a:buChar char="•"/>
+            </a:pPr>
+            <a:r>
               <a:rPr lang="ru-RU" dirty="0" smtClean="0"/>
-              <a:t>High Availability это когда происходит чтото плохое. Например шашлык из серверов.</a:t>
-            </a:r>
-          </a:p>
-          <a:p>
-            <a:endParaRPr lang="ru-RU" dirty="0" smtClean="0"/>
-          </a:p>
-          <a:p>
-            <a:r>
-              <a:rPr lang="ru-RU" dirty="0" smtClean="0"/>
-              <a:t>Replication  в RavenDB легко и быстро конфигурируется, поддерживает автоматический Failover.</a:t>
-            </a:r>
-          </a:p>
-          <a:p>
-            <a:endParaRPr lang="ru-RU" dirty="0" smtClean="0"/>
-          </a:p>
-          <a:p>
-            <a:r>
-              <a:rPr lang="ru-RU" dirty="0" smtClean="0"/>
-              <a:t>нет нужды в конфигурации клиентской стороны RavenDB - автоматичски конфигурируется топология репликации и failover</a:t>
-            </a:r>
+              <a:t>update не вызывает полную перестройку индекса, а только релевантную часть</a:t>
+            </a:r>
+            <a:endParaRPr lang="en-US" dirty="0" smtClean="0"/>
+          </a:p>
+          <a:p>
+            <a:pPr marL="0" indent="0">
+              <a:buFont typeface="Arial" panose="020B0604020202020204" pitchFamily="34" charset="0"/>
+              <a:buNone/>
+            </a:pPr>
+            <a:endParaRPr lang="en-US" dirty="0" smtClean="0"/>
+          </a:p>
+          <a:p>
+            <a:pPr marL="0" marR="0" indent="0" algn="l" defTabSz="914400" rtl="0" eaLnBrk="1" fontAlgn="auto" latinLnBrk="0" hangingPunct="1">
+              <a:lnSpc>
+                <a:spcPct val="100000"/>
+              </a:lnSpc>
+              <a:spcBef>
+                <a:spcPts val="0"/>
+              </a:spcBef>
+              <a:spcAft>
+                <a:spcPts val="0"/>
+              </a:spcAft>
+              <a:buClrTx/>
+              <a:buSzTx/>
+              <a:buFont typeface="Arial" panose="020B0604020202020204" pitchFamily="34" charset="0"/>
+              <a:buNone/>
+              <a:tabLst/>
+              <a:defRPr/>
+            </a:pPr>
+            <a:r>
+              <a:rPr lang="az-Cyrl-AZ" dirty="0" smtClean="0"/>
+              <a:t>определение индекса </a:t>
+            </a:r>
+            <a:r>
+              <a:rPr lang="en-US" dirty="0" smtClean="0"/>
+              <a:t>map/reduce – Total orders by customer</a:t>
+            </a:r>
+          </a:p>
+          <a:p>
+            <a:pPr marL="0" indent="0">
+              <a:buFont typeface="Arial" panose="020B0604020202020204" pitchFamily="34" charset="0"/>
+              <a:buNone/>
+            </a:pPr>
+            <a:endParaRPr lang="en-US" dirty="0" smtClean="0"/>
+          </a:p>
+          <a:p>
+            <a:pPr marL="171450" indent="-171450">
+              <a:buFont typeface="Arial" panose="020B0604020202020204" pitchFamily="34" charset="0"/>
+              <a:buChar char="•"/>
+            </a:pPr>
             <a:endParaRPr lang="en-US" dirty="0"/>
           </a:p>
         </p:txBody>
@@ -1463,7 +1608,7 @@
     </p:spTree>
     <p:extLst>
       <p:ext uri="{BB962C8B-B14F-4D97-AF65-F5344CB8AC3E}">
-        <p14:creationId xmlns:p14="http://schemas.microsoft.com/office/powerpoint/2010/main" val="1721286429"/>
+        <p14:creationId xmlns:p14="http://schemas.microsoft.com/office/powerpoint/2010/main" val="1353083163"/>
       </p:ext>
     </p:extLst>
   </p:cSld>
@@ -1518,14 +1663,30 @@
           <a:lstStyle/>
           <a:p>
             <a:r>
+              <a:rPr lang="ru-RU" dirty="0" smtClean="0"/>
+              <a:t>этот запрос гораздо дешевле</a:t>
+            </a:r>
+            <a:r>
+              <a:rPr lang="en-US" dirty="0" smtClean="0"/>
+              <a:t> </a:t>
+            </a:r>
+            <a:r>
               <a:rPr lang="az-Cyrl-AZ" dirty="0" smtClean="0"/>
-              <a:t>вот как конфигурируется </a:t>
+              <a:t>чем в </a:t>
             </a:r>
             <a:r>
               <a:rPr lang="en-US" dirty="0" smtClean="0"/>
-              <a:t>replication/failover</a:t>
-            </a:r>
-            <a:endParaRPr lang="he-IL" dirty="0"/>
+              <a:t>SQL</a:t>
+            </a:r>
+            <a:r>
+              <a:rPr lang="ru-RU" dirty="0" smtClean="0"/>
+              <a:t>, вне зависимости от количества данных.</a:t>
+            </a:r>
+            <a:r>
+              <a:rPr lang="en-US" baseline="0" dirty="0" smtClean="0"/>
+              <a:t> (query on pre-computed data)</a:t>
+            </a:r>
+            <a:endParaRPr lang="ru-RU" dirty="0" smtClean="0"/>
           </a:p>
         </p:txBody>
       </p:sp>
@@ -1555,7 +1716,7 @@
     </p:spTree>
     <p:extLst>
       <p:ext uri="{BB962C8B-B14F-4D97-AF65-F5344CB8AC3E}">
-        <p14:creationId xmlns:p14="http://schemas.microsoft.com/office/powerpoint/2010/main" val="408791721"/>
+        <p14:creationId xmlns:p14="http://schemas.microsoft.com/office/powerpoint/2010/main" val="1027095808"/>
       </p:ext>
     </p:extLst>
   </p:cSld>
@@ -1609,212 +1770,29 @@
           <a:bodyPr/>
           <a:lstStyle/>
           <a:p>
-            <a:pPr marL="171450" indent="-171450">
-              <a:buFont typeface="Arial" panose="020B0604020202020204" pitchFamily="34" charset="0"/>
-              <a:buChar char="•"/>
-            </a:pPr>
-            <a:r>
-              <a:rPr lang="az-Cyrl-AZ" dirty="0" smtClean="0"/>
-              <a:t>Новый движок</a:t>
-            </a:r>
-            <a:r>
-              <a:rPr lang="en-US" dirty="0" smtClean="0"/>
-              <a:t>  RavenDB - low level</a:t>
-            </a:r>
-            <a:r>
-              <a:rPr lang="en-US" baseline="0" dirty="0" smtClean="0"/>
-              <a:t> k</a:t>
-            </a:r>
-            <a:r>
-              <a:rPr lang="en-US" dirty="0" smtClean="0"/>
-              <a:t>ey/value store.</a:t>
-            </a:r>
-          </a:p>
-          <a:p>
-            <a:pPr marL="628650" lvl="1" indent="-171450">
-              <a:buFont typeface="Arial" panose="020B0604020202020204" pitchFamily="34" charset="0"/>
-              <a:buChar char="•"/>
-            </a:pPr>
             <a:r>
               <a:rPr lang="ru-RU" dirty="0" smtClean="0"/>
-              <a:t>поддержка ACID</a:t>
-            </a:r>
-          </a:p>
-          <a:p>
-            <a:pPr marL="628650" lvl="1" indent="-171450">
-              <a:buFont typeface="Arial" panose="020B0604020202020204" pitchFamily="34" charset="0"/>
-              <a:buChar char="•"/>
-            </a:pPr>
+              <a:t>High Availability это когда происходит чтото плохое. Например шашлык из серверов.</a:t>
+            </a:r>
+          </a:p>
+          <a:p>
+            <a:endParaRPr lang="ru-RU" dirty="0" smtClean="0"/>
+          </a:p>
+          <a:p>
             <a:r>
               <a:rPr lang="ru-RU" dirty="0" smtClean="0"/>
-              <a:t>высокая производительность</a:t>
-            </a:r>
-          </a:p>
-          <a:p>
-            <a:pPr marL="628650" lvl="1" indent="-171450">
-              <a:buFont typeface="Arial" panose="020B0604020202020204" pitchFamily="34" charset="0"/>
-              <a:buChar char="•"/>
-            </a:pPr>
+              <a:t>Replication  в RavenDB легко и быстро конфигурируется, поддерживает автоматический Failover.</a:t>
+            </a:r>
+          </a:p>
+          <a:p>
+            <a:endParaRPr lang="ru-RU" dirty="0" smtClean="0"/>
+          </a:p>
+          <a:p>
             <a:r>
               <a:rPr lang="ru-RU" dirty="0" smtClean="0"/>
-              <a:t>способность производить около</a:t>
-            </a:r>
-            <a:r>
-              <a:rPr lang="en-US" dirty="0" smtClean="0"/>
-              <a:t> </a:t>
-            </a:r>
-            <a:r>
-              <a:rPr lang="ru-RU" dirty="0" smtClean="0"/>
-              <a:t>миллиона writes/sec</a:t>
-            </a:r>
-          </a:p>
-          <a:p>
-            <a:pPr marL="628650" lvl="1" indent="-171450">
-              <a:buFont typeface="Arial" panose="020B0604020202020204" pitchFamily="34" charset="0"/>
-              <a:buChar char="•"/>
-            </a:pPr>
-            <a:r>
-              <a:rPr lang="ru-RU" dirty="0" smtClean="0"/>
-              <a:t>сособность производить около</a:t>
-            </a:r>
-            <a:r>
-              <a:rPr lang="en-US" dirty="0" smtClean="0"/>
-              <a:t> </a:t>
-            </a:r>
-            <a:r>
-              <a:rPr lang="ru-RU" dirty="0" smtClean="0"/>
-              <a:t>16 миллионов reads/sec</a:t>
-            </a:r>
-            <a:endParaRPr lang="en-US" dirty="0" smtClean="0"/>
-          </a:p>
-          <a:p>
-            <a:pPr marL="171450" indent="-171450">
-              <a:buFont typeface="Arial" panose="020B0604020202020204" pitchFamily="34" charset="0"/>
-              <a:buChar char="•"/>
-            </a:pPr>
-            <a:r>
-              <a:rPr lang="en-US" dirty="0" smtClean="0"/>
-              <a:t> </a:t>
-            </a:r>
-            <a:r>
-              <a:rPr lang="ru-RU" dirty="0" smtClean="0"/>
-              <a:t>Архитектура REST работает через интерфейсы OWIN</a:t>
-            </a:r>
-            <a:endParaRPr lang="en-US" dirty="0" smtClean="0"/>
-          </a:p>
-          <a:p>
-            <a:pPr marL="171450" indent="-171450">
-              <a:buFont typeface="Arial" panose="020B0604020202020204" pitchFamily="34" charset="0"/>
-              <a:buChar char="•"/>
-            </a:pPr>
-            <a:r>
-              <a:rPr lang="en-US" baseline="0" dirty="0" smtClean="0"/>
-              <a:t>HTML5 </a:t>
-            </a:r>
-            <a:r>
-              <a:rPr lang="en-US" baseline="0" dirty="0" err="1" smtClean="0"/>
-              <a:t>Manement</a:t>
-            </a:r>
-            <a:r>
-              <a:rPr lang="en-US" baseline="0" dirty="0" smtClean="0"/>
-              <a:t> Studio</a:t>
-            </a:r>
-          </a:p>
-          <a:p>
-            <a:pPr marL="171450" indent="-171450">
-              <a:buFont typeface="Arial" panose="020B0604020202020204" pitchFamily="34" charset="0"/>
-              <a:buChar char="•"/>
-            </a:pPr>
-            <a:r>
-              <a:rPr lang="en-US" baseline="0" dirty="0" err="1" smtClean="0"/>
-              <a:t>RavenFS</a:t>
-            </a:r>
-            <a:r>
-              <a:rPr lang="en-US" baseline="0" dirty="0" smtClean="0"/>
-              <a:t> </a:t>
-            </a:r>
-            <a:r>
-              <a:rPr lang="en-US" baseline="0" dirty="0" smtClean="0"/>
-              <a:t>- </a:t>
-            </a:r>
-            <a:r>
-              <a:rPr lang="ru-RU" baseline="0" dirty="0" smtClean="0"/>
-              <a:t> распределенная файловая система</a:t>
-            </a:r>
-            <a:endParaRPr lang="en-US" baseline="0" dirty="0" smtClean="0">
-              <a:sym typeface="Wingdings" panose="05000000000000000000" pitchFamily="2" charset="2"/>
-            </a:endParaRPr>
-          </a:p>
-          <a:p>
-            <a:pPr marL="628650" lvl="1" indent="-171450">
-              <a:buFont typeface="Arial" panose="020B0604020202020204" pitchFamily="34" charset="0"/>
-              <a:buChar char="•"/>
-            </a:pPr>
-            <a:r>
-              <a:rPr lang="ru-RU" baseline="0" dirty="0" smtClean="0"/>
-              <a:t>способен справлятся с очень большими </a:t>
-            </a:r>
-            <a:r>
-              <a:rPr lang="ru-RU" baseline="0" dirty="0" smtClean="0"/>
-              <a:t>файлами</a:t>
-            </a:r>
-            <a:endParaRPr lang="en-US" baseline="0" dirty="0" smtClean="0"/>
-          </a:p>
-          <a:p>
-            <a:pPr marL="628650" lvl="1" indent="-171450">
-              <a:buFont typeface="Arial" panose="020B0604020202020204" pitchFamily="34" charset="0"/>
-              <a:buChar char="•"/>
-            </a:pPr>
-            <a:r>
-              <a:rPr lang="ru-RU" baseline="0" dirty="0" smtClean="0"/>
-              <a:t>передает измененая только тех </a:t>
-            </a:r>
-            <a:r>
-              <a:rPr lang="ru-RU" baseline="0" dirty="0" smtClean="0"/>
-              <a:t>частей</a:t>
-            </a:r>
-            <a:r>
-              <a:rPr lang="en-US" baseline="0" dirty="0" smtClean="0"/>
-              <a:t> </a:t>
-            </a:r>
-            <a:r>
-              <a:rPr lang="ru-RU" baseline="0" dirty="0" smtClean="0"/>
-              <a:t>файлов</a:t>
-            </a:r>
-            <a:r>
-              <a:rPr lang="en-US" baseline="0" dirty="0" smtClean="0"/>
-              <a:t> </a:t>
-            </a:r>
-            <a:r>
-              <a:rPr lang="ru-RU" baseline="0" dirty="0" smtClean="0"/>
-              <a:t>которые </a:t>
-            </a:r>
-            <a:r>
-              <a:rPr lang="ru-RU" baseline="0" dirty="0" smtClean="0"/>
-              <a:t>действительно изменились</a:t>
-            </a:r>
-            <a:endParaRPr lang="en-US" baseline="0" dirty="0" smtClean="0"/>
-          </a:p>
-          <a:p>
-            <a:pPr marL="628650" lvl="1" indent="-171450">
-              <a:buFont typeface="Arial" panose="020B0604020202020204" pitchFamily="34" charset="0"/>
-              <a:buChar char="•"/>
-            </a:pPr>
-            <a:endParaRPr lang="en-US" baseline="0" dirty="0" smtClean="0"/>
-          </a:p>
-          <a:p>
-            <a:pPr marL="171450" indent="-171450">
-              <a:buFont typeface="Arial" panose="020B0604020202020204" pitchFamily="34" charset="0"/>
-              <a:buChar char="•"/>
-            </a:pPr>
-            <a:endParaRPr lang="en-US" dirty="0" smtClean="0"/>
-          </a:p>
-          <a:p>
-            <a:pPr marL="171450" indent="-171450">
-              <a:buFont typeface="Arial" panose="020B0604020202020204" pitchFamily="34" charset="0"/>
-              <a:buChar char="•"/>
-            </a:pPr>
-            <a:endParaRPr lang="ru-RU" dirty="0" smtClean="0"/>
+              <a:t>нет нужды в конфигурации клиентской стороны RavenDB - автоматичски конфигурируется топология репликации и failover</a:t>
+            </a:r>
+            <a:endParaRPr lang="en-US" dirty="0"/>
           </a:p>
         </p:txBody>
       </p:sp>
@@ -1844,7 +1822,99 @@
     </p:spTree>
     <p:extLst>
       <p:ext uri="{BB962C8B-B14F-4D97-AF65-F5344CB8AC3E}">
-        <p14:creationId xmlns:p14="http://schemas.microsoft.com/office/powerpoint/2010/main" val="1667014677"/>
+        <p14:creationId xmlns:p14="http://schemas.microsoft.com/office/powerpoint/2010/main" val="1721286429"/>
+      </p:ext>
+    </p:extLst>
+  </p:cSld>
+  <p:clrMapOvr>
+    <a:masterClrMapping/>
+  </p:clrMapOvr>
+</p:notes>
+</file>
+
+<file path=ppt/notesSlides/notesSlide19.xml><?xml version="1.0" encoding="utf-8"?>
+<p:notes xmlns:a="http://schemas.openxmlformats.org/drawingml/2006/main" xmlns:r="http://schemas.openxmlformats.org/officeDocument/2006/relationships" xmlns:p="http://schemas.openxmlformats.org/presentationml/2006/main">
+  <p:cSld>
+    <p:spTree>
+      <p:nvGrpSpPr>
+        <p:cNvPr id="1" name=""/>
+        <p:cNvGrpSpPr/>
+        <p:nvPr/>
+      </p:nvGrpSpPr>
+      <p:grpSpPr>
+        <a:xfrm>
+          <a:off x="0" y="0"/>
+          <a:ext cx="0" cy="0"/>
+          <a:chOff x="0" y="0"/>
+          <a:chExt cx="0" cy="0"/>
+        </a:xfrm>
+      </p:grpSpPr>
+      <p:sp>
+        <p:nvSpPr>
+          <p:cNvPr id="2" name="Slide Image Placeholder 1"/>
+          <p:cNvSpPr>
+            <a:spLocks noGrp="1" noRot="1" noChangeAspect="1"/>
+          </p:cNvSpPr>
+          <p:nvPr>
+            <p:ph type="sldImg"/>
+          </p:nvPr>
+        </p:nvSpPr>
+        <p:spPr/>
+      </p:sp>
+      <p:sp>
+        <p:nvSpPr>
+          <p:cNvPr id="3" name="Notes Placeholder 2"/>
+          <p:cNvSpPr>
+            <a:spLocks noGrp="1"/>
+          </p:cNvSpPr>
+          <p:nvPr>
+            <p:ph type="body" idx="1"/>
+          </p:nvPr>
+        </p:nvSpPr>
+        <p:spPr/>
+        <p:txBody>
+          <a:bodyPr/>
+          <a:lstStyle/>
+          <a:p>
+            <a:r>
+              <a:rPr lang="az-Cyrl-AZ" dirty="0" smtClean="0"/>
+              <a:t>вот как конфигурируется </a:t>
+            </a:r>
+            <a:r>
+              <a:rPr lang="en-US" dirty="0" smtClean="0"/>
+              <a:t>replication/failover</a:t>
+            </a:r>
+            <a:endParaRPr lang="he-IL" dirty="0"/>
+          </a:p>
+        </p:txBody>
+      </p:sp>
+      <p:sp>
+        <p:nvSpPr>
+          <p:cNvPr id="4" name="Slide Number Placeholder 3"/>
+          <p:cNvSpPr>
+            <a:spLocks noGrp="1"/>
+          </p:cNvSpPr>
+          <p:nvPr>
+            <p:ph type="sldNum" sz="quarter" idx="10"/>
+          </p:nvPr>
+        </p:nvSpPr>
+        <p:spPr/>
+        <p:txBody>
+          <a:bodyPr/>
+          <a:lstStyle/>
+          <a:p>
+            <a:fld id="{B1DCD5A6-B3C0-4DBA-9305-6D43665D2DE2}" type="slidenum">
+              <a:rPr lang="en-US" smtClean="0"/>
+              <a:t>19</a:t>
+            </a:fld>
+            <a:endParaRPr lang="en-US"/>
+          </a:p>
+        </p:txBody>
+      </p:sp>
+    </p:spTree>
+    <p:extLst>
+      <p:ext uri="{BB962C8B-B14F-4D97-AF65-F5344CB8AC3E}">
+        <p14:creationId xmlns:p14="http://schemas.microsoft.com/office/powerpoint/2010/main" val="408791721"/>
       </p:ext>
     </p:extLst>
   </p:cSld>
@@ -1900,11 +1970,7 @@
           <a:p>
             <a:r>
               <a:rPr lang="en-US" dirty="0" smtClean="0"/>
-              <a:t>RavenDB - NoSQL Document </a:t>
-            </a:r>
-            <a:r>
-              <a:rPr lang="en-US" dirty="0" smtClean="0"/>
-              <a:t>Database</a:t>
+              <a:t>RavenDB - NoSQL Document Database</a:t>
             </a:r>
           </a:p>
           <a:p>
@@ -1953,11 +2019,7 @@
             </a:pPr>
             <a:r>
               <a:rPr lang="az-Cyrl-AZ" baseline="0" dirty="0" smtClean="0"/>
-              <a:t>драйверы </a:t>
-            </a:r>
-            <a:r>
-              <a:rPr lang="az-Cyrl-AZ" baseline="0" dirty="0" smtClean="0"/>
-              <a:t>для</a:t>
+              <a:t>драйверы для</a:t>
             </a:r>
             <a:r>
               <a:rPr lang="en-US" baseline="0" dirty="0" smtClean="0"/>
@@ -1975,11 +2037,7 @@
             </a:r>
             <a:r>
               <a:rPr lang="en-US" baseline="0" dirty="0" smtClean="0"/>
-              <a:t> </a:t>
-            </a:r>
-            <a:r>
-              <a:rPr lang="en-US" baseline="0" dirty="0" smtClean="0"/>
-              <a:t>REST -&gt; </a:t>
+              <a:t> REST -&gt; </a:t>
             </a:r>
             <a:r>
               <a:rPr lang="ru-RU" baseline="0" dirty="0" smtClean="0"/>
@@ -2016,6 +2074,279 @@
     <p:extLst>
       <p:ext uri="{BB962C8B-B14F-4D97-AF65-F5344CB8AC3E}">
         <p14:creationId xmlns:p14="http://schemas.microsoft.com/office/powerpoint/2010/main" val="640518296"/>
+      </p:ext>
+    </p:extLst>
+  </p:cSld>
+  <p:clrMapOvr>
+    <a:masterClrMapping/>
+  </p:clrMapOvr>
+</p:notes>
+</file>
+
+<file path=ppt/notesSlides/notesSlide20.xml><?xml version="1.0" encoding="utf-8"?>
+<p:notes xmlns:a="http://schemas.openxmlformats.org/drawingml/2006/main" xmlns:r="http://schemas.openxmlformats.org/officeDocument/2006/relationships" xmlns:p="http://schemas.openxmlformats.org/presentationml/2006/main">
+  <p:cSld>
+    <p:spTree>
+      <p:nvGrpSpPr>
+        <p:cNvPr id="1" name=""/>
+        <p:cNvGrpSpPr/>
+        <p:nvPr/>
+      </p:nvGrpSpPr>
+      <p:grpSpPr>
+        <a:xfrm>
+          <a:off x="0" y="0"/>
+          <a:ext cx="0" cy="0"/>
+          <a:chOff x="0" y="0"/>
+          <a:chExt cx="0" cy="0"/>
+        </a:xfrm>
+      </p:grpSpPr>
+      <p:sp>
+        <p:nvSpPr>
+          <p:cNvPr id="2" name="Slide Image Placeholder 1"/>
+          <p:cNvSpPr>
+            <a:spLocks noGrp="1" noRot="1" noChangeAspect="1"/>
+          </p:cNvSpPr>
+          <p:nvPr>
+            <p:ph type="sldImg"/>
+          </p:nvPr>
+        </p:nvSpPr>
+        <p:spPr/>
+      </p:sp>
+      <p:sp>
+        <p:nvSpPr>
+          <p:cNvPr id="3" name="Notes Placeholder 2"/>
+          <p:cNvSpPr>
+            <a:spLocks noGrp="1"/>
+          </p:cNvSpPr>
+          <p:nvPr>
+            <p:ph type="body" idx="1"/>
+          </p:nvPr>
+        </p:nvSpPr>
+        <p:spPr/>
+        <p:txBody>
+          <a:bodyPr/>
+          <a:lstStyle/>
+          <a:p>
+            <a:pPr marL="171450" indent="-171450">
+              <a:buFont typeface="Arial" panose="020B0604020202020204" pitchFamily="34" charset="0"/>
+              <a:buChar char="•"/>
+            </a:pPr>
+            <a:r>
+              <a:rPr lang="az-Cyrl-AZ" dirty="0" smtClean="0"/>
+              <a:t>Новый движок</a:t>
+            </a:r>
+            <a:r>
+              <a:rPr lang="en-US" dirty="0" smtClean="0"/>
+              <a:t>  RavenDB - low level</a:t>
+            </a:r>
+            <a:r>
+              <a:rPr lang="en-US" baseline="0" dirty="0" smtClean="0"/>
+              <a:t> k</a:t>
+            </a:r>
+            <a:r>
+              <a:rPr lang="en-US" dirty="0" smtClean="0"/>
+              <a:t>ey/value store.</a:t>
+            </a:r>
+          </a:p>
+          <a:p>
+            <a:pPr marL="628650" lvl="1" indent="-171450">
+              <a:buFont typeface="Arial" panose="020B0604020202020204" pitchFamily="34" charset="0"/>
+              <a:buChar char="•"/>
+            </a:pPr>
+            <a:r>
+              <a:rPr lang="ru-RU" dirty="0" smtClean="0"/>
+              <a:t>поддержка ACID</a:t>
+            </a:r>
+          </a:p>
+          <a:p>
+            <a:pPr marL="628650" lvl="1" indent="-171450">
+              <a:buFont typeface="Arial" panose="020B0604020202020204" pitchFamily="34" charset="0"/>
+              <a:buChar char="•"/>
+            </a:pPr>
+            <a:r>
+              <a:rPr lang="ru-RU" dirty="0" smtClean="0"/>
+              <a:t>высокая производительность</a:t>
+            </a:r>
+          </a:p>
+          <a:p>
+            <a:pPr marL="628650" lvl="1" indent="-171450">
+              <a:buFont typeface="Arial" panose="020B0604020202020204" pitchFamily="34" charset="0"/>
+              <a:buChar char="•"/>
+            </a:pPr>
+            <a:r>
+              <a:rPr lang="ru-RU" dirty="0" smtClean="0"/>
+              <a:t>способность производить около</a:t>
+            </a:r>
+            <a:r>
+              <a:rPr lang="en-US" dirty="0" smtClean="0"/>
+              <a:t> </a:t>
+            </a:r>
+            <a:r>
+              <a:rPr lang="ru-RU" dirty="0" smtClean="0"/>
+              <a:t>миллиона writes/sec</a:t>
+            </a:r>
+          </a:p>
+          <a:p>
+            <a:pPr marL="628650" lvl="1" indent="-171450">
+              <a:buFont typeface="Arial" panose="020B0604020202020204" pitchFamily="34" charset="0"/>
+              <a:buChar char="•"/>
+            </a:pPr>
+            <a:r>
+              <a:rPr lang="ru-RU" dirty="0" smtClean="0"/>
+              <a:t>сособность производить около</a:t>
+            </a:r>
+            <a:r>
+              <a:rPr lang="en-US" dirty="0" smtClean="0"/>
+              <a:t> </a:t>
+            </a:r>
+            <a:r>
+              <a:rPr lang="ru-RU" dirty="0" smtClean="0"/>
+              <a:t>16 миллионов reads/sec</a:t>
+            </a:r>
+            <a:endParaRPr lang="en-US" dirty="0" smtClean="0"/>
+          </a:p>
+          <a:p>
+            <a:pPr marL="171450" indent="-171450">
+              <a:buFont typeface="Arial" panose="020B0604020202020204" pitchFamily="34" charset="0"/>
+              <a:buChar char="•"/>
+            </a:pPr>
+            <a:r>
+              <a:rPr lang="en-US" dirty="0" smtClean="0"/>
+              <a:t> </a:t>
+            </a:r>
+            <a:r>
+              <a:rPr lang="ru-RU" dirty="0" smtClean="0"/>
+              <a:t>Архитектура REST работает через интерфейсы OWIN</a:t>
+            </a:r>
+            <a:endParaRPr lang="en-US" dirty="0" smtClean="0"/>
+          </a:p>
+          <a:p>
+            <a:pPr marL="171450" indent="-171450">
+              <a:buFont typeface="Arial" panose="020B0604020202020204" pitchFamily="34" charset="0"/>
+              <a:buChar char="•"/>
+            </a:pPr>
+            <a:r>
+              <a:rPr lang="en-US" baseline="0" dirty="0" smtClean="0"/>
+              <a:t>HTML5 </a:t>
+            </a:r>
+            <a:r>
+              <a:rPr lang="en-US" baseline="0" dirty="0" err="1" smtClean="0"/>
+              <a:t>Manement</a:t>
+            </a:r>
+            <a:r>
+              <a:rPr lang="en-US" baseline="0" dirty="0" smtClean="0"/>
+              <a:t> Studio</a:t>
+            </a:r>
+          </a:p>
+          <a:p>
+            <a:pPr marL="171450" indent="-171450">
+              <a:buFont typeface="Arial" panose="020B0604020202020204" pitchFamily="34" charset="0"/>
+              <a:buChar char="•"/>
+            </a:pPr>
+            <a:r>
+              <a:rPr lang="en-US" baseline="0" dirty="0" err="1" smtClean="0"/>
+              <a:t>RavenFS</a:t>
+            </a:r>
+            <a:r>
+              <a:rPr lang="en-US" baseline="0" dirty="0" smtClean="0"/>
+              <a:t> - </a:t>
+            </a:r>
+            <a:r>
+              <a:rPr lang="ru-RU" baseline="0" dirty="0" smtClean="0"/>
+              <a:t> распределенная файловая система</a:t>
+            </a:r>
+            <a:endParaRPr lang="en-US" baseline="0" dirty="0" smtClean="0">
+              <a:sym typeface="Wingdings" panose="05000000000000000000" pitchFamily="2" charset="2"/>
+            </a:endParaRPr>
+          </a:p>
+          <a:p>
+            <a:pPr marL="628650" lvl="1" indent="-171450">
+              <a:buFont typeface="Arial" panose="020B0604020202020204" pitchFamily="34" charset="0"/>
+              <a:buChar char="•"/>
+            </a:pPr>
+            <a:r>
+              <a:rPr lang="ru-RU" baseline="0" dirty="0" smtClean="0"/>
+              <a:t>способен справлятся с очень большими файлами</a:t>
+            </a:r>
+            <a:endParaRPr lang="en-US" baseline="0" dirty="0" smtClean="0"/>
+          </a:p>
+          <a:p>
+            <a:pPr marL="628650" lvl="1" indent="-171450">
+              <a:buFont typeface="Arial" panose="020B0604020202020204" pitchFamily="34" charset="0"/>
+              <a:buChar char="•"/>
+            </a:pPr>
+            <a:r>
+              <a:rPr lang="ru-RU" baseline="0" dirty="0" smtClean="0"/>
+              <a:t>передает измененая только тех частей</a:t>
+            </a:r>
+            <a:r>
+              <a:rPr lang="en-US" baseline="0" dirty="0" smtClean="0"/>
+              <a:t> </a:t>
+            </a:r>
+            <a:r>
+              <a:rPr lang="ru-RU" baseline="0" dirty="0" smtClean="0"/>
+              <a:t>файлов</a:t>
+            </a:r>
+            <a:r>
+              <a:rPr lang="en-US" baseline="0" dirty="0" smtClean="0"/>
+              <a:t> </a:t>
+            </a:r>
+            <a:r>
+              <a:rPr lang="ru-RU" baseline="0" dirty="0" smtClean="0"/>
+              <a:t>которые действительно изменились</a:t>
+            </a:r>
+            <a:endParaRPr lang="en-US" baseline="0" dirty="0" smtClean="0"/>
+          </a:p>
+          <a:p>
+            <a:pPr marL="628650" lvl="1" indent="-171450">
+              <a:buFont typeface="Arial" panose="020B0604020202020204" pitchFamily="34" charset="0"/>
+              <a:buChar char="•"/>
+            </a:pPr>
+            <a:endParaRPr lang="en-US" baseline="0" dirty="0" smtClean="0"/>
+          </a:p>
+          <a:p>
+            <a:pPr marL="171450" indent="-171450">
+              <a:buFont typeface="Arial" panose="020B0604020202020204" pitchFamily="34" charset="0"/>
+              <a:buChar char="•"/>
+            </a:pPr>
+            <a:endParaRPr lang="en-US" dirty="0" smtClean="0"/>
+          </a:p>
+          <a:p>
+            <a:pPr marL="171450" indent="-171450">
+              <a:buFont typeface="Arial" panose="020B0604020202020204" pitchFamily="34" charset="0"/>
+              <a:buChar char="•"/>
+            </a:pPr>
+            <a:endParaRPr lang="ru-RU" dirty="0" smtClean="0"/>
+          </a:p>
+        </p:txBody>
+      </p:sp>
+      <p:sp>
+        <p:nvSpPr>
+          <p:cNvPr id="4" name="Slide Number Placeholder 3"/>
+          <p:cNvSpPr>
+            <a:spLocks noGrp="1"/>
+          </p:cNvSpPr>
+          <p:nvPr>
+            <p:ph type="sldNum" sz="quarter" idx="10"/>
+          </p:nvPr>
+        </p:nvSpPr>
+        <p:spPr/>
+        <p:txBody>
+          <a:bodyPr/>
+          <a:lstStyle/>
+          <a:p>
+            <a:fld id="{B1DCD5A6-B3C0-4DBA-9305-6D43665D2DE2}" type="slidenum">
+              <a:rPr lang="en-US" smtClean="0"/>
+              <a:t>20</a:t>
+            </a:fld>
+            <a:endParaRPr lang="en-US"/>
+          </a:p>
+        </p:txBody>
+      </p:sp>
+    </p:spTree>
+    <p:extLst>
+      <p:ext uri="{BB962C8B-B14F-4D97-AF65-F5344CB8AC3E}">
+        <p14:creationId xmlns:p14="http://schemas.microsoft.com/office/powerpoint/2010/main" val="1667014677"/>
       </p:ext>
     </p:extLst>
   </p:cSld>
@@ -2087,15 +2418,7 @@
             </a:pPr>
             <a:r>
               <a:rPr lang="ru-RU" dirty="0" smtClean="0"/>
-              <a:t>много </a:t>
-            </a:r>
-            <a:r>
-              <a:rPr lang="ru-RU" dirty="0" smtClean="0"/>
-              <a:t>работы </a:t>
-            </a:r>
-            <a:r>
-              <a:rPr lang="ru-RU" dirty="0" smtClean="0"/>
-              <a:t>вручную</a:t>
+              <a:t>много работы вручную</a:t>
             </a:r>
             <a:endParaRPr lang="en-US" dirty="0" smtClean="0"/>
           </a:p>
@@ -2273,11 +2596,7 @@
           <a:p>
             <a:r>
               <a:rPr lang="ru-RU" dirty="0" smtClean="0"/>
-              <a:t>- </a:t>
-            </a:r>
-            <a:r>
-              <a:rPr lang="ru-RU" dirty="0" smtClean="0"/>
-              <a:t>не предназначен для горизонтального</a:t>
+              <a:t>- не предназначен для горизонтального</a:t>
             </a:r>
             <a:r>
               <a:rPr lang="en-US" dirty="0" smtClean="0"/>
@@ -2287,7 +2606,6 @@
               <a:rPr lang="ru-RU" dirty="0" smtClean="0"/>
               <a:t>маштабирования</a:t>
             </a:r>
-            <a:endParaRPr lang="ru-RU" dirty="0" smtClean="0"/>
           </a:p>
           <a:p>
             <a:pPr marL="0" indent="0">
@@ -2311,15 +2629,7 @@
             </a:pPr>
             <a:r>
               <a:rPr lang="ru-RU" dirty="0" smtClean="0"/>
-              <a:t>- </a:t>
-            </a:r>
-            <a:r>
-              <a:rPr lang="ru-RU" dirty="0" smtClean="0"/>
-              <a:t>жесткая схема данных, медленные </a:t>
-            </a:r>
-            <a:r>
-              <a:rPr lang="ru-RU" dirty="0" smtClean="0"/>
-              <a:t>изменения</a:t>
+              <a:t>- жесткая схема данных, медленные изменения</a:t>
             </a:r>
             <a:endParaRPr lang="en-US" dirty="0"/>
           </a:p>
@@ -2420,15 +2730,7 @@
             </a:pPr>
             <a:r>
               <a:rPr lang="ru-RU" dirty="0" smtClean="0"/>
-              <a:t>нет </a:t>
-            </a:r>
-            <a:r>
-              <a:rPr lang="ru-RU" dirty="0" smtClean="0"/>
-              <a:t>нужды в администрировании, самонастраивающаяся </a:t>
-            </a:r>
-            <a:r>
-              <a:rPr lang="ru-RU" dirty="0" smtClean="0"/>
-              <a:t>функциональность</a:t>
+              <a:t>нет нужды в администрировании, самонастраивающаяся функциональность</a:t>
             </a:r>
             <a:endParaRPr lang="en-US" dirty="0" smtClean="0"/>
           </a:p>
@@ -2478,15 +2780,7 @@
             </a:pPr>
             <a:r>
               <a:rPr lang="ru-RU" dirty="0" smtClean="0"/>
-              <a:t>легко </a:t>
-            </a:r>
-            <a:r>
-              <a:rPr lang="ru-RU" dirty="0" smtClean="0"/>
-              <a:t>и интуитивно работать, не происходит impedance </a:t>
-            </a:r>
-            <a:r>
-              <a:rPr lang="ru-RU" dirty="0" smtClean="0"/>
-              <a:t>mismatch</a:t>
+              <a:t>легко и интуитивно работать, не происходит impedance mismatch</a:t>
             </a:r>
             <a:endParaRPr lang="en-US" dirty="0" smtClean="0"/>
           </a:p>
@@ -2862,24 +3156,10 @@
           <a:lstStyle/>
           <a:p>
             <a:r>
-              <a:rPr lang="ru-RU" dirty="0" smtClean="0"/>
-              <a:t>* Использование объекта внутри объекта - объяснить о том что нет join  в RavenDB</a:t>
-            </a:r>
-          </a:p>
-          <a:p>
-            <a:r>
-              <a:rPr lang="ru-RU" dirty="0" smtClean="0"/>
-              <a:t>* </a:t>
-            </a:r>
-            <a:r>
-              <a:rPr lang="ru-RU" dirty="0" smtClean="0"/>
-              <a:t>объяснить </a:t>
-            </a:r>
-            <a:r>
               <a:rPr lang="en-US" dirty="0" smtClean="0"/>
-              <a:t>include</a:t>
-            </a:r>
-            <a:endParaRPr lang="en-US" dirty="0"/>
+              <a:t>Example of unbounded result set</a:t>
+            </a:r>
+            <a:endParaRPr lang="he-IL" dirty="0"/>
           </a:p>
         </p:txBody>
       </p:sp>
@@ -2909,7 +3189,7 @@
     </p:spTree>
     <p:extLst>
       <p:ext uri="{BB962C8B-B14F-4D97-AF65-F5344CB8AC3E}">
-        <p14:creationId xmlns:p14="http://schemas.microsoft.com/office/powerpoint/2010/main" val="287120232"/>
+        <p14:creationId xmlns:p14="http://schemas.microsoft.com/office/powerpoint/2010/main" val="2215782928"/>
       </p:ext>
     </p:extLst>
   </p:cSld>
@@ -2965,180 +3245,43 @@
           <a:p>
             <a:r>
               <a:rPr lang="en-US" dirty="0" smtClean="0"/>
-              <a:t>RavenDB vs SQL</a:t>
-            </a:r>
-          </a:p>
-          <a:p>
-            <a:pPr marL="0" indent="0">
-              <a:buFontTx/>
-              <a:buNone/>
-            </a:pPr>
-            <a:r>
-              <a:rPr lang="ru-RU" dirty="0" smtClean="0"/>
-              <a:t>- запрос на SQL сервер возвращает консистентные данные. Для этого требуется много дорогостоящих блокировок (locks)</a:t>
-            </a:r>
-          </a:p>
-          <a:p>
-            <a:pPr marL="171450" indent="-171450">
-              <a:buFontTx/>
-              <a:buChar char="-"/>
-            </a:pPr>
-            <a:r>
-              <a:rPr lang="ru-RU" dirty="0" smtClean="0"/>
-              <a:t>запрос на RavenDB возвращает то что имеется в наличии СЕЙЧАС (eventual consistency)</a:t>
-            </a:r>
-            <a:endParaRPr lang="en-US" dirty="0" smtClean="0"/>
-          </a:p>
-          <a:p>
-            <a:pPr marL="171450" indent="-171450">
-              <a:buFontTx/>
-              <a:buChar char="-"/>
-            </a:pPr>
-            <a:r>
-              <a:rPr lang="ru-RU" sz="1200" b="0" i="0" kern="1200" dirty="0" smtClean="0">
-                <a:solidFill>
-                  <a:schemeClr val="tx1"/>
-                </a:solidFill>
-                <a:effectLst/>
-                <a:latin typeface="+mn-lt"/>
-                <a:ea typeface="+mn-ea"/>
-                <a:cs typeface="+mn-cs"/>
-              </a:rPr>
-              <a:t>гарантии согласованности</a:t>
-            </a:r>
-            <a:r>
-              <a:rPr lang="en-US" sz="1200" b="0" i="0" kern="1200" dirty="0" smtClean="0">
-                <a:solidFill>
-                  <a:schemeClr val="tx1"/>
-                </a:solidFill>
-                <a:effectLst/>
-                <a:latin typeface="+mn-lt"/>
-                <a:ea typeface="+mn-ea"/>
-                <a:cs typeface="+mn-cs"/>
-              </a:rPr>
-              <a:t> ACID </a:t>
-            </a:r>
-            <a:r>
-              <a:rPr lang="ru-RU" dirty="0" smtClean="0"/>
-              <a:t>у</a:t>
-            </a:r>
-            <a:r>
-              <a:rPr lang="en-US" dirty="0" smtClean="0"/>
-              <a:t> </a:t>
-            </a:r>
-            <a:r>
-              <a:rPr lang="ru-RU" dirty="0" smtClean="0"/>
-              <a:t>RavenDB</a:t>
-            </a:r>
-          </a:p>
-          <a:p>
-            <a:pPr marL="171450" indent="-171450">
-              <a:buFontTx/>
-              <a:buChar char="-"/>
-            </a:pPr>
-            <a:r>
-              <a:rPr lang="ru-RU" dirty="0" smtClean="0"/>
-              <a:t>Объяснение</a:t>
-            </a:r>
-            <a:r>
-              <a:rPr lang="en-US" dirty="0" smtClean="0"/>
-              <a:t> </a:t>
-            </a:r>
-            <a:r>
-              <a:rPr lang="ru-RU" sz="1200" b="0" i="0" kern="1200" dirty="0" smtClean="0">
-                <a:solidFill>
-                  <a:schemeClr val="tx1"/>
-                </a:solidFill>
-                <a:effectLst/>
-                <a:latin typeface="+mn-lt"/>
-                <a:ea typeface="+mn-ea"/>
-                <a:cs typeface="+mn-cs"/>
-              </a:rPr>
-              <a:t>согласованности которая</a:t>
-            </a:r>
-            <a:r>
-              <a:rPr lang="en-US" sz="1200" b="0" i="0" kern="1200" dirty="0" smtClean="0">
-                <a:solidFill>
-                  <a:schemeClr val="tx1"/>
-                </a:solidFill>
-                <a:effectLst/>
-                <a:latin typeface="+mn-lt"/>
-                <a:ea typeface="+mn-ea"/>
-                <a:cs typeface="+mn-cs"/>
-              </a:rPr>
-              <a:t> </a:t>
-            </a:r>
-            <a:r>
-              <a:rPr lang="ru-RU" sz="1200" b="0" i="0" kern="1200" dirty="0" smtClean="0">
-                <a:solidFill>
-                  <a:schemeClr val="tx1"/>
-                </a:solidFill>
-                <a:effectLst/>
-                <a:latin typeface="+mn-lt"/>
-                <a:ea typeface="+mn-ea"/>
-                <a:cs typeface="+mn-cs"/>
-              </a:rPr>
-              <a:t>достигается со временем </a:t>
-            </a:r>
-            <a:r>
-              <a:rPr lang="en-US" sz="1200" b="0" i="0" kern="1200" dirty="0" smtClean="0">
-                <a:solidFill>
-                  <a:schemeClr val="tx1"/>
-                </a:solidFill>
-                <a:effectLst/>
-                <a:latin typeface="+mn-lt"/>
-                <a:ea typeface="+mn-ea"/>
-                <a:cs typeface="+mn-cs"/>
-                <a:sym typeface="Wingdings" panose="05000000000000000000" pitchFamily="2" charset="2"/>
-              </a:rPr>
-              <a:t> </a:t>
-            </a:r>
-            <a:r>
-              <a:rPr lang="ru-RU" dirty="0" smtClean="0"/>
-              <a:t>eventual consistency - пример банковской системы</a:t>
-            </a:r>
-            <a:endParaRPr lang="en-US" dirty="0" smtClean="0"/>
-          </a:p>
-          <a:p>
-            <a:pPr marL="0" indent="0">
-              <a:buFontTx/>
-              <a:buNone/>
-            </a:pPr>
+              <a:t>Example of SELECT N + 1</a:t>
+            </a:r>
             <a:r>
               <a:rPr lang="en-US" baseline="0" dirty="0" smtClean="0"/>
-              <a:t>     * eventual consistency </a:t>
-            </a:r>
-            <a:r>
-              <a:rPr lang="az-Cyrl-AZ" baseline="0" dirty="0" smtClean="0"/>
-              <a:t>позволяет реализовать</a:t>
-            </a:r>
-            <a:r>
-              <a:rPr lang="en-US" baseline="0" dirty="0" smtClean="0"/>
-              <a:t> </a:t>
-            </a:r>
-            <a:r>
-              <a:rPr lang="az-Cyrl-AZ" baseline="0" dirty="0" smtClean="0"/>
-              <a:t>оптимизации</a:t>
-            </a:r>
-            <a:r>
-              <a:rPr lang="en-US" baseline="0" dirty="0" smtClean="0"/>
-              <a:t>, </a:t>
-            </a:r>
-            <a:r>
-              <a:rPr lang="az-Cyrl-AZ" baseline="0" dirty="0" smtClean="0"/>
-              <a:t>например </a:t>
-            </a:r>
-            <a:r>
-              <a:rPr lang="en-US" baseline="0" dirty="0" smtClean="0"/>
-              <a:t>low latency/low throughput </a:t>
+              <a:t> query (</a:t>
             </a:r>
             <a:r>
               <a:rPr lang="en-US" baseline="0" dirty="0" smtClean="0">
                 <a:sym typeface="Wingdings" panose="05000000000000000000" pitchFamily="2" charset="2"/>
               </a:rPr>
-              <a:t> high latency/high throughput</a:t>
-            </a:r>
-            <a:endParaRPr lang="en-US" dirty="0" smtClean="0"/>
+              <a:t>using </a:t>
+            </a:r>
+            <a:r>
+              <a:rPr lang="en-US" baseline="0" dirty="0" err="1" smtClean="0">
+                <a:sym typeface="Wingdings" panose="05000000000000000000" pitchFamily="2" charset="2"/>
+              </a:rPr>
+              <a:t>PetaPoco</a:t>
+            </a:r>
+            <a:r>
+              <a:rPr lang="en-US" baseline="0" dirty="0" smtClean="0">
+                <a:sym typeface="Wingdings" panose="05000000000000000000" pitchFamily="2" charset="2"/>
+              </a:rPr>
+              <a:t> micro-</a:t>
+            </a:r>
+            <a:r>
+              <a:rPr lang="en-US" baseline="0" dirty="0" err="1" smtClean="0">
+                <a:sym typeface="Wingdings" panose="05000000000000000000" pitchFamily="2" charset="2"/>
+              </a:rPr>
+              <a:t>orm</a:t>
+            </a:r>
+            <a:r>
+              <a:rPr lang="en-US" baseline="0" dirty="0" smtClean="0">
+                <a:sym typeface="Wingdings" panose="05000000000000000000" pitchFamily="2" charset="2"/>
+              </a:rPr>
+              <a:t> framework)</a:t>
+            </a:r>
+            <a:endParaRPr lang="he-IL" dirty="0"/>
           </a:p>
         </p:txBody>
       </p:sp>
@@ -3168,7 +3311,7 @@
     </p:spTree>
     <p:extLst>
       <p:ext uri="{BB962C8B-B14F-4D97-AF65-F5344CB8AC3E}">
-        <p14:creationId xmlns:p14="http://schemas.microsoft.com/office/powerpoint/2010/main" val="1248110917"/>
+        <p14:creationId xmlns:p14="http://schemas.microsoft.com/office/powerpoint/2010/main" val="3266344622"/>
       </p:ext>
     </p:extLst>
   </p:cSld>
@@ -3581,7 +3724,7 @@
           <a:p>
             <a:fld id="{511C50AA-C4DA-45F6-819C-324E7E1F0295}" type="datetimeFigureOut">
               <a:rPr lang="en-US" smtClean="0"/>
-              <a:t>3/18/2014</a:t>
+              <a:t>3/25/2014</a:t>
             </a:fld>
             <a:endParaRPr lang="en-US"/>
           </a:p>
@@ -3760,7 +3903,7 @@
           <a:p>
             <a:fld id="{511C50AA-C4DA-45F6-819C-324E7E1F0295}" type="datetimeFigureOut">
               <a:rPr lang="en-US" smtClean="0"/>
-              <a:t>3/18/2014</a:t>
+              <a:t>3/25/2014</a:t>
             </a:fld>
             <a:endParaRPr lang="en-US"/>
           </a:p>
@@ -3947,7 +4090,7 @@
           <a:p>
             <a:fld id="{511C50AA-C4DA-45F6-819C-324E7E1F0295}" type="datetimeFigureOut">
               <a:rPr lang="en-US" smtClean="0"/>
-              <a:t>3/18/2014</a:t>
+              <a:t>3/25/2014</a:t>
             </a:fld>
             <a:endParaRPr lang="en-US"/>
           </a:p>
@@ -4124,7 +4267,7 @@
           <a:p>
             <a:fld id="{511C50AA-C4DA-45F6-819C-324E7E1F0295}" type="datetimeFigureOut">
               <a:rPr lang="en-US" smtClean="0"/>
-              <a:t>3/18/2014</a:t>
+              <a:t>3/25/2014</a:t>
             </a:fld>
             <a:endParaRPr lang="en-US"/>
           </a:p>
@@ -4444,7 +4587,7 @@
           <a:p>
             <a:fld id="{511C50AA-C4DA-45F6-819C-324E7E1F0295}" type="datetimeFigureOut">
               <a:rPr lang="en-US" smtClean="0"/>
-              <a:t>3/18/2014</a:t>
+              <a:t>3/25/2014</a:t>
             </a:fld>
             <a:endParaRPr lang="en-US"/>
           </a:p>
@@ -4837,7 +4980,7 @@
           <a:p>
             <a:fld id="{511C50AA-C4DA-45F6-819C-324E7E1F0295}" type="datetimeFigureOut">
               <a:rPr lang="en-US" smtClean="0"/>
-              <a:t>3/18/2014</a:t>
+              <a:t>3/25/2014</a:t>
             </a:fld>
             <a:endParaRPr lang="en-US"/>
           </a:p>
@@ -5278,7 +5421,7 @@
           <a:p>
             <a:fld id="{511C50AA-C4DA-45F6-819C-324E7E1F0295}" type="datetimeFigureOut">
               <a:rPr lang="en-US" smtClean="0"/>
-              <a:t>3/18/2014</a:t>
+              <a:t>3/25/2014</a:t>
             </a:fld>
             <a:endParaRPr lang="en-US"/>
           </a:p>
@@ -5403,7 +5546,7 @@
           <a:p>
             <a:fld id="{511C50AA-C4DA-45F6-819C-324E7E1F0295}" type="datetimeFigureOut">
               <a:rPr lang="en-US" smtClean="0"/>
-              <a:t>3/18/2014</a:t>
+              <a:t>3/25/2014</a:t>
             </a:fld>
             <a:endParaRPr lang="en-US"/>
           </a:p>
@@ -5505,7 +5648,7 @@
           <a:p>
             <a:fld id="{511C50AA-C4DA-45F6-819C-324E7E1F0295}" type="datetimeFigureOut">
               <a:rPr lang="en-US" smtClean="0"/>
-              <a:t>3/18/2014</a:t>
+              <a:t>3/25/2014</a:t>
             </a:fld>
             <a:endParaRPr lang="en-US"/>
           </a:p>
@@ -5862,7 +6005,7 @@
           <a:p>
             <a:fld id="{511C50AA-C4DA-45F6-819C-324E7E1F0295}" type="datetimeFigureOut">
               <a:rPr lang="en-US" smtClean="0"/>
-              <a:t>3/18/2014</a:t>
+              <a:t>3/25/2014</a:t>
             </a:fld>
             <a:endParaRPr lang="en-US"/>
           </a:p>
@@ -6287,7 +6430,7 @@
           <a:p>
             <a:fld id="{511C50AA-C4DA-45F6-819C-324E7E1F0295}" type="datetimeFigureOut">
               <a:rPr lang="en-US" smtClean="0"/>
-              <a:t>3/18/2014</a:t>
+              <a:t>3/25/2014</a:t>
             </a:fld>
             <a:endParaRPr lang="en-US"/>
           </a:p>
@@ -6568,7 +6711,7 @@
           <a:p>
             <a:fld id="{511C50AA-C4DA-45F6-819C-324E7E1F0295}" type="datetimeFigureOut">
               <a:rPr lang="en-US" smtClean="0"/>
-              <a:t>3/18/2014</a:t>
+              <a:t>3/25/2014</a:t>
             </a:fld>
             <a:endParaRPr lang="en-US"/>
           </a:p>
@@ -7262,6 +7405,248 @@
           <a:chExt cx="0" cy="0"/>
         </a:xfrm>
       </p:grpSpPr>
+      <p:pic>
+        <p:nvPicPr>
+          <p:cNvPr id="5" name="Picture 4"/>
+          <p:cNvPicPr>
+            <a:picLocks noChangeAspect="1"/>
+          </p:cNvPicPr>
+          <p:nvPr/>
+        </p:nvPicPr>
+        <p:blipFill>
+          <a:blip r:embed="rId3"/>
+          <a:stretch>
+            <a:fillRect/>
+          </a:stretch>
+        </p:blipFill>
+        <p:spPr>
+          <a:xfrm>
+            <a:off x="0" y="1271239"/>
+            <a:ext cx="11950249" cy="3404431"/>
+          </a:xfrm>
+          <a:prstGeom prst="rect">
+            <a:avLst/>
+          </a:prstGeom>
+        </p:spPr>
+      </p:pic>
+      <p:pic>
+        <p:nvPicPr>
+          <p:cNvPr id="8198" name="Picture 6" descr="http://b.vimeocdn.com/ps/341/341641_300.jpg"/>
+          <p:cNvPicPr>
+            <a:picLocks noChangeAspect="1" noChangeArrowheads="1"/>
+          </p:cNvPicPr>
+          <p:nvPr/>
+        </p:nvPicPr>
+        <p:blipFill>
+          <a:blip r:embed="rId4">
+            <a:extLst>
+              <a:ext uri="{28A0092B-C50C-407E-A947-70E740481C1C}">
+                <a14:useLocalDpi xmlns:a14="http://schemas.microsoft.com/office/drawing/2010/main" val="0"/>
+              </a:ext>
+            </a:extLst>
+          </a:blip>
+          <a:srcRect/>
+          <a:stretch>
+            <a:fillRect/>
+          </a:stretch>
+        </p:blipFill>
+        <p:spPr bwMode="auto">
+          <a:xfrm>
+            <a:off x="10039673" y="144966"/>
+            <a:ext cx="1910576" cy="1910576"/>
+          </a:xfrm>
+          <a:prstGeom prst="rect">
+            <a:avLst/>
+          </a:prstGeom>
+          <a:noFill/>
+          <a:extLst>
+            <a:ext uri="{909E8E84-426E-40DD-AFC4-6F175D3DCCD1}">
+              <a14:hiddenFill xmlns:a14="http://schemas.microsoft.com/office/drawing/2010/main">
+                <a:solidFill>
+                  <a:srgbClr val="FFFFFF"/>
+                </a:solidFill>
+              </a14:hiddenFill>
+            </a:ext>
+          </a:extLst>
+        </p:spPr>
+      </p:pic>
+    </p:spTree>
+    <p:extLst>
+      <p:ext uri="{BB962C8B-B14F-4D97-AF65-F5344CB8AC3E}">
+        <p14:creationId xmlns:p14="http://schemas.microsoft.com/office/powerpoint/2010/main" val="3886583958"/>
+      </p:ext>
+    </p:extLst>
+  </p:cSld>
+  <p:clrMapOvr>
+    <a:masterClrMapping/>
+  </p:clrMapOvr>
+  <p:timing>
+    <p:tnLst>
+      <p:par>
+        <p:cTn id="1" dur="indefinite" restart="never" nodeType="tmRoot"/>
+      </p:par>
+    </p:tnLst>
+  </p:timing>
+</p:sld>
+</file>
+
+<file path=ppt/slides/slide11.xml><?xml version="1.0" encoding="utf-8"?>
+<p:sld xmlns:a="http://schemas.openxmlformats.org/drawingml/2006/main" xmlns:r="http://schemas.openxmlformats.org/officeDocument/2006/relationships" xmlns:p="http://schemas.openxmlformats.org/presentationml/2006/main">
+  <p:cSld>
+    <p:spTree>
+      <p:nvGrpSpPr>
+        <p:cNvPr id="1" name=""/>
+        <p:cNvGrpSpPr/>
+        <p:nvPr/>
+      </p:nvGrpSpPr>
+      <p:grpSpPr>
+        <a:xfrm>
+          <a:off x="0" y="0"/>
+          <a:ext cx="0" cy="0"/>
+          <a:chOff x="0" y="0"/>
+          <a:chExt cx="0" cy="0"/>
+        </a:xfrm>
+      </p:grpSpPr>
+      <p:sp>
+        <p:nvSpPr>
+          <p:cNvPr id="2" name="Title 1"/>
+          <p:cNvSpPr>
+            <a:spLocks noGrp="1"/>
+          </p:cNvSpPr>
+          <p:nvPr>
+            <p:ph type="title"/>
+          </p:nvPr>
+        </p:nvSpPr>
+        <p:spPr>
+          <a:xfrm>
+            <a:off x="67632" y="0"/>
+            <a:ext cx="10058400" cy="1382751"/>
+          </a:xfrm>
+        </p:spPr>
+        <p:txBody>
+          <a:bodyPr/>
+          <a:lstStyle/>
+          <a:p>
+            <a:pPr algn="ctr"/>
+            <a:r>
+              <a:rPr lang="az-Cyrl-AZ" dirty="0" smtClean="0"/>
+              <a:t>Гарантии</a:t>
+            </a:r>
+            <a:r>
+              <a:rPr lang="en-US" dirty="0" smtClean="0"/>
+              <a:t>…</a:t>
+            </a:r>
+            <a:endParaRPr lang="en-US" dirty="0"/>
+          </a:p>
+        </p:txBody>
+      </p:sp>
+      <p:sp>
+        <p:nvSpPr>
+          <p:cNvPr id="4" name="Rectangle 3"/>
+          <p:cNvSpPr/>
+          <p:nvPr/>
+        </p:nvSpPr>
+        <p:spPr>
+          <a:xfrm>
+            <a:off x="67632" y="6211669"/>
+            <a:ext cx="6096000" cy="369332"/>
+          </a:xfrm>
+          <a:prstGeom prst="rect">
+            <a:avLst/>
+          </a:prstGeom>
+        </p:spPr>
+        <p:txBody>
+          <a:bodyPr>
+            <a:spAutoFit/>
+          </a:bodyPr>
+          <a:lstStyle/>
+          <a:p>
+            <a:r>
+              <a:rPr lang="en-US" dirty="0"/>
+              <a:t>http://demotivatorium.ru/demotivators/d/21954/</a:t>
+            </a:r>
+            <a:endParaRPr lang="he-IL" dirty="0"/>
+          </a:p>
+        </p:txBody>
+      </p:sp>
+      <p:pic>
+        <p:nvPicPr>
+          <p:cNvPr id="1026" name="Picture 2" descr="2205131456237193.jpg (600×578)"/>
+          <p:cNvPicPr>
+            <a:picLocks noChangeAspect="1" noChangeArrowheads="1"/>
+          </p:cNvPicPr>
+          <p:nvPr/>
+        </p:nvPicPr>
+        <p:blipFill>
+          <a:blip r:embed="rId3">
+            <a:extLst>
+              <a:ext uri="{28A0092B-C50C-407E-A947-70E740481C1C}">
+                <a14:useLocalDpi xmlns:a14="http://schemas.microsoft.com/office/drawing/2010/main" val="0"/>
+              </a:ext>
+            </a:extLst>
+          </a:blip>
+          <a:srcRect/>
+          <a:stretch>
+            <a:fillRect/>
+          </a:stretch>
+        </p:blipFill>
+        <p:spPr bwMode="auto">
+          <a:xfrm>
+            <a:off x="2932771" y="1382751"/>
+            <a:ext cx="5373211" cy="4764469"/>
+          </a:xfrm>
+          <a:prstGeom prst="rect">
+            <a:avLst/>
+          </a:prstGeom>
+          <a:noFill/>
+          <a:extLst>
+            <a:ext uri="{909E8E84-426E-40DD-AFC4-6F175D3DCCD1}">
+              <a14:hiddenFill xmlns:a14="http://schemas.microsoft.com/office/drawing/2010/main">
+                <a:solidFill>
+                  <a:srgbClr val="FFFFFF"/>
+                </a:solidFill>
+              </a14:hiddenFill>
+            </a:ext>
+          </a:extLst>
+        </p:spPr>
+      </p:pic>
+    </p:spTree>
+    <p:extLst>
+      <p:ext uri="{BB962C8B-B14F-4D97-AF65-F5344CB8AC3E}">
+        <p14:creationId xmlns:p14="http://schemas.microsoft.com/office/powerpoint/2010/main" val="3286675224"/>
+      </p:ext>
+    </p:extLst>
+  </p:cSld>
+  <p:clrMapOvr>
+    <a:masterClrMapping/>
+  </p:clrMapOvr>
+  <p:timing>
+    <p:tnLst>
+      <p:par>
+        <p:cTn id="1" dur="indefinite" restart="never" nodeType="tmRoot"/>
+      </p:par>
+    </p:tnLst>
+  </p:timing>
+</p:sld>
+</file>
+
+<file path=ppt/slides/slide12.xml><?xml version="1.0" encoding="utf-8"?>
+<p:sld xmlns:a="http://schemas.openxmlformats.org/drawingml/2006/main" xmlns:r="http://schemas.openxmlformats.org/officeDocument/2006/relationships" xmlns:p="http://schemas.openxmlformats.org/presentationml/2006/main">
+  <p:cSld>
+    <p:spTree>
+      <p:nvGrpSpPr>
+        <p:cNvPr id="1" name=""/>
+        <p:cNvGrpSpPr/>
+        <p:nvPr/>
+      </p:nvGrpSpPr>
+      <p:grpSpPr>
+        <a:xfrm>
+          <a:off x="0" y="0"/>
+          <a:ext cx="0" cy="0"/>
+          <a:chOff x="0" y="0"/>
+          <a:chExt cx="0" cy="0"/>
+        </a:xfrm>
+      </p:grpSpPr>
       <p:sp>
         <p:nvSpPr>
           <p:cNvPr id="2" name="Title 1"/>
@@ -7330,7 +7715,7 @@
 </p:sld>
 </file>
 
-<file path=ppt/slides/slide11.xml><?xml version="1.0" encoding="utf-8"?>
+<file path=ppt/slides/slide13.xml><?xml version="1.0" encoding="utf-8"?>
 <p:sld xmlns:a="http://schemas.openxmlformats.org/drawingml/2006/main" xmlns:r="http://schemas.openxmlformats.org/officeDocument/2006/relationships" xmlns:p="http://schemas.openxmlformats.org/presentationml/2006/main">
   <p:cSld>
     <p:spTree>
@@ -7486,7 +7871,7 @@
 </p:sld>
 </file>
 
-<file path=ppt/slides/slide12.xml><?xml version="1.0" encoding="utf-8"?>
+<file path=ppt/slides/slide14.xml><?xml version="1.0" encoding="utf-8"?>
 <p:sld xmlns:a="http://schemas.openxmlformats.org/drawingml/2006/main" xmlns:r="http://schemas.openxmlformats.org/officeDocument/2006/relationships" xmlns:p="http://schemas.openxmlformats.org/presentationml/2006/main">
   <p:cSld>
     <p:spTree>
@@ -7636,7 +8021,7 @@
 </p:sld>
 </file>
 
-<file path=ppt/slides/slide13.xml><?xml version="1.0" encoding="utf-8"?>
+<file path=ppt/slides/slide15.xml><?xml version="1.0" encoding="utf-8"?>
 <p:sld xmlns:a="http://schemas.openxmlformats.org/drawingml/2006/main" xmlns:r="http://schemas.openxmlformats.org/officeDocument/2006/relationships" xmlns:p="http://schemas.openxmlformats.org/presentationml/2006/main">
   <p:cSld>
     <p:spTree>
@@ -7725,7 +8110,7 @@
 </p:sld>
 </file>
 
-<file path=ppt/slides/slide14.xml><?xml version="1.0" encoding="utf-8"?>
+<file path=ppt/slides/slide16.xml><?xml version="1.0" encoding="utf-8"?>
 <p:sld xmlns:a="http://schemas.openxmlformats.org/drawingml/2006/main" xmlns:r="http://schemas.openxmlformats.org/officeDocument/2006/relationships" xmlns:p="http://schemas.openxmlformats.org/presentationml/2006/main">
   <p:cSld>
     <p:spTree>
@@ -7813,7 +8198,7 @@
 </p:sld>
 </file>
 
-<file path=ppt/slides/slide15.xml><?xml version="1.0" encoding="utf-8"?>
+<file path=ppt/slides/slide17.xml><?xml version="1.0" encoding="utf-8"?>
 <p:sld xmlns:a="http://schemas.openxmlformats.org/drawingml/2006/main" xmlns:r="http://schemas.openxmlformats.org/officeDocument/2006/relationships" xmlns:p="http://schemas.openxmlformats.org/presentationml/2006/main">
   <p:cSld>
     <p:spTree>
@@ -7897,7 +8282,7 @@
 </p:sld>
 </file>
 
-<file path=ppt/slides/slide16.xml><?xml version="1.0" encoding="utf-8"?>
+<file path=ppt/slides/slide18.xml><?xml version="1.0" encoding="utf-8"?>
 <p:sld xmlns:a="http://schemas.openxmlformats.org/drawingml/2006/main" xmlns:r="http://schemas.openxmlformats.org/officeDocument/2006/relationships" xmlns:p="http://schemas.openxmlformats.org/presentationml/2006/main">
   <p:cSld>
     <p:spTree>
@@ -8046,7 +8431,7 @@
 </p:sld>
 </file>
 
-<file path=ppt/slides/slide17.xml><?xml version="1.0" encoding="utf-8"?>
+<file path=ppt/slides/slide19.xml><?xml version="1.0" encoding="utf-8"?>
 <p:sld xmlns:a="http://schemas.openxmlformats.org/drawingml/2006/main" xmlns:r="http://schemas.openxmlformats.org/officeDocument/2006/relationships" xmlns:p="http://schemas.openxmlformats.org/presentationml/2006/main">
   <p:cSld>
     <p:spTree>
@@ -8123,7 +8508,173 @@
 </p:sld>
 </file>
 
-<file path=ppt/slides/slide18.xml><?xml version="1.0" encoding="utf-8"?>
+<file path=ppt/slides/slide2.xml><?xml version="1.0" encoding="utf-8"?>
+<p:sld xmlns:a="http://schemas.openxmlformats.org/drawingml/2006/main" xmlns:r="http://schemas.openxmlformats.org/officeDocument/2006/relationships" xmlns:p="http://schemas.openxmlformats.org/presentationml/2006/main">
+  <p:cSld>
+    <p:spTree>
+      <p:nvGrpSpPr>
+        <p:cNvPr id="1" name=""/>
+        <p:cNvGrpSpPr/>
+        <p:nvPr/>
+      </p:nvGrpSpPr>
+      <p:grpSpPr>
+        <a:xfrm>
+          <a:off x="0" y="0"/>
+          <a:ext cx="0" cy="0"/>
+          <a:chOff x="0" y="0"/>
+          <a:chExt cx="0" cy="0"/>
+        </a:xfrm>
+      </p:grpSpPr>
+      <p:sp>
+        <p:nvSpPr>
+          <p:cNvPr id="2" name="Title 1"/>
+          <p:cNvSpPr>
+            <a:spLocks noGrp="1"/>
+          </p:cNvSpPr>
+          <p:nvPr>
+            <p:ph type="title"/>
+          </p:nvPr>
+        </p:nvSpPr>
+        <p:spPr>
+          <a:xfrm>
+            <a:off x="1136755" y="125"/>
+            <a:ext cx="10058400" cy="1609344"/>
+          </a:xfrm>
+        </p:spPr>
+        <p:txBody>
+          <a:bodyPr/>
+          <a:lstStyle/>
+          <a:p>
+            <a:pPr algn="ctr"/>
+            <a:r>
+              <a:rPr lang="en-US" dirty="0" smtClean="0">
+                <a:latin typeface="Cambria" panose="02040503050406030204" pitchFamily="18" charset="0"/>
+              </a:rPr>
+              <a:t>A </a:t>
+            </a:r>
+            <a:r>
+              <a:rPr lang="az-Cyrl-AZ" dirty="0">
+                <a:latin typeface="Cambria" panose="02040503050406030204" pitchFamily="18" charset="0"/>
+              </a:rPr>
+              <a:t>Что </a:t>
+            </a:r>
+            <a:r>
+              <a:rPr lang="az-Cyrl-AZ" dirty="0" smtClean="0">
+                <a:latin typeface="Cambria" panose="02040503050406030204" pitchFamily="18" charset="0"/>
+              </a:rPr>
+              <a:t>ЭТО</a:t>
+            </a:r>
+            <a:r>
+              <a:rPr lang="en-US" dirty="0">
+                <a:latin typeface="Cambria" panose="02040503050406030204" pitchFamily="18" charset="0"/>
+              </a:rPr>
+              <a:t> </a:t>
+            </a:r>
+            <a:r>
+              <a:rPr lang="az-Cyrl-AZ" dirty="0" smtClean="0">
+                <a:latin typeface="Cambria" panose="02040503050406030204" pitchFamily="18" charset="0"/>
+              </a:rPr>
+              <a:t>ТАКОЕ</a:t>
+            </a:r>
+            <a:r>
+              <a:rPr lang="en-US" dirty="0" smtClean="0">
+                <a:latin typeface="Cambria" panose="02040503050406030204" pitchFamily="18" charset="0"/>
+              </a:rPr>
+              <a:t>, RavenDB?</a:t>
+            </a:r>
+            <a:br>
+              <a:rPr lang="en-US" dirty="0" smtClean="0">
+                <a:latin typeface="Cambria" panose="02040503050406030204" pitchFamily="18" charset="0"/>
+              </a:rPr>
+            </a:br>
+            <a:r>
+              <a:rPr lang="en-US" dirty="0" smtClean="0"/>
+              <a:t>NoSQL </a:t>
+            </a:r>
+            <a:r>
+              <a:rPr lang="en-US" dirty="0"/>
+              <a:t>Document Database</a:t>
+            </a:r>
+            <a:endParaRPr lang="en-US" dirty="0">
+              <a:latin typeface="Cambria" panose="02040503050406030204" pitchFamily="18" charset="0"/>
+            </a:endParaRPr>
+          </a:p>
+        </p:txBody>
+      </p:sp>
+      <p:pic>
+        <p:nvPicPr>
+          <p:cNvPr id="6" name="Content Placeholder 5"/>
+          <p:cNvPicPr>
+            <a:picLocks noGrp="1" noChangeAspect="1"/>
+          </p:cNvPicPr>
+          <p:nvPr>
+            <p:ph idx="1"/>
+          </p:nvPr>
+        </p:nvPicPr>
+        <p:blipFill>
+          <a:blip r:embed="rId3" cstate="print">
+            <a:extLst>
+              <a:ext uri="{28A0092B-C50C-407E-A947-70E740481C1C}">
+                <a14:useLocalDpi xmlns:a14="http://schemas.microsoft.com/office/drawing/2010/main" val="0"/>
+              </a:ext>
+            </a:extLst>
+          </a:blip>
+          <a:stretch>
+            <a:fillRect/>
+          </a:stretch>
+        </p:blipFill>
+        <p:spPr>
+          <a:xfrm>
+            <a:off x="3982972" y="1951101"/>
+            <a:ext cx="7545562" cy="4051300"/>
+          </a:xfrm>
+        </p:spPr>
+      </p:pic>
+      <p:pic>
+        <p:nvPicPr>
+          <p:cNvPr id="3" name="Picture 2"/>
+          <p:cNvPicPr>
+            <a:picLocks noChangeAspect="1"/>
+          </p:cNvPicPr>
+          <p:nvPr/>
+        </p:nvPicPr>
+        <p:blipFill>
+          <a:blip r:embed="rId4"/>
+          <a:stretch>
+            <a:fillRect/>
+          </a:stretch>
+        </p:blipFill>
+        <p:spPr>
+          <a:xfrm>
+            <a:off x="243117" y="1609469"/>
+            <a:ext cx="3960891" cy="5248531"/>
+          </a:xfrm>
+          <a:prstGeom prst="rect">
+            <a:avLst/>
+          </a:prstGeom>
+        </p:spPr>
+      </p:pic>
+    </p:spTree>
+    <p:extLst>
+      <p:ext uri="{BB962C8B-B14F-4D97-AF65-F5344CB8AC3E}">
+        <p14:creationId xmlns:p14="http://schemas.microsoft.com/office/powerpoint/2010/main" val="3538293278"/>
+      </p:ext>
+    </p:extLst>
+  </p:cSld>
+  <p:clrMapOvr>
+    <a:masterClrMapping/>
+  </p:clrMapOvr>
+  <p:timing>
+    <p:tnLst>
+      <p:par>
+        <p:cTn id="1" dur="indefinite" restart="never" nodeType="tmRoot"/>
+      </p:par>
+    </p:tnLst>
+  </p:timing>
+</p:sld>
+</file>
+
+<file path=ppt/slides/slide20.xml><?xml version="1.0" encoding="utf-8"?>
 <p:sld xmlns:a="http://schemas.openxmlformats.org/drawingml/2006/main" xmlns:r="http://schemas.openxmlformats.org/officeDocument/2006/relationships" xmlns:p="http://schemas.openxmlformats.org/presentationml/2006/main">
   <p:cSld>
     <p:spTree>
@@ -8264,7 +8815,7 @@
 </p:sld>
 </file>
 
-<file path=ppt/slides/slide19.xml><?xml version="1.0" encoding="utf-8"?>
+<file path=ppt/slides/slide21.xml><?xml version="1.0" encoding="utf-8"?>
 <p:sld xmlns:a="http://schemas.openxmlformats.org/drawingml/2006/main" xmlns:r="http://schemas.openxmlformats.org/officeDocument/2006/relationships" xmlns:p="http://schemas.openxmlformats.org/presentationml/2006/main">
   <p:cSld>
     <p:spTree>
@@ -8438,178 +8989,6 @@
 </p:sld>
 </file>
 
-<file path=ppt/slides/slide2.xml><?xml version="1.0" encoding="utf-8"?>
-<p:sld xmlns:a="http://schemas.openxmlformats.org/drawingml/2006/main" xmlns:r="http://schemas.openxmlformats.org/officeDocument/2006/relationships" xmlns:p="http://schemas.openxmlformats.org/presentationml/2006/main">
-  <p:cSld>
-    <p:spTree>
-      <p:nvGrpSpPr>
-        <p:cNvPr id="1" name=""/>
-        <p:cNvGrpSpPr/>
-        <p:nvPr/>
-      </p:nvGrpSpPr>
-      <p:grpSpPr>
-        <a:xfrm>
-          <a:off x="0" y="0"/>
-          <a:ext cx="0" cy="0"/>
-          <a:chOff x="0" y="0"/>
-          <a:chExt cx="0" cy="0"/>
-        </a:xfrm>
-      </p:grpSpPr>
-      <p:sp>
-        <p:nvSpPr>
-          <p:cNvPr id="2" name="Title 1"/>
-          <p:cNvSpPr>
-            <a:spLocks noGrp="1"/>
-          </p:cNvSpPr>
-          <p:nvPr>
-            <p:ph type="title"/>
-          </p:nvPr>
-        </p:nvSpPr>
-        <p:spPr>
-          <a:xfrm>
-            <a:off x="1136755" y="125"/>
-            <a:ext cx="10058400" cy="1609344"/>
-          </a:xfrm>
-        </p:spPr>
-        <p:txBody>
-          <a:bodyPr/>
-          <a:lstStyle/>
-          <a:p>
-            <a:pPr algn="ctr"/>
-            <a:r>
-              <a:rPr lang="en-US" dirty="0" smtClean="0">
-                <a:latin typeface="Cambria" panose="02040503050406030204" pitchFamily="18" charset="0"/>
-              </a:rPr>
-              <a:t>A </a:t>
-            </a:r>
-            <a:r>
-              <a:rPr lang="az-Cyrl-AZ" dirty="0">
-                <a:latin typeface="Cambria" panose="02040503050406030204" pitchFamily="18" charset="0"/>
-              </a:rPr>
-              <a:t>Что </a:t>
-            </a:r>
-            <a:r>
-              <a:rPr lang="az-Cyrl-AZ" dirty="0" smtClean="0">
-                <a:latin typeface="Cambria" panose="02040503050406030204" pitchFamily="18" charset="0"/>
-              </a:rPr>
-              <a:t>ЭТО</a:t>
-            </a:r>
-            <a:r>
-              <a:rPr lang="en-US" dirty="0">
-                <a:latin typeface="Cambria" panose="02040503050406030204" pitchFamily="18" charset="0"/>
-              </a:rPr>
-              <a:t> </a:t>
-            </a:r>
-            <a:r>
-              <a:rPr lang="az-Cyrl-AZ" dirty="0" smtClean="0">
-                <a:latin typeface="Cambria" panose="02040503050406030204" pitchFamily="18" charset="0"/>
-              </a:rPr>
-              <a:t>ТАКОЕ</a:t>
-            </a:r>
-            <a:r>
-              <a:rPr lang="en-US" dirty="0" smtClean="0">
-                <a:latin typeface="Cambria" panose="02040503050406030204" pitchFamily="18" charset="0"/>
-              </a:rPr>
-              <a:t>, RavenDB</a:t>
-            </a:r>
-            <a:r>
-              <a:rPr lang="en-US" dirty="0" smtClean="0">
-                <a:latin typeface="Cambria" panose="02040503050406030204" pitchFamily="18" charset="0"/>
-              </a:rPr>
-              <a:t>?</a:t>
-            </a:r>
-            <a:br>
-              <a:rPr lang="en-US" dirty="0" smtClean="0">
-                <a:latin typeface="Cambria" panose="02040503050406030204" pitchFamily="18" charset="0"/>
-              </a:rPr>
-            </a:br>
-            <a:r>
-              <a:rPr lang="en-US" dirty="0" smtClean="0"/>
-              <a:t>NoSQL </a:t>
-            </a:r>
-            <a:r>
-              <a:rPr lang="en-US" dirty="0"/>
-              <a:t>Document Database</a:t>
-            </a:r>
-            <a:endParaRPr lang="en-US" dirty="0">
-              <a:latin typeface="Cambria" panose="02040503050406030204" pitchFamily="18" charset="0"/>
-            </a:endParaRPr>
-          </a:p>
-        </p:txBody>
-      </p:sp>
-      <p:pic>
-        <p:nvPicPr>
-          <p:cNvPr id="6" name="Content Placeholder 5"/>
-          <p:cNvPicPr>
-            <a:picLocks noGrp="1" noChangeAspect="1"/>
-          </p:cNvPicPr>
-          <p:nvPr>
-            <p:ph idx="1"/>
-          </p:nvPr>
-        </p:nvPicPr>
-        <p:blipFill>
-          <a:blip r:embed="rId3" cstate="print">
-            <a:extLst>
-              <a:ext uri="{28A0092B-C50C-407E-A947-70E740481C1C}">
-                <a14:useLocalDpi xmlns:a14="http://schemas.microsoft.com/office/drawing/2010/main" val="0"/>
-              </a:ext>
-            </a:extLst>
-          </a:blip>
-          <a:stretch>
-            <a:fillRect/>
-          </a:stretch>
-        </p:blipFill>
-        <p:spPr>
-          <a:xfrm>
-            <a:off x="3982972" y="1951101"/>
-            <a:ext cx="7545562" cy="4051300"/>
-          </a:xfrm>
-        </p:spPr>
-      </p:pic>
-      <p:pic>
-        <p:nvPicPr>
-          <p:cNvPr id="3" name="Picture 2"/>
-          <p:cNvPicPr>
-            <a:picLocks noChangeAspect="1"/>
-          </p:cNvPicPr>
-          <p:nvPr/>
-        </p:nvPicPr>
-        <p:blipFill>
-          <a:blip r:embed="rId4"/>
-          <a:stretch>
-            <a:fillRect/>
-          </a:stretch>
-        </p:blipFill>
-        <p:spPr>
-          <a:xfrm>
-            <a:off x="243117" y="1609469"/>
-            <a:ext cx="3960891" cy="5248531"/>
-          </a:xfrm>
-          <a:prstGeom prst="rect">
-            <a:avLst/>
-          </a:prstGeom>
-        </p:spPr>
-      </p:pic>
-    </p:spTree>
-    <p:extLst>
-      <p:ext uri="{BB962C8B-B14F-4D97-AF65-F5344CB8AC3E}">
-        <p14:creationId xmlns:p14="http://schemas.microsoft.com/office/powerpoint/2010/main" val="3538293278"/>
-      </p:ext>
-    </p:extLst>
-  </p:cSld>
-  <p:clrMapOvr>
-    <a:masterClrMapping/>
-  </p:clrMapOvr>
-  <p:timing>
-    <p:tnLst>
-      <p:par>
-        <p:cTn id="1" dur="indefinite" restart="never" nodeType="tmRoot"/>
-      </p:par>
-    </p:tnLst>
-  </p:timing>
-</p:sld>
-</file>
-
 <file path=ppt/slides/slide3.xml><?xml version="1.0" encoding="utf-8"?>
 <p:sld xmlns:a="http://schemas.openxmlformats.org/drawingml/2006/main" xmlns:r="http://schemas.openxmlformats.org/officeDocument/2006/relationships" xmlns:p="http://schemas.openxmlformats.org/presentationml/2006/main">
   <p:cSld>
@@ -9332,9 +9711,32 @@
           <a:chExt cx="0" cy="0"/>
         </a:xfrm>
       </p:grpSpPr>
+      <p:sp>
+        <p:nvSpPr>
+          <p:cNvPr id="2" name="Title 1"/>
+          <p:cNvSpPr>
+            <a:spLocks noGrp="1"/>
+          </p:cNvSpPr>
+          <p:nvPr>
+            <p:ph type="title"/>
+          </p:nvPr>
+        </p:nvSpPr>
+        <p:spPr/>
+        <p:txBody>
+          <a:bodyPr/>
+          <a:lstStyle/>
+          <a:p>
+            <a:r>
+              <a:rPr lang="ru-RU" dirty="0"/>
+              <a:t>Стрельба по ногам - 1</a:t>
+            </a:r>
+            <a:endParaRPr lang="he-IL" dirty="0"/>
+          </a:p>
+        </p:txBody>
+      </p:sp>
       <p:pic>
         <p:nvPicPr>
-          <p:cNvPr id="5" name="Picture 4"/>
+          <p:cNvPr id="4" name="Picture 3"/>
           <p:cNvPicPr>
             <a:picLocks noChangeAspect="1"/>
           </p:cNvPicPr>
@@ -9348,72 +9750,24 @@
         </p:blipFill>
         <p:spPr>
           <a:xfrm>
-            <a:off x="0" y="1271239"/>
-            <a:ext cx="11950249" cy="3404431"/>
+            <a:off x="504674" y="2920110"/>
+            <a:ext cx="10779665" cy="2064486"/>
           </a:xfrm>
           <a:prstGeom prst="rect">
             <a:avLst/>
           </a:prstGeom>
         </p:spPr>
       </p:pic>
-      <p:pic>
-        <p:nvPicPr>
-          <p:cNvPr id="8198" name="Picture 6" descr="http://b.vimeocdn.com/ps/341/341641_300.jpg"/>
-          <p:cNvPicPr>
-            <a:picLocks noChangeAspect="1" noChangeArrowheads="1"/>
-          </p:cNvPicPr>
-          <p:nvPr/>
-        </p:nvPicPr>
-        <p:blipFill>
-          <a:blip r:embed="rId4">
-            <a:extLst>
-              <a:ext uri="{28A0092B-C50C-407E-A947-70E740481C1C}">
-                <a14:useLocalDpi xmlns:a14="http://schemas.microsoft.com/office/drawing/2010/main" val="0"/>
-              </a:ext>
-            </a:extLst>
-          </a:blip>
-          <a:srcRect/>
-          <a:stretch>
-            <a:fillRect/>
-          </a:stretch>
-        </p:blipFill>
-        <p:spPr bwMode="auto">
-          <a:xfrm>
-            <a:off x="10039673" y="144966"/>
-            <a:ext cx="1910576" cy="1910576"/>
-          </a:xfrm>
-          <a:prstGeom prst="rect">
-            <a:avLst/>
-          </a:prstGeom>
-          <a:noFill/>
-          <a:extLst>
-            <a:ext uri="{909E8E84-426E-40DD-AFC4-6F175D3DCCD1}">
-              <a14:hiddenFill xmlns:a14="http://schemas.microsoft.com/office/drawing/2010/main">
-                <a:solidFill>
-                  <a:srgbClr val="FFFFFF"/>
-                </a:solidFill>
-              </a14:hiddenFill>
-            </a:ext>
-          </a:extLst>
-        </p:spPr>
-      </p:pic>
     </p:spTree>
     <p:extLst>
       <p:ext uri="{BB962C8B-B14F-4D97-AF65-F5344CB8AC3E}">
-        <p14:creationId xmlns:p14="http://schemas.microsoft.com/office/powerpoint/2010/main" val="3886583958"/>
+        <p14:creationId xmlns:p14="http://schemas.microsoft.com/office/powerpoint/2010/main" val="2474478822"/>
       </p:ext>
     </p:extLst>
   </p:cSld>
   <p:clrMapOvr>
     <a:masterClrMapping/>
   </p:clrMapOvr>
-  <p:timing>
-    <p:tnLst>
-      <p:par>
-        <p:cTn id="1" dur="indefinite" restart="never" nodeType="tmRoot"/>
-      </p:par>
-    </p:tnLst>
-  </p:timing>
 </p:sld>
 </file>
 
@@ -9446,114 +9800,67 @@
         </p:nvSpPr>
         <p:spPr>
           <a:xfrm>
-            <a:off x="67632" y="0"/>
-            <a:ext cx="10058400" cy="1382751"/>
+            <a:off x="880276" y="412594"/>
+            <a:ext cx="10605479" cy="1569869"/>
           </a:xfrm>
         </p:spPr>
         <p:txBody>
-          <a:bodyPr/>
-          <a:lstStyle/>
-          <a:p>
-            <a:pPr algn="ctr"/>
-            <a:r>
-              <a:rPr lang="az-Cyrl-AZ" dirty="0" smtClean="0"/>
-              <a:t>Гарантии</a:t>
+          <a:bodyPr>
+            <a:normAutofit/>
+          </a:bodyPr>
+          <a:lstStyle/>
+          <a:p>
+            <a:pPr>
+              <a:lnSpc>
+                <a:spcPct val="100000"/>
+              </a:lnSpc>
+            </a:pPr>
+            <a:r>
+              <a:rPr lang="ru-RU" dirty="0"/>
+              <a:t>Стрельба по ногам - </a:t>
             </a:r>
             <a:r>
               <a:rPr lang="en-US" dirty="0" smtClean="0"/>
-              <a:t>…</a:t>
-            </a:r>
-            <a:endParaRPr lang="en-US" dirty="0"/>
-          </a:p>
-        </p:txBody>
-      </p:sp>
-      <p:sp>
-        <p:nvSpPr>
-          <p:cNvPr id="4" name="Rectangle 3"/>
-          <p:cNvSpPr/>
+              <a:t>2</a:t>
+            </a:r>
+            <a:endParaRPr lang="he-IL" dirty="0"/>
+          </a:p>
+        </p:txBody>
+      </p:sp>
+      <p:pic>
+        <p:nvPicPr>
+          <p:cNvPr id="4" name="Picture 3"/>
+          <p:cNvPicPr>
+            <a:picLocks noChangeAspect="1"/>
+          </p:cNvPicPr>
           <p:nvPr/>
-        </p:nvSpPr>
+        </p:nvPicPr>
+        <p:blipFill>
+          <a:blip r:embed="rId3"/>
+          <a:stretch>
+            <a:fillRect/>
+          </a:stretch>
+        </p:blipFill>
         <p:spPr>
           <a:xfrm>
-            <a:off x="67632" y="6211669"/>
-            <a:ext cx="6096000" cy="369332"/>
+            <a:off x="603916" y="2708467"/>
+            <a:ext cx="11158198" cy="2543757"/>
           </a:xfrm>
           <a:prstGeom prst="rect">
             <a:avLst/>
           </a:prstGeom>
         </p:spPr>
-        <p:txBody>
-          <a:bodyPr>
-            <a:spAutoFit/>
-          </a:bodyPr>
-          <a:lstStyle/>
-          <a:p>
-            <a:r>
-              <a:rPr lang="en-US" dirty="0"/>
-              <a:t>http://demotivatorium.ru/demotivators/d/21954/</a:t>
-            </a:r>
-            <a:endParaRPr lang="he-IL" dirty="0"/>
-          </a:p>
-        </p:txBody>
-      </p:sp>
-      <p:pic>
-        <p:nvPicPr>
-          <p:cNvPr id="1026" name="Picture 2" descr="2205131456237193.jpg (600×578)"/>
-          <p:cNvPicPr>
-            <a:picLocks noChangeAspect="1" noChangeArrowheads="1"/>
-          </p:cNvPicPr>
-          <p:nvPr/>
-        </p:nvPicPr>
-        <p:blipFill>
-          <a:blip r:embed="rId3">
-            <a:extLst>
-              <a:ext uri="{28A0092B-C50C-407E-A947-70E740481C1C}">
-                <a14:useLocalDpi xmlns:a14="http://schemas.microsoft.com/office/drawing/2010/main" val="0"/>
-              </a:ext>
-            </a:extLst>
-          </a:blip>
-          <a:srcRect/>
-          <a:stretch>
-            <a:fillRect/>
-          </a:stretch>
-        </p:blipFill>
-        <p:spPr bwMode="auto">
-          <a:xfrm>
-            <a:off x="2932771" y="1382751"/>
-            <a:ext cx="5373211" cy="4764469"/>
-          </a:xfrm>
-          <a:prstGeom prst="rect">
-            <a:avLst/>
-          </a:prstGeom>
-          <a:noFill/>
-          <a:extLst>
-            <a:ext uri="{909E8E84-426E-40DD-AFC4-6F175D3DCCD1}">
-              <a14:hiddenFill xmlns:a14="http://schemas.microsoft.com/office/drawing/2010/main">
-                <a:solidFill>
-                  <a:srgbClr val="FFFFFF"/>
-                </a:solidFill>
-              </a14:hiddenFill>
-            </a:ext>
-          </a:extLst>
-        </p:spPr>
       </p:pic>
     </p:spTree>
     <p:extLst>
       <p:ext uri="{BB962C8B-B14F-4D97-AF65-F5344CB8AC3E}">
-        <p14:creationId xmlns:p14="http://schemas.microsoft.com/office/powerpoint/2010/main" val="3286675224"/>
+        <p14:creationId xmlns:p14="http://schemas.microsoft.com/office/powerpoint/2010/main" val="2158490652"/>
       </p:ext>
     </p:extLst>
   </p:cSld>
   <p:clrMapOvr>
     <a:masterClrMapping/>
   </p:clrMapOvr>
-  <p:timing>
-    <p:tnLst>
-      <p:par>
-        <p:cTn id="1" dur="indefinite" restart="never" nodeType="tmRoot"/>
-      </p:par>
-    </p:tnLst>
-  </p:timing>
 </p:sld>
 </file>
 

</xml_diff>

<commit_message>
changed first & last slides to CodeFest template
</commit_message>
<xml_diff>
--- a/Codefest Presentation.pptx
+++ b/Codefest Presentation.pptx
@@ -8,7 +8,7 @@
     <p:notesMasterId r:id="rId23"/>
   </p:notesMasterIdLst>
   <p:sldIdLst>
-    <p:sldId id="256" r:id="rId2"/>
+    <p:sldId id="277" r:id="rId2"/>
     <p:sldId id="257" r:id="rId3"/>
     <p:sldId id="258" r:id="rId4"/>
     <p:sldId id="259" r:id="rId5"/>
@@ -28,7 +28,7 @@
     <p:sldId id="270" r:id="rId19"/>
     <p:sldId id="273" r:id="rId20"/>
     <p:sldId id="271" r:id="rId21"/>
-    <p:sldId id="272" r:id="rId22"/>
+    <p:sldId id="278" r:id="rId22"/>
   </p:sldIdLst>
   <p:sldSz cx="12192000" cy="6858000"/>
   <p:notesSz cx="6858000" cy="9144000"/>
@@ -217,7 +217,7 @@
           <a:p>
             <a:fld id="{A13B611B-96AC-4BD5-8EA9-B3805B7EAB0A}" type="datetimeFigureOut">
               <a:rPr lang="en-US" smtClean="0"/>
-              <a:t>3/25/2014</a:t>
+              <a:t>3/26/2014</a:t>
             </a:fld>
             <a:endParaRPr lang="en-US"/>
           </a:p>
@@ -488,6 +488,14 @@
 <file path=ppt/notesSlides/notesSlide1.xml><?xml version="1.0" encoding="utf-8"?>
 <p:notes xmlns:a="http://schemas.openxmlformats.org/drawingml/2006/main" xmlns:r="http://schemas.openxmlformats.org/officeDocument/2006/relationships" xmlns:p="http://schemas.openxmlformats.org/presentationml/2006/main">
   <p:cSld>
+    <p:bg>
+      <p:bgPr>
+        <a:solidFill>
+          <a:srgbClr val="FFFFFF"/>
+        </a:solidFill>
+        <a:effectLst/>
+      </p:bgPr>
+    </p:bg>
     <p:spTree>
       <p:nvGrpSpPr>
         <p:cNvPr id="1" name=""/>
@@ -504,54 +512,99 @@
       </p:grpSpPr>
       <p:sp>
         <p:nvSpPr>
-          <p:cNvPr id="2" name="Slide Image Placeholder 1"/>
-          <p:cNvSpPr>
-            <a:spLocks noGrp="1" noRot="1" noChangeAspect="1"/>
+          <p:cNvPr id="6145" name="Rectangle 1"/>
+          <p:cNvSpPr txBox="1">
+            <a:spLocks noChangeArrowheads="1"/>
           </p:cNvSpPr>
           <p:nvPr>
             <p:ph type="sldImg"/>
           </p:nvPr>
         </p:nvSpPr>
-        <p:spPr/>
-      </p:sp>
-      <p:sp>
-        <p:nvSpPr>
-          <p:cNvPr id="3" name="Notes Placeholder 2"/>
-          <p:cNvSpPr>
-            <a:spLocks noGrp="1"/>
+        <p:spPr bwMode="auto">
+          <a:xfrm>
+            <a:off x="381000" y="695325"/>
+            <a:ext cx="6096000" cy="3429000"/>
+          </a:xfrm>
+          <a:prstGeom prst="rect">
+            <a:avLst/>
+          </a:prstGeom>
+          <a:solidFill>
+            <a:srgbClr val="FFFFFF"/>
+          </a:solidFill>
+          <a:ln>
+            <a:solidFill>
+              <a:srgbClr val="000000"/>
+            </a:solidFill>
+            <a:miter lim="800000"/>
+            <a:headEnd/>
+            <a:tailEnd/>
+          </a:ln>
+          <a:extLst>
+            <a:ext uri="{AF507438-7753-43E0-B8FC-AC1667EBCBE1}">
+              <a14:hiddenEffects xmlns:a14="http://schemas.microsoft.com/office/drawing/2010/main">
+                <a:effectLst>
+                  <a:outerShdw dist="35921" dir="2700000" algn="ctr" rotWithShape="0">
+                    <a:srgbClr val="808080"/>
+                  </a:outerShdw>
+                </a:effectLst>
+              </a14:hiddenEffects>
+            </a:ext>
+          </a:extLst>
+        </p:spPr>
+      </p:sp>
+      <p:sp>
+        <p:nvSpPr>
+          <p:cNvPr id="6146" name="Rectangle 2"/>
+          <p:cNvSpPr txBox="1">
+            <a:spLocks noChangeArrowheads="1"/>
           </p:cNvSpPr>
           <p:nvPr>
             <p:ph type="body" idx="1"/>
           </p:nvPr>
         </p:nvSpPr>
-        <p:spPr/>
-        <p:txBody>
-          <a:bodyPr/>
+        <p:spPr bwMode="auto">
+          <a:xfrm>
+            <a:off x="685800" y="4343400"/>
+            <a:ext cx="5484813" cy="4114800"/>
+          </a:xfrm>
+          <a:prstGeom prst="rect">
+            <a:avLst/>
+          </a:prstGeom>
+          <a:noFill/>
+          <a:ln/>
+          <a:extLst>
+            <a:ext uri="{909E8E84-426E-40DD-AFC4-6F175D3DCCD1}">
+              <a14:hiddenFill xmlns:a14="http://schemas.microsoft.com/office/drawing/2010/main">
+                <a:solidFill>
+                  <a:srgbClr val="FFFFFF"/>
+                </a:solidFill>
+              </a14:hiddenFill>
+            </a:ext>
+            <a:ext uri="{91240B29-F687-4F45-9708-019B960494DF}">
+              <a14:hiddenLine xmlns:a14="http://schemas.microsoft.com/office/drawing/2010/main" w="9525">
+                <a:solidFill>
+                  <a:srgbClr val="000000"/>
+                </a:solidFill>
+                <a:round/>
+                <a:headEnd/>
+                <a:tailEnd/>
+              </a14:hiddenLine>
+            </a:ext>
+            <a:ext uri="{AF507438-7753-43E0-B8FC-AC1667EBCBE1}">
+              <a14:hiddenEffects xmlns:a14="http://schemas.microsoft.com/office/drawing/2010/main">
+                <a:effectLst>
+                  <a:outerShdw dist="35921" dir="2700000" algn="ctr" rotWithShape="0">
+                    <a:srgbClr val="808080"/>
+                  </a:outerShdw>
+                </a:effectLst>
+              </a14:hiddenEffects>
+            </a:ext>
+          </a:extLst>
+        </p:spPr>
+        <p:txBody>
+          <a:bodyPr wrap="none" anchor="ctr"/>
           <a:lstStyle/>
           <a:p>
-            <a:endParaRPr lang="en-US" dirty="0"/>
-          </a:p>
-        </p:txBody>
-      </p:sp>
-      <p:sp>
-        <p:nvSpPr>
-          <p:cNvPr id="4" name="Slide Number Placeholder 3"/>
-          <p:cNvSpPr>
-            <a:spLocks noGrp="1"/>
-          </p:cNvSpPr>
-          <p:nvPr>
-            <p:ph type="sldNum" sz="quarter" idx="10"/>
-          </p:nvPr>
-        </p:nvSpPr>
-        <p:spPr/>
-        <p:txBody>
-          <a:bodyPr/>
-          <a:lstStyle/>
-          <a:p>
-            <a:fld id="{B1DCD5A6-B3C0-4DBA-9305-6D43665D2DE2}" type="slidenum">
-              <a:rPr lang="en-US" smtClean="0"/>
-              <a:t>1</a:t>
-            </a:fld>
             <a:endParaRPr lang="en-US"/>
           </a:p>
         </p:txBody>
@@ -559,7 +612,7 @@
     </p:spTree>
     <p:extLst>
       <p:ext uri="{BB962C8B-B14F-4D97-AF65-F5344CB8AC3E}">
-        <p14:creationId xmlns:p14="http://schemas.microsoft.com/office/powerpoint/2010/main" val="3745470702"/>
+        <p14:creationId xmlns:p14="http://schemas.microsoft.com/office/powerpoint/2010/main" val="3072759677"/>
       </p:ext>
     </p:extLst>
   </p:cSld>
@@ -2347,6 +2400,143 @@
     <p:extLst>
       <p:ext uri="{BB962C8B-B14F-4D97-AF65-F5344CB8AC3E}">
         <p14:creationId xmlns:p14="http://schemas.microsoft.com/office/powerpoint/2010/main" val="1667014677"/>
+      </p:ext>
+    </p:extLst>
+  </p:cSld>
+  <p:clrMapOvr>
+    <a:masterClrMapping/>
+  </p:clrMapOvr>
+</p:notes>
+</file>
+
+<file path=ppt/notesSlides/notesSlide21.xml><?xml version="1.0" encoding="utf-8"?>
+<p:notes xmlns:a="http://schemas.openxmlformats.org/drawingml/2006/main" xmlns:r="http://schemas.openxmlformats.org/officeDocument/2006/relationships" xmlns:p="http://schemas.openxmlformats.org/presentationml/2006/main">
+  <p:cSld>
+    <p:bg>
+      <p:bgPr>
+        <a:solidFill>
+          <a:srgbClr val="FFFFFF"/>
+        </a:solidFill>
+        <a:effectLst/>
+      </p:bgPr>
+    </p:bg>
+    <p:spTree>
+      <p:nvGrpSpPr>
+        <p:cNvPr id="1" name=""/>
+        <p:cNvGrpSpPr/>
+        <p:nvPr/>
+      </p:nvGrpSpPr>
+      <p:grpSpPr>
+        <a:xfrm>
+          <a:off x="0" y="0"/>
+          <a:ext cx="0" cy="0"/>
+          <a:chOff x="0" y="0"/>
+          <a:chExt cx="0" cy="0"/>
+        </a:xfrm>
+      </p:grpSpPr>
+      <p:sp>
+        <p:nvSpPr>
+          <p:cNvPr id="6145" name="Rectangle 1"/>
+          <p:cNvSpPr txBox="1">
+            <a:spLocks noChangeArrowheads="1"/>
+          </p:cNvSpPr>
+          <p:nvPr>
+            <p:ph type="sldImg"/>
+          </p:nvPr>
+        </p:nvSpPr>
+        <p:spPr bwMode="auto">
+          <a:xfrm>
+            <a:off x="381000" y="695325"/>
+            <a:ext cx="6096000" cy="3429000"/>
+          </a:xfrm>
+          <a:prstGeom prst="rect">
+            <a:avLst/>
+          </a:prstGeom>
+          <a:solidFill>
+            <a:srgbClr val="FFFFFF"/>
+          </a:solidFill>
+          <a:ln>
+            <a:solidFill>
+              <a:srgbClr val="000000"/>
+            </a:solidFill>
+            <a:miter lim="800000"/>
+            <a:headEnd/>
+            <a:tailEnd/>
+          </a:ln>
+          <a:extLst>
+            <a:ext uri="{AF507438-7753-43E0-B8FC-AC1667EBCBE1}">
+              <a14:hiddenEffects xmlns:a14="http://schemas.microsoft.com/office/drawing/2010/main">
+                <a:effectLst>
+                  <a:outerShdw dist="35921" dir="2700000" algn="ctr" rotWithShape="0">
+                    <a:srgbClr val="808080"/>
+                  </a:outerShdw>
+                </a:effectLst>
+              </a14:hiddenEffects>
+            </a:ext>
+          </a:extLst>
+        </p:spPr>
+      </p:sp>
+      <p:sp>
+        <p:nvSpPr>
+          <p:cNvPr id="6146" name="Rectangle 2"/>
+          <p:cNvSpPr txBox="1">
+            <a:spLocks noChangeArrowheads="1"/>
+          </p:cNvSpPr>
+          <p:nvPr>
+            <p:ph type="body" idx="1"/>
+          </p:nvPr>
+        </p:nvSpPr>
+        <p:spPr bwMode="auto">
+          <a:xfrm>
+            <a:off x="685800" y="4343400"/>
+            <a:ext cx="5484813" cy="4114800"/>
+          </a:xfrm>
+          <a:prstGeom prst="rect">
+            <a:avLst/>
+          </a:prstGeom>
+          <a:noFill/>
+          <a:ln/>
+          <a:extLst>
+            <a:ext uri="{909E8E84-426E-40DD-AFC4-6F175D3DCCD1}">
+              <a14:hiddenFill xmlns:a14="http://schemas.microsoft.com/office/drawing/2010/main">
+                <a:solidFill>
+                  <a:srgbClr val="FFFFFF"/>
+                </a:solidFill>
+              </a14:hiddenFill>
+            </a:ext>
+            <a:ext uri="{91240B29-F687-4F45-9708-019B960494DF}">
+              <a14:hiddenLine xmlns:a14="http://schemas.microsoft.com/office/drawing/2010/main" w="9525">
+                <a:solidFill>
+                  <a:srgbClr val="000000"/>
+                </a:solidFill>
+                <a:round/>
+                <a:headEnd/>
+                <a:tailEnd/>
+              </a14:hiddenLine>
+            </a:ext>
+            <a:ext uri="{AF507438-7753-43E0-B8FC-AC1667EBCBE1}">
+              <a14:hiddenEffects xmlns:a14="http://schemas.microsoft.com/office/drawing/2010/main">
+                <a:effectLst>
+                  <a:outerShdw dist="35921" dir="2700000" algn="ctr" rotWithShape="0">
+                    <a:srgbClr val="808080"/>
+                  </a:outerShdw>
+                </a:effectLst>
+              </a14:hiddenEffects>
+            </a:ext>
+          </a:extLst>
+        </p:spPr>
+        <p:txBody>
+          <a:bodyPr wrap="none" anchor="ctr"/>
+          <a:lstStyle/>
+          <a:p>
+            <a:endParaRPr lang="en-US"/>
+          </a:p>
+        </p:txBody>
+      </p:sp>
+    </p:spTree>
+    <p:extLst>
+      <p:ext uri="{BB962C8B-B14F-4D97-AF65-F5344CB8AC3E}">
+        <p14:creationId xmlns:p14="http://schemas.microsoft.com/office/powerpoint/2010/main" val="2970479872"/>
       </p:ext>
     </p:extLst>
   </p:cSld>
@@ -3724,7 +3914,7 @@
           <a:p>
             <a:fld id="{511C50AA-C4DA-45F6-819C-324E7E1F0295}" type="datetimeFigureOut">
               <a:rPr lang="en-US" smtClean="0"/>
-              <a:t>3/25/2014</a:t>
+              <a:t>3/26/2014</a:t>
             </a:fld>
             <a:endParaRPr lang="en-US"/>
           </a:p>
@@ -3903,7 +4093,7 @@
           <a:p>
             <a:fld id="{511C50AA-C4DA-45F6-819C-324E7E1F0295}" type="datetimeFigureOut">
               <a:rPr lang="en-US" smtClean="0"/>
-              <a:t>3/25/2014</a:t>
+              <a:t>3/26/2014</a:t>
             </a:fld>
             <a:endParaRPr lang="en-US"/>
           </a:p>
@@ -4090,7 +4280,7 @@
           <a:p>
             <a:fld id="{511C50AA-C4DA-45F6-819C-324E7E1F0295}" type="datetimeFigureOut">
               <a:rPr lang="en-US" smtClean="0"/>
-              <a:t>3/25/2014</a:t>
+              <a:t>3/26/2014</a:t>
             </a:fld>
             <a:endParaRPr lang="en-US"/>
           </a:p>
@@ -4267,7 +4457,7 @@
           <a:p>
             <a:fld id="{511C50AA-C4DA-45F6-819C-324E7E1F0295}" type="datetimeFigureOut">
               <a:rPr lang="en-US" smtClean="0"/>
-              <a:t>3/25/2014</a:t>
+              <a:t>3/26/2014</a:t>
             </a:fld>
             <a:endParaRPr lang="en-US"/>
           </a:p>
@@ -4587,7 +4777,7 @@
           <a:p>
             <a:fld id="{511C50AA-C4DA-45F6-819C-324E7E1F0295}" type="datetimeFigureOut">
               <a:rPr lang="en-US" smtClean="0"/>
-              <a:t>3/25/2014</a:t>
+              <a:t>3/26/2014</a:t>
             </a:fld>
             <a:endParaRPr lang="en-US"/>
           </a:p>
@@ -4980,7 +5170,7 @@
           <a:p>
             <a:fld id="{511C50AA-C4DA-45F6-819C-324E7E1F0295}" type="datetimeFigureOut">
               <a:rPr lang="en-US" smtClean="0"/>
-              <a:t>3/25/2014</a:t>
+              <a:t>3/26/2014</a:t>
             </a:fld>
             <a:endParaRPr lang="en-US"/>
           </a:p>
@@ -5421,7 +5611,7 @@
           <a:p>
             <a:fld id="{511C50AA-C4DA-45F6-819C-324E7E1F0295}" type="datetimeFigureOut">
               <a:rPr lang="en-US" smtClean="0"/>
-              <a:t>3/25/2014</a:t>
+              <a:t>3/26/2014</a:t>
             </a:fld>
             <a:endParaRPr lang="en-US"/>
           </a:p>
@@ -5546,7 +5736,7 @@
           <a:p>
             <a:fld id="{511C50AA-C4DA-45F6-819C-324E7E1F0295}" type="datetimeFigureOut">
               <a:rPr lang="en-US" smtClean="0"/>
-              <a:t>3/25/2014</a:t>
+              <a:t>3/26/2014</a:t>
             </a:fld>
             <a:endParaRPr lang="en-US"/>
           </a:p>
@@ -5648,7 +5838,7 @@
           <a:p>
             <a:fld id="{511C50AA-C4DA-45F6-819C-324E7E1F0295}" type="datetimeFigureOut">
               <a:rPr lang="en-US" smtClean="0"/>
-              <a:t>3/25/2014</a:t>
+              <a:t>3/26/2014</a:t>
             </a:fld>
             <a:endParaRPr lang="en-US"/>
           </a:p>
@@ -6005,7 +6195,7 @@
           <a:p>
             <a:fld id="{511C50AA-C4DA-45F6-819C-324E7E1F0295}" type="datetimeFigureOut">
               <a:rPr lang="en-US" smtClean="0"/>
-              <a:t>3/25/2014</a:t>
+              <a:t>3/26/2014</a:t>
             </a:fld>
             <a:endParaRPr lang="en-US"/>
           </a:p>
@@ -6430,7 +6620,7 @@
           <a:p>
             <a:fld id="{511C50AA-C4DA-45F6-819C-324E7E1F0295}" type="datetimeFigureOut">
               <a:rPr lang="en-US" smtClean="0"/>
-              <a:t>3/25/2014</a:t>
+              <a:t>3/26/2014</a:t>
             </a:fld>
             <a:endParaRPr lang="en-US"/>
           </a:p>
@@ -6711,7 +6901,7 @@
           <a:p>
             <a:fld id="{511C50AA-C4DA-45F6-819C-324E7E1F0295}" type="datetimeFigureOut">
               <a:rPr lang="en-US" smtClean="0"/>
-              <a:t>3/25/2014</a:t>
+              <a:t>3/26/2014</a:t>
             </a:fld>
             <a:endParaRPr lang="en-US"/>
           </a:p>
@@ -7236,57 +7426,680 @@
           <a:chExt cx="0" cy="0"/>
         </a:xfrm>
       </p:grpSpPr>
-      <p:sp>
-        <p:nvSpPr>
-          <p:cNvPr id="2" name="Title 1"/>
-          <p:cNvSpPr>
-            <a:spLocks noGrp="1"/>
-          </p:cNvSpPr>
-          <p:nvPr>
-            <p:ph type="ctrTitle"/>
-          </p:nvPr>
-        </p:nvSpPr>
-        <p:spPr/>
+      <p:pic>
+        <p:nvPicPr>
+          <p:cNvPr id="3073" name="Picture 1"/>
+          <p:cNvPicPr>
+            <a:picLocks noChangeAspect="1" noChangeArrowheads="1"/>
+          </p:cNvPicPr>
+          <p:nvPr/>
+        </p:nvPicPr>
+        <p:blipFill>
+          <a:blip r:embed="rId3">
+            <a:extLst>
+              <a:ext uri="{28A0092B-C50C-407E-A947-70E740481C1C}">
+                <a14:useLocalDpi xmlns:a14="http://schemas.microsoft.com/office/drawing/2010/main" val="0"/>
+              </a:ext>
+            </a:extLst>
+          </a:blip>
+          <a:srcRect/>
+          <a:stretch>
+            <a:fillRect/>
+          </a:stretch>
+        </p:blipFill>
+        <p:spPr bwMode="auto">
+          <a:xfrm>
+            <a:off x="0" y="1"/>
+            <a:ext cx="12191999" cy="6867525"/>
+          </a:xfrm>
+          <a:prstGeom prst="rect">
+            <a:avLst/>
+          </a:prstGeom>
+          <a:noFill/>
+          <a:ln>
+            <a:noFill/>
+          </a:ln>
+          <a:effectLst/>
+          <a:extLst>
+            <a:ext uri="{909E8E84-426E-40DD-AFC4-6F175D3DCCD1}">
+              <a14:hiddenFill xmlns:a14="http://schemas.microsoft.com/office/drawing/2010/main">
+                <a:blipFill dpi="0" rotWithShape="0">
+                  <a:blip/>
+                  <a:srcRect/>
+                  <a:stretch>
+                    <a:fillRect/>
+                  </a:stretch>
+                </a:blipFill>
+              </a14:hiddenFill>
+            </a:ext>
+            <a:ext uri="{91240B29-F687-4F45-9708-019B960494DF}">
+              <a14:hiddenLine xmlns:a14="http://schemas.microsoft.com/office/drawing/2010/main" w="9525">
+                <a:solidFill>
+                  <a:srgbClr val="000000"/>
+                </a:solidFill>
+                <a:round/>
+                <a:headEnd/>
+                <a:tailEnd/>
+              </a14:hiddenLine>
+            </a:ext>
+            <a:ext uri="{AF507438-7753-43E0-B8FC-AC1667EBCBE1}">
+              <a14:hiddenEffects xmlns:a14="http://schemas.microsoft.com/office/drawing/2010/main">
+                <a:effectLst>
+                  <a:outerShdw dist="35921" dir="2700000" algn="ctr" rotWithShape="0">
+                    <a:srgbClr val="808080"/>
+                  </a:outerShdw>
+                </a:effectLst>
+              </a14:hiddenEffects>
+            </a:ext>
+          </a:extLst>
+        </p:spPr>
+      </p:pic>
+      <p:sp>
+        <p:nvSpPr>
+          <p:cNvPr id="3076" name="Rectangle 4"/>
+          <p:cNvSpPr>
+            <a:spLocks noChangeArrowheads="1"/>
+          </p:cNvSpPr>
+          <p:nvPr/>
+        </p:nvSpPr>
+        <p:spPr bwMode="auto">
+          <a:xfrm>
+            <a:off x="0" y="-46304"/>
+            <a:ext cx="12177686" cy="251588"/>
+          </a:xfrm>
+          <a:prstGeom prst="rect">
+            <a:avLst/>
+          </a:prstGeom>
+          <a:solidFill>
+            <a:srgbClr val="009BE9"/>
+          </a:solidFill>
+          <a:ln>
+            <a:noFill/>
+          </a:ln>
+          <a:effectLst/>
+          <a:extLst>
+            <a:ext uri="{91240B29-F687-4F45-9708-019B960494DF}">
+              <a14:hiddenLine xmlns:a14="http://schemas.microsoft.com/office/drawing/2010/main" w="9525">
+                <a:solidFill>
+                  <a:srgbClr val="000000"/>
+                </a:solidFill>
+                <a:round/>
+                <a:headEnd/>
+                <a:tailEnd/>
+              </a14:hiddenLine>
+            </a:ext>
+            <a:ext uri="{AF507438-7753-43E0-B8FC-AC1667EBCBE1}">
+              <a14:hiddenEffects xmlns:a14="http://schemas.microsoft.com/office/drawing/2010/main">
+                <a:effectLst>
+                  <a:outerShdw dist="35921" dir="2700000" algn="ctr" rotWithShape="0">
+                    <a:srgbClr val="808080"/>
+                  </a:outerShdw>
+                </a:effectLst>
+              </a14:hiddenEffects>
+            </a:ext>
+          </a:extLst>
+        </p:spPr>
+        <p:txBody>
+          <a:bodyPr wrap="none" anchor="ctr"/>
+          <a:lstStyle/>
+          <a:p>
+            <a:endParaRPr lang="en-US"/>
+          </a:p>
+        </p:txBody>
+      </p:sp>
+      <p:sp>
+        <p:nvSpPr>
+          <p:cNvPr id="3077" name="Rectangle 5"/>
+          <p:cNvSpPr>
+            <a:spLocks noChangeArrowheads="1"/>
+          </p:cNvSpPr>
+          <p:nvPr/>
+        </p:nvSpPr>
+        <p:spPr bwMode="auto">
+          <a:xfrm>
+            <a:off x="0" y="6696075"/>
+            <a:ext cx="12087922" cy="249733"/>
+          </a:xfrm>
+          <a:prstGeom prst="rect">
+            <a:avLst/>
+          </a:prstGeom>
+          <a:solidFill>
+            <a:srgbClr val="009BE9"/>
+          </a:solidFill>
+          <a:ln>
+            <a:noFill/>
+          </a:ln>
+          <a:effectLst/>
+          <a:extLst>
+            <a:ext uri="{91240B29-F687-4F45-9708-019B960494DF}">
+              <a14:hiddenLine xmlns:a14="http://schemas.microsoft.com/office/drawing/2010/main" w="9525">
+                <a:solidFill>
+                  <a:srgbClr val="000000"/>
+                </a:solidFill>
+                <a:round/>
+                <a:headEnd/>
+                <a:tailEnd/>
+              </a14:hiddenLine>
+            </a:ext>
+            <a:ext uri="{AF507438-7753-43E0-B8FC-AC1667EBCBE1}">
+              <a14:hiddenEffects xmlns:a14="http://schemas.microsoft.com/office/drawing/2010/main">
+                <a:effectLst>
+                  <a:outerShdw dist="35921" dir="2700000" algn="ctr" rotWithShape="0">
+                    <a:srgbClr val="808080"/>
+                  </a:outerShdw>
+                </a:effectLst>
+              </a14:hiddenEffects>
+            </a:ext>
+          </a:extLst>
+        </p:spPr>
+        <p:txBody>
+          <a:bodyPr wrap="none" anchor="ctr"/>
+          <a:lstStyle/>
+          <a:p>
+            <a:endParaRPr lang="en-US"/>
+          </a:p>
+        </p:txBody>
+      </p:sp>
+      <p:sp>
+        <p:nvSpPr>
+          <p:cNvPr id="3078" name="Rectangle 6"/>
+          <p:cNvSpPr>
+            <a:spLocks noChangeArrowheads="1"/>
+          </p:cNvSpPr>
+          <p:nvPr/>
+        </p:nvSpPr>
+        <p:spPr bwMode="auto">
+          <a:xfrm>
+            <a:off x="4875" y="26989"/>
+            <a:ext cx="179388" cy="6858000"/>
+          </a:xfrm>
+          <a:prstGeom prst="rect">
+            <a:avLst/>
+          </a:prstGeom>
+          <a:solidFill>
+            <a:srgbClr val="009BE9"/>
+          </a:solidFill>
+          <a:ln>
+            <a:noFill/>
+          </a:ln>
+          <a:effectLst/>
+          <a:extLst>
+            <a:ext uri="{91240B29-F687-4F45-9708-019B960494DF}">
+              <a14:hiddenLine xmlns:a14="http://schemas.microsoft.com/office/drawing/2010/main" w="9525">
+                <a:solidFill>
+                  <a:srgbClr val="000000"/>
+                </a:solidFill>
+                <a:round/>
+                <a:headEnd/>
+                <a:tailEnd/>
+              </a14:hiddenLine>
+            </a:ext>
+            <a:ext uri="{AF507438-7753-43E0-B8FC-AC1667EBCBE1}">
+              <a14:hiddenEffects xmlns:a14="http://schemas.microsoft.com/office/drawing/2010/main">
+                <a:effectLst>
+                  <a:outerShdw dist="35921" dir="2700000" algn="ctr" rotWithShape="0">
+                    <a:srgbClr val="808080"/>
+                  </a:outerShdw>
+                </a:effectLst>
+              </a14:hiddenEffects>
+            </a:ext>
+          </a:extLst>
+        </p:spPr>
+        <p:txBody>
+          <a:bodyPr wrap="none" anchor="ctr"/>
+          <a:lstStyle/>
+          <a:p>
+            <a:endParaRPr lang="en-US"/>
+          </a:p>
+        </p:txBody>
+      </p:sp>
+      <p:sp>
+        <p:nvSpPr>
+          <p:cNvPr id="3079" name="Rectangle 7"/>
+          <p:cNvSpPr>
+            <a:spLocks noChangeArrowheads="1"/>
+          </p:cNvSpPr>
+          <p:nvPr/>
+        </p:nvSpPr>
+        <p:spPr bwMode="auto">
+          <a:xfrm>
+            <a:off x="12010310" y="1"/>
+            <a:ext cx="179388" cy="6884988"/>
+          </a:xfrm>
+          <a:prstGeom prst="rect">
+            <a:avLst/>
+          </a:prstGeom>
+          <a:solidFill>
+            <a:srgbClr val="009BE9"/>
+          </a:solidFill>
+          <a:ln>
+            <a:noFill/>
+          </a:ln>
+          <a:effectLst/>
+          <a:extLst>
+            <a:ext uri="{91240B29-F687-4F45-9708-019B960494DF}">
+              <a14:hiddenLine xmlns:a14="http://schemas.microsoft.com/office/drawing/2010/main" w="9525">
+                <a:solidFill>
+                  <a:srgbClr val="000000"/>
+                </a:solidFill>
+                <a:round/>
+                <a:headEnd/>
+                <a:tailEnd/>
+              </a14:hiddenLine>
+            </a:ext>
+            <a:ext uri="{AF507438-7753-43E0-B8FC-AC1667EBCBE1}">
+              <a14:hiddenEffects xmlns:a14="http://schemas.microsoft.com/office/drawing/2010/main">
+                <a:effectLst>
+                  <a:outerShdw dist="35921" dir="2700000" algn="ctr" rotWithShape="0">
+                    <a:srgbClr val="808080"/>
+                  </a:outerShdw>
+                </a:effectLst>
+              </a14:hiddenEffects>
+            </a:ext>
+          </a:extLst>
+        </p:spPr>
+        <p:txBody>
+          <a:bodyPr wrap="none" anchor="ctr"/>
+          <a:lstStyle/>
+          <a:p>
+            <a:endParaRPr lang="en-US"/>
+          </a:p>
+        </p:txBody>
+      </p:sp>
+      <p:pic>
+        <p:nvPicPr>
+          <p:cNvPr id="3080" name="Picture 8"/>
+          <p:cNvPicPr>
+            <a:picLocks noChangeAspect="1" noChangeArrowheads="1"/>
+          </p:cNvPicPr>
+          <p:nvPr/>
+        </p:nvPicPr>
+        <p:blipFill>
+          <a:blip r:embed="rId4">
+            <a:extLst>
+              <a:ext uri="{28A0092B-C50C-407E-A947-70E740481C1C}">
+                <a14:useLocalDpi xmlns:a14="http://schemas.microsoft.com/office/drawing/2010/main" val="0"/>
+              </a:ext>
+            </a:extLst>
+          </a:blip>
+          <a:srcRect/>
+          <a:stretch>
+            <a:fillRect/>
+          </a:stretch>
+        </p:blipFill>
+        <p:spPr bwMode="auto">
+          <a:xfrm>
+            <a:off x="839659" y="593179"/>
+            <a:ext cx="1428750" cy="1905000"/>
+          </a:xfrm>
+          <a:prstGeom prst="rect">
+            <a:avLst/>
+          </a:prstGeom>
+          <a:noFill/>
+          <a:ln>
+            <a:noFill/>
+          </a:ln>
+          <a:effectLst/>
+          <a:extLst>
+            <a:ext uri="{909E8E84-426E-40DD-AFC4-6F175D3DCCD1}">
+              <a14:hiddenFill xmlns:a14="http://schemas.microsoft.com/office/drawing/2010/main">
+                <a:blipFill dpi="0" rotWithShape="0">
+                  <a:blip/>
+                  <a:srcRect/>
+                  <a:stretch>
+                    <a:fillRect/>
+                  </a:stretch>
+                </a:blipFill>
+              </a14:hiddenFill>
+            </a:ext>
+            <a:ext uri="{91240B29-F687-4F45-9708-019B960494DF}">
+              <a14:hiddenLine xmlns:a14="http://schemas.microsoft.com/office/drawing/2010/main" w="9525">
+                <a:solidFill>
+                  <a:srgbClr val="000000"/>
+                </a:solidFill>
+                <a:round/>
+                <a:headEnd/>
+                <a:tailEnd/>
+              </a14:hiddenLine>
+            </a:ext>
+            <a:ext uri="{AF507438-7753-43E0-B8FC-AC1667EBCBE1}">
+              <a14:hiddenEffects xmlns:a14="http://schemas.microsoft.com/office/drawing/2010/main">
+                <a:effectLst>
+                  <a:outerShdw dist="35921" dir="2700000" algn="ctr" rotWithShape="0">
+                    <a:srgbClr val="808080"/>
+                  </a:outerShdw>
+                </a:effectLst>
+              </a14:hiddenEffects>
+            </a:ext>
+          </a:extLst>
+        </p:spPr>
+      </p:pic>
+      <p:sp>
+        <p:nvSpPr>
+          <p:cNvPr id="10" name="Title 1"/>
+          <p:cNvSpPr txBox="1">
+            <a:spLocks/>
+          </p:cNvSpPr>
+          <p:nvPr/>
+        </p:nvSpPr>
+        <p:spPr>
+          <a:xfrm>
+            <a:off x="2486321" y="2622451"/>
+            <a:ext cx="8196147" cy="3035808"/>
+          </a:xfrm>
+          <a:prstGeom prst="rect">
+            <a:avLst/>
+          </a:prstGeom>
+        </p:spPr>
         <p:txBody>
           <a:bodyPr/>
-          <a:lstStyle/>
-          <a:p>
-            <a:r>
-              <a:rPr lang="en-US" dirty="0" smtClean="0"/>
+          <a:lstStyle>
+            <a:lvl1pPr algn="l" defTabSz="914400" rtl="0" eaLnBrk="1" latinLnBrk="0" hangingPunct="1">
+              <a:lnSpc>
+                <a:spcPct val="90000"/>
+              </a:lnSpc>
+              <a:spcBef>
+                <a:spcPct val="0"/>
+              </a:spcBef>
+              <a:buNone/>
+              <a:defRPr sz="5400" kern="1200" cap="all" baseline="0">
+                <a:blipFill>
+                  <a:blip r:embed="rId5">
+                    <a:extLst>
+                      <a:ext uri="{28A0092B-C50C-407E-A947-70E740481C1C}">
+                        <a14:useLocalDpi xmlns:a14="http://schemas.microsoft.com/office/drawing/2010/main" val="0"/>
+                      </a:ext>
+                    </a:extLst>
+                  </a:blip>
+                  <a:tile tx="6350" ty="-127000" sx="65000" sy="64000" flip="none" algn="tl"/>
+                </a:blipFill>
+                <a:latin typeface="+mj-lt"/>
+                <a:ea typeface="+mj-ea"/>
+                <a:cs typeface="+mj-cs"/>
+              </a:defRPr>
+            </a:lvl1pPr>
+          </a:lstStyle>
+          <a:p>
+            <a:r>
+              <a:rPr lang="en-US" sz="8000" dirty="0" smtClean="0"/>
               <a:t>RavenDB 3.0</a:t>
             </a:r>
-            <a:endParaRPr lang="en-US" dirty="0"/>
-          </a:p>
-        </p:txBody>
-      </p:sp>
-      <p:sp>
-        <p:nvSpPr>
-          <p:cNvPr id="3" name="Subtitle 2"/>
-          <p:cNvSpPr>
-            <a:spLocks noGrp="1"/>
-          </p:cNvSpPr>
-          <p:nvPr>
-            <p:ph type="subTitle" idx="1"/>
-          </p:nvPr>
-        </p:nvSpPr>
-        <p:spPr/>
+            <a:endParaRPr lang="en-US" sz="8000" dirty="0"/>
+          </a:p>
+        </p:txBody>
+      </p:sp>
+      <p:sp>
+        <p:nvSpPr>
+          <p:cNvPr id="11" name="Subtitle 2"/>
+          <p:cNvSpPr txBox="1">
+            <a:spLocks/>
+          </p:cNvSpPr>
+          <p:nvPr/>
+        </p:nvSpPr>
+        <p:spPr>
+          <a:xfrm>
+            <a:off x="1816980" y="4801436"/>
+            <a:ext cx="7891272" cy="1069848"/>
+          </a:xfrm>
+          <a:prstGeom prst="rect">
+            <a:avLst/>
+          </a:prstGeom>
+        </p:spPr>
         <p:txBody>
           <a:bodyPr>
-            <a:normAutofit fontScale="92500" lnSpcReduction="20000"/>
+            <a:normAutofit/>
           </a:bodyPr>
-          <a:lstStyle/>
-          <a:p>
-            <a:r>
-              <a:rPr lang="az-Cyrl-AZ" dirty="0">
-                <a:cs typeface="+mj-cs"/>
-              </a:rPr>
-              <a:t>Михаил </a:t>
-            </a:r>
+          <a:lstStyle>
+            <a:lvl1pPr marL="182880" indent="-182880" algn="l" defTabSz="914400" rtl="0" eaLnBrk="1" latinLnBrk="0" hangingPunct="1">
+              <a:lnSpc>
+                <a:spcPct val="90000"/>
+              </a:lnSpc>
+              <a:spcBef>
+                <a:spcPts val="1200"/>
+              </a:spcBef>
+              <a:buClr>
+                <a:schemeClr val="accent1">
+                  <a:lumMod val="75000"/>
+                </a:schemeClr>
+              </a:buClr>
+              <a:buSzPct val="85000"/>
+              <a:buFont typeface="Wingdings" pitchFamily="2" charset="2"/>
+              <a:buChar char="§"/>
+              <a:defRPr sz="2000" kern="1200">
+                <a:solidFill>
+                  <a:schemeClr val="tx1"/>
+                </a:solidFill>
+                <a:latin typeface="+mn-lt"/>
+                <a:ea typeface="+mn-ea"/>
+                <a:cs typeface="+mn-cs"/>
+              </a:defRPr>
+            </a:lvl1pPr>
+            <a:lvl2pPr marL="457200" indent="-182880" algn="l" defTabSz="914400" rtl="0" eaLnBrk="1" latinLnBrk="0" hangingPunct="1">
+              <a:lnSpc>
+                <a:spcPct val="90000"/>
+              </a:lnSpc>
+              <a:spcBef>
+                <a:spcPts val="400"/>
+              </a:spcBef>
+              <a:spcAft>
+                <a:spcPts val="200"/>
+              </a:spcAft>
+              <a:buClr>
+                <a:schemeClr val="accent1">
+                  <a:lumMod val="75000"/>
+                </a:schemeClr>
+              </a:buClr>
+              <a:buSzPct val="85000"/>
+              <a:buFont typeface="Wingdings" pitchFamily="2" charset="2"/>
+              <a:buChar char="§"/>
+              <a:defRPr sz="1800" kern="1200">
+                <a:solidFill>
+                  <a:schemeClr val="tx1"/>
+                </a:solidFill>
+                <a:latin typeface="+mn-lt"/>
+                <a:ea typeface="+mn-ea"/>
+                <a:cs typeface="+mn-cs"/>
+              </a:defRPr>
+            </a:lvl2pPr>
+            <a:lvl3pPr marL="731520" indent="-182880" algn="l" defTabSz="914400" rtl="0" eaLnBrk="1" latinLnBrk="0" hangingPunct="1">
+              <a:lnSpc>
+                <a:spcPct val="90000"/>
+              </a:lnSpc>
+              <a:spcBef>
+                <a:spcPts val="400"/>
+              </a:spcBef>
+              <a:spcAft>
+                <a:spcPts val="200"/>
+              </a:spcAft>
+              <a:buClr>
+                <a:schemeClr val="accent1">
+                  <a:lumMod val="75000"/>
+                </a:schemeClr>
+              </a:buClr>
+              <a:buSzPct val="85000"/>
+              <a:buFont typeface="Wingdings" pitchFamily="2" charset="2"/>
+              <a:buChar char="§"/>
+              <a:defRPr sz="1600" kern="1200">
+                <a:solidFill>
+                  <a:schemeClr val="tx1"/>
+                </a:solidFill>
+                <a:latin typeface="+mn-lt"/>
+                <a:ea typeface="+mn-ea"/>
+                <a:cs typeface="+mn-cs"/>
+              </a:defRPr>
+            </a:lvl3pPr>
+            <a:lvl4pPr marL="1005840" indent="-182880" algn="l" defTabSz="914400" rtl="0" eaLnBrk="1" latinLnBrk="0" hangingPunct="1">
+              <a:lnSpc>
+                <a:spcPct val="90000"/>
+              </a:lnSpc>
+              <a:spcBef>
+                <a:spcPts val="400"/>
+              </a:spcBef>
+              <a:spcAft>
+                <a:spcPts val="200"/>
+              </a:spcAft>
+              <a:buClr>
+                <a:schemeClr val="accent1">
+                  <a:lumMod val="75000"/>
+                </a:schemeClr>
+              </a:buClr>
+              <a:buSzPct val="85000"/>
+              <a:buFont typeface="Wingdings" pitchFamily="2" charset="2"/>
+              <a:buChar char="§"/>
+              <a:defRPr sz="1600" kern="1200">
+                <a:solidFill>
+                  <a:schemeClr val="tx1"/>
+                </a:solidFill>
+                <a:latin typeface="+mn-lt"/>
+                <a:ea typeface="+mn-ea"/>
+                <a:cs typeface="+mn-cs"/>
+              </a:defRPr>
+            </a:lvl4pPr>
+            <a:lvl5pPr marL="1280160" indent="-182880" algn="l" defTabSz="914400" rtl="0" eaLnBrk="1" latinLnBrk="0" hangingPunct="1">
+              <a:lnSpc>
+                <a:spcPct val="90000"/>
+              </a:lnSpc>
+              <a:spcBef>
+                <a:spcPts val="400"/>
+              </a:spcBef>
+              <a:spcAft>
+                <a:spcPts val="200"/>
+              </a:spcAft>
+              <a:buClr>
+                <a:schemeClr val="accent1">
+                  <a:lumMod val="75000"/>
+                </a:schemeClr>
+              </a:buClr>
+              <a:buSzPct val="85000"/>
+              <a:buFont typeface="Wingdings" pitchFamily="2" charset="2"/>
+              <a:buChar char="§"/>
+              <a:defRPr sz="1600" kern="1200">
+                <a:solidFill>
+                  <a:schemeClr val="tx1"/>
+                </a:solidFill>
+                <a:latin typeface="+mn-lt"/>
+                <a:ea typeface="+mn-ea"/>
+                <a:cs typeface="+mn-cs"/>
+              </a:defRPr>
+            </a:lvl5pPr>
+            <a:lvl6pPr marL="1600000" indent="-228600" algn="l" defTabSz="914400" rtl="0" eaLnBrk="1" latinLnBrk="0" hangingPunct="1">
+              <a:lnSpc>
+                <a:spcPct val="90000"/>
+              </a:lnSpc>
+              <a:spcBef>
+                <a:spcPts val="400"/>
+              </a:spcBef>
+              <a:spcAft>
+                <a:spcPts val="200"/>
+              </a:spcAft>
+              <a:buClr>
+                <a:schemeClr val="accent1">
+                  <a:lumMod val="75000"/>
+                </a:schemeClr>
+              </a:buClr>
+              <a:buSzPct val="85000"/>
+              <a:buFont typeface="Wingdings" pitchFamily="2" charset="2"/>
+              <a:buChar char="§"/>
+              <a:defRPr sz="1600" kern="1200">
+                <a:solidFill>
+                  <a:schemeClr val="tx1"/>
+                </a:solidFill>
+                <a:latin typeface="+mn-lt"/>
+                <a:ea typeface="+mn-ea"/>
+                <a:cs typeface="+mn-cs"/>
+              </a:defRPr>
+            </a:lvl6pPr>
+            <a:lvl7pPr marL="1900000" indent="-228600" algn="l" defTabSz="914400" rtl="0" eaLnBrk="1" latinLnBrk="0" hangingPunct="1">
+              <a:lnSpc>
+                <a:spcPct val="90000"/>
+              </a:lnSpc>
+              <a:spcBef>
+                <a:spcPts val="400"/>
+              </a:spcBef>
+              <a:spcAft>
+                <a:spcPts val="200"/>
+              </a:spcAft>
+              <a:buClr>
+                <a:schemeClr val="accent1">
+                  <a:lumMod val="75000"/>
+                </a:schemeClr>
+              </a:buClr>
+              <a:buSzPct val="85000"/>
+              <a:buFont typeface="Wingdings" pitchFamily="2" charset="2"/>
+              <a:buChar char="§"/>
+              <a:defRPr sz="1600" kern="1200">
+                <a:solidFill>
+                  <a:schemeClr val="tx1"/>
+                </a:solidFill>
+                <a:latin typeface="+mn-lt"/>
+                <a:ea typeface="+mn-ea"/>
+                <a:cs typeface="+mn-cs"/>
+              </a:defRPr>
+            </a:lvl7pPr>
+            <a:lvl8pPr marL="2200000" indent="-228600" algn="l" defTabSz="914400" rtl="0" eaLnBrk="1" latinLnBrk="0" hangingPunct="1">
+              <a:lnSpc>
+                <a:spcPct val="90000"/>
+              </a:lnSpc>
+              <a:spcBef>
+                <a:spcPts val="400"/>
+              </a:spcBef>
+              <a:spcAft>
+                <a:spcPts val="200"/>
+              </a:spcAft>
+              <a:buClr>
+                <a:schemeClr val="accent1">
+                  <a:lumMod val="75000"/>
+                </a:schemeClr>
+              </a:buClr>
+              <a:buSzPct val="85000"/>
+              <a:buFont typeface="Wingdings" pitchFamily="2" charset="2"/>
+              <a:buChar char="§"/>
+              <a:defRPr sz="1600" kern="1200">
+                <a:solidFill>
+                  <a:schemeClr val="tx1"/>
+                </a:solidFill>
+                <a:latin typeface="+mn-lt"/>
+                <a:ea typeface="+mn-ea"/>
+                <a:cs typeface="+mn-cs"/>
+              </a:defRPr>
+            </a:lvl8pPr>
+            <a:lvl9pPr marL="2500000" indent="-228600" algn="l" defTabSz="914400" rtl="0" eaLnBrk="1" latinLnBrk="0" hangingPunct="1">
+              <a:lnSpc>
+                <a:spcPct val="90000"/>
+              </a:lnSpc>
+              <a:spcBef>
+                <a:spcPts val="400"/>
+              </a:spcBef>
+              <a:spcAft>
+                <a:spcPts val="200"/>
+              </a:spcAft>
+              <a:buClr>
+                <a:schemeClr val="accent1">
+                  <a:lumMod val="75000"/>
+                </a:schemeClr>
+              </a:buClr>
+              <a:buSzPct val="85000"/>
+              <a:buFont typeface="Wingdings" pitchFamily="2" charset="2"/>
+              <a:buChar char="§"/>
+              <a:defRPr sz="1600" kern="1200">
+                <a:solidFill>
+                  <a:schemeClr val="tx1"/>
+                </a:solidFill>
+                <a:latin typeface="+mn-lt"/>
+                <a:ea typeface="+mn-ea"/>
+                <a:cs typeface="+mn-cs"/>
+              </a:defRPr>
+            </a:lvl9pPr>
+          </a:lstStyle>
+          <a:p>
+            <a:pPr marL="0" indent="0">
+              <a:buNone/>
+            </a:pPr>
             <a:r>
               <a:rPr lang="az-Cyrl-AZ" dirty="0" smtClean="0">
                 <a:cs typeface="+mj-cs"/>
               </a:rPr>
-              <a:t>Ярийчук</a:t>
+              <a:t>Михаил Ярийчук</a:t>
             </a:r>
             <a:endParaRPr lang="en-US" dirty="0" smtClean="0">
               <a:latin typeface="Rockwell" panose="02060603020205020403" pitchFamily="18" charset="0"/>
@@ -7294,30 +8107,26 @@
             </a:endParaRPr>
           </a:p>
           <a:p>
+            <a:pPr marL="0" indent="0">
+              <a:buNone/>
+            </a:pPr>
             <a:r>
               <a:rPr lang="en-US" dirty="0" smtClean="0"/>
               <a:t>Hibernating Rhinos</a:t>
             </a:r>
           </a:p>
-          <a:p>
-            <a:r>
-              <a:rPr lang="en-US" dirty="0" smtClean="0"/>
-              <a:t>michael.yarichuk@hibernatingrhinos.com</a:t>
-            </a:r>
-            <a:endParaRPr lang="en-US" dirty="0"/>
-          </a:p>
         </p:txBody>
       </p:sp>
       <p:pic>
         <p:nvPicPr>
-          <p:cNvPr id="4" name="Content Placeholder 5"/>
+          <p:cNvPr id="12" name="Content Placeholder 5"/>
           <p:cNvPicPr>
             <a:picLocks noChangeAspect="1"/>
           </p:cNvPicPr>
           <p:nvPr/>
         </p:nvPicPr>
         <p:blipFill>
-          <a:blip r:embed="rId3" cstate="print">
+          <a:blip r:embed="rId6" cstate="print">
             <a:extLst>
               <a:ext uri="{28A0092B-C50C-407E-A947-70E740481C1C}">
                 <a14:useLocalDpi xmlns:a14="http://schemas.microsoft.com/office/drawing/2010/main" val="0"/>
@@ -7330,7 +8139,7 @@
         </p:blipFill>
         <p:spPr>
           <a:xfrm>
-            <a:off x="6311155" y="1507264"/>
+            <a:off x="6529309" y="1863977"/>
             <a:ext cx="4835816" cy="2596407"/>
           </a:xfrm>
           <a:prstGeom prst="rect">
@@ -7340,14 +8149,14 @@
       </p:pic>
       <p:pic>
         <p:nvPicPr>
-          <p:cNvPr id="5" name="Picture 4"/>
+          <p:cNvPr id="13" name="Picture 12"/>
           <p:cNvPicPr>
             <a:picLocks noChangeAspect="1"/>
           </p:cNvPicPr>
           <p:nvPr/>
         </p:nvPicPr>
         <p:blipFill>
-          <a:blip r:embed="rId4">
+          <a:blip r:embed="rId7">
             <a:extLst>
               <a:ext uri="{28A0092B-C50C-407E-A947-70E740481C1C}">
                 <a14:useLocalDpi xmlns:a14="http://schemas.microsoft.com/office/drawing/2010/main" val="0"/>
@@ -7360,7 +8169,7 @@
         </p:blipFill>
         <p:spPr>
           <a:xfrm>
-            <a:off x="9767886" y="4162425"/>
+            <a:off x="10383505" y="4425916"/>
             <a:ext cx="850107" cy="947737"/>
           </a:xfrm>
           <a:prstGeom prst="rect">
@@ -7371,17 +8180,38 @@
     </p:spTree>
     <p:extLst>
       <p:ext uri="{BB962C8B-B14F-4D97-AF65-F5344CB8AC3E}">
-        <p14:creationId xmlns:p14="http://schemas.microsoft.com/office/powerpoint/2010/main" val="2502155433"/>
+        <p14:creationId xmlns:p14="http://schemas.microsoft.com/office/powerpoint/2010/main" val="3431117462"/>
       </p:ext>
     </p:extLst>
   </p:cSld>
   <p:clrMapOvr>
     <a:masterClrMapping/>
   </p:clrMapOvr>
+  <p:transition spd="med"/>
   <p:timing>
     <p:tnLst>
       <p:par>
-        <p:cTn id="1" dur="indefinite" restart="never" nodeType="tmRoot"/>
+        <p:cTn id="1" dur="indefinite" restart="never" nodeType="tmRoot">
+          <p:childTnLst>
+            <p:seq concurrent="1" nextAc="seek">
+              <p:cTn id="2" dur="indefinite" nodeType="mainSeq"/>
+              <p:prevCondLst>
+                <p:cond evt="onPrev" delay="0">
+                  <p:tgtEl>
+                    <p:sldTgt/>
+                  </p:tgtEl>
+                </p:cond>
+              </p:prevCondLst>
+              <p:nextCondLst>
+                <p:cond evt="onNext" delay="0">
+                  <p:tgtEl>
+                    <p:sldTgt/>
+                  </p:tgtEl>
+                </p:cond>
+              </p:nextCondLst>
+            </p:seq>
+          </p:childTnLst>
+        </p:cTn>
       </p:par>
     </p:tnLst>
   </p:timing>
@@ -8832,52 +9662,16 @@
           <a:chExt cx="0" cy="0"/>
         </a:xfrm>
       </p:grpSpPr>
-      <p:sp>
-        <p:nvSpPr>
-          <p:cNvPr id="6" name="Text Placeholder 5"/>
-          <p:cNvSpPr>
-            <a:spLocks noGrp="1"/>
-          </p:cNvSpPr>
-          <p:nvPr>
-            <p:ph type="body" idx="1"/>
-          </p:nvPr>
-        </p:nvSpPr>
-        <p:spPr>
-          <a:xfrm>
-            <a:off x="282333" y="979217"/>
-            <a:ext cx="9052560" cy="1066800"/>
-          </a:xfrm>
-        </p:spPr>
-        <p:txBody>
-          <a:bodyPr>
-            <a:normAutofit/>
-          </a:bodyPr>
-          <a:lstStyle/>
-          <a:p>
-            <a:r>
-              <a:rPr lang="az-Cyrl-AZ" sz="5400" dirty="0"/>
-              <a:t>Вопросы</a:t>
-            </a:r>
-            <a:r>
-              <a:rPr lang="az-Cyrl-AZ" sz="4000" dirty="0"/>
-              <a:t>?</a:t>
-            </a:r>
-            <a:endParaRPr lang="en-US" sz="4000" dirty="0"/>
-          </a:p>
-        </p:txBody>
-      </p:sp>
       <p:pic>
         <p:nvPicPr>
-          <p:cNvPr id="8" name="Picture 2" descr="http://www.searchengineoptimization.com.sg/wp-content/uploads/2013/12/seo-questions.jpg"/>
+          <p:cNvPr id="3073" name="Picture 1"/>
           <p:cNvPicPr>
-            <a:picLocks noGrp="1" noChangeAspect="1" noChangeArrowheads="1"/>
+            <a:picLocks noChangeAspect="1" noChangeArrowheads="1"/>
           </p:cNvPicPr>
-          <p:nvPr>
-            <p:ph idx="1"/>
-          </p:nvPr>
+          <p:nvPr/>
         </p:nvPicPr>
         <p:blipFill>
-          <a:blip r:embed="rId2" cstate="print">
+          <a:blip r:embed="rId3">
             <a:extLst>
               <a:ext uri="{28A0092B-C50C-407E-A947-70E740481C1C}">
                 <a14:useLocalDpi xmlns:a14="http://schemas.microsoft.com/office/drawing/2010/main" val="0"/>
@@ -8891,8 +9685,691 @@
         </p:blipFill>
         <p:spPr bwMode="auto">
           <a:xfrm>
-            <a:off x="3948854" y="539750"/>
-            <a:ext cx="5486400" cy="3886200"/>
+            <a:off x="0" y="1"/>
+            <a:ext cx="12191999" cy="6867525"/>
+          </a:xfrm>
+          <a:prstGeom prst="rect">
+            <a:avLst/>
+          </a:prstGeom>
+          <a:noFill/>
+          <a:ln>
+            <a:noFill/>
+          </a:ln>
+          <a:effectLst/>
+          <a:extLst>
+            <a:ext uri="{909E8E84-426E-40DD-AFC4-6F175D3DCCD1}">
+              <a14:hiddenFill xmlns:a14="http://schemas.microsoft.com/office/drawing/2010/main">
+                <a:blipFill dpi="0" rotWithShape="0">
+                  <a:blip/>
+                  <a:srcRect/>
+                  <a:stretch>
+                    <a:fillRect/>
+                  </a:stretch>
+                </a:blipFill>
+              </a14:hiddenFill>
+            </a:ext>
+            <a:ext uri="{91240B29-F687-4F45-9708-019B960494DF}">
+              <a14:hiddenLine xmlns:a14="http://schemas.microsoft.com/office/drawing/2010/main" w="9525">
+                <a:solidFill>
+                  <a:srgbClr val="000000"/>
+                </a:solidFill>
+                <a:round/>
+                <a:headEnd/>
+                <a:tailEnd/>
+              </a14:hiddenLine>
+            </a:ext>
+            <a:ext uri="{AF507438-7753-43E0-B8FC-AC1667EBCBE1}">
+              <a14:hiddenEffects xmlns:a14="http://schemas.microsoft.com/office/drawing/2010/main">
+                <a:effectLst>
+                  <a:outerShdw dist="35921" dir="2700000" algn="ctr" rotWithShape="0">
+                    <a:srgbClr val="808080"/>
+                  </a:outerShdw>
+                </a:effectLst>
+              </a14:hiddenEffects>
+            </a:ext>
+          </a:extLst>
+        </p:spPr>
+      </p:pic>
+      <p:sp>
+        <p:nvSpPr>
+          <p:cNvPr id="3076" name="Rectangle 4"/>
+          <p:cNvSpPr>
+            <a:spLocks noChangeArrowheads="1"/>
+          </p:cNvSpPr>
+          <p:nvPr/>
+        </p:nvSpPr>
+        <p:spPr bwMode="auto">
+          <a:xfrm>
+            <a:off x="0" y="-46304"/>
+            <a:ext cx="12177686" cy="251588"/>
+          </a:xfrm>
+          <a:prstGeom prst="rect">
+            <a:avLst/>
+          </a:prstGeom>
+          <a:solidFill>
+            <a:srgbClr val="009BE9"/>
+          </a:solidFill>
+          <a:ln>
+            <a:noFill/>
+          </a:ln>
+          <a:effectLst/>
+          <a:extLst>
+            <a:ext uri="{91240B29-F687-4F45-9708-019B960494DF}">
+              <a14:hiddenLine xmlns:a14="http://schemas.microsoft.com/office/drawing/2010/main" w="9525">
+                <a:solidFill>
+                  <a:srgbClr val="000000"/>
+                </a:solidFill>
+                <a:round/>
+                <a:headEnd/>
+                <a:tailEnd/>
+              </a14:hiddenLine>
+            </a:ext>
+            <a:ext uri="{AF507438-7753-43E0-B8FC-AC1667EBCBE1}">
+              <a14:hiddenEffects xmlns:a14="http://schemas.microsoft.com/office/drawing/2010/main">
+                <a:effectLst>
+                  <a:outerShdw dist="35921" dir="2700000" algn="ctr" rotWithShape="0">
+                    <a:srgbClr val="808080"/>
+                  </a:outerShdw>
+                </a:effectLst>
+              </a14:hiddenEffects>
+            </a:ext>
+          </a:extLst>
+        </p:spPr>
+        <p:txBody>
+          <a:bodyPr wrap="none" anchor="ctr"/>
+          <a:lstStyle/>
+          <a:p>
+            <a:endParaRPr lang="en-US"/>
+          </a:p>
+        </p:txBody>
+      </p:sp>
+      <p:sp>
+        <p:nvSpPr>
+          <p:cNvPr id="3077" name="Rectangle 5"/>
+          <p:cNvSpPr>
+            <a:spLocks noChangeArrowheads="1"/>
+          </p:cNvSpPr>
+          <p:nvPr/>
+        </p:nvSpPr>
+        <p:spPr bwMode="auto">
+          <a:xfrm>
+            <a:off x="0" y="6696075"/>
+            <a:ext cx="12087922" cy="249733"/>
+          </a:xfrm>
+          <a:prstGeom prst="rect">
+            <a:avLst/>
+          </a:prstGeom>
+          <a:solidFill>
+            <a:srgbClr val="009BE9"/>
+          </a:solidFill>
+          <a:ln>
+            <a:noFill/>
+          </a:ln>
+          <a:effectLst/>
+          <a:extLst>
+            <a:ext uri="{91240B29-F687-4F45-9708-019B960494DF}">
+              <a14:hiddenLine xmlns:a14="http://schemas.microsoft.com/office/drawing/2010/main" w="9525">
+                <a:solidFill>
+                  <a:srgbClr val="000000"/>
+                </a:solidFill>
+                <a:round/>
+                <a:headEnd/>
+                <a:tailEnd/>
+              </a14:hiddenLine>
+            </a:ext>
+            <a:ext uri="{AF507438-7753-43E0-B8FC-AC1667EBCBE1}">
+              <a14:hiddenEffects xmlns:a14="http://schemas.microsoft.com/office/drawing/2010/main">
+                <a:effectLst>
+                  <a:outerShdw dist="35921" dir="2700000" algn="ctr" rotWithShape="0">
+                    <a:srgbClr val="808080"/>
+                  </a:outerShdw>
+                </a:effectLst>
+              </a14:hiddenEffects>
+            </a:ext>
+          </a:extLst>
+        </p:spPr>
+        <p:txBody>
+          <a:bodyPr wrap="none" anchor="ctr"/>
+          <a:lstStyle/>
+          <a:p>
+            <a:endParaRPr lang="en-US"/>
+          </a:p>
+        </p:txBody>
+      </p:sp>
+      <p:sp>
+        <p:nvSpPr>
+          <p:cNvPr id="3078" name="Rectangle 6"/>
+          <p:cNvSpPr>
+            <a:spLocks noChangeArrowheads="1"/>
+          </p:cNvSpPr>
+          <p:nvPr/>
+        </p:nvSpPr>
+        <p:spPr bwMode="auto">
+          <a:xfrm>
+            <a:off x="4875" y="26989"/>
+            <a:ext cx="179388" cy="6858000"/>
+          </a:xfrm>
+          <a:prstGeom prst="rect">
+            <a:avLst/>
+          </a:prstGeom>
+          <a:solidFill>
+            <a:srgbClr val="009BE9"/>
+          </a:solidFill>
+          <a:ln>
+            <a:noFill/>
+          </a:ln>
+          <a:effectLst/>
+          <a:extLst>
+            <a:ext uri="{91240B29-F687-4F45-9708-019B960494DF}">
+              <a14:hiddenLine xmlns:a14="http://schemas.microsoft.com/office/drawing/2010/main" w="9525">
+                <a:solidFill>
+                  <a:srgbClr val="000000"/>
+                </a:solidFill>
+                <a:round/>
+                <a:headEnd/>
+                <a:tailEnd/>
+              </a14:hiddenLine>
+            </a:ext>
+            <a:ext uri="{AF507438-7753-43E0-B8FC-AC1667EBCBE1}">
+              <a14:hiddenEffects xmlns:a14="http://schemas.microsoft.com/office/drawing/2010/main">
+                <a:effectLst>
+                  <a:outerShdw dist="35921" dir="2700000" algn="ctr" rotWithShape="0">
+                    <a:srgbClr val="808080"/>
+                  </a:outerShdw>
+                </a:effectLst>
+              </a14:hiddenEffects>
+            </a:ext>
+          </a:extLst>
+        </p:spPr>
+        <p:txBody>
+          <a:bodyPr wrap="none" anchor="ctr"/>
+          <a:lstStyle/>
+          <a:p>
+            <a:endParaRPr lang="en-US"/>
+          </a:p>
+        </p:txBody>
+      </p:sp>
+      <p:sp>
+        <p:nvSpPr>
+          <p:cNvPr id="3079" name="Rectangle 7"/>
+          <p:cNvSpPr>
+            <a:spLocks noChangeArrowheads="1"/>
+          </p:cNvSpPr>
+          <p:nvPr/>
+        </p:nvSpPr>
+        <p:spPr bwMode="auto">
+          <a:xfrm>
+            <a:off x="12010310" y="1"/>
+            <a:ext cx="179388" cy="6884988"/>
+          </a:xfrm>
+          <a:prstGeom prst="rect">
+            <a:avLst/>
+          </a:prstGeom>
+          <a:solidFill>
+            <a:srgbClr val="009BE9"/>
+          </a:solidFill>
+          <a:ln>
+            <a:noFill/>
+          </a:ln>
+          <a:effectLst/>
+          <a:extLst>
+            <a:ext uri="{91240B29-F687-4F45-9708-019B960494DF}">
+              <a14:hiddenLine xmlns:a14="http://schemas.microsoft.com/office/drawing/2010/main" w="9525">
+                <a:solidFill>
+                  <a:srgbClr val="000000"/>
+                </a:solidFill>
+                <a:round/>
+                <a:headEnd/>
+                <a:tailEnd/>
+              </a14:hiddenLine>
+            </a:ext>
+            <a:ext uri="{AF507438-7753-43E0-B8FC-AC1667EBCBE1}">
+              <a14:hiddenEffects xmlns:a14="http://schemas.microsoft.com/office/drawing/2010/main">
+                <a:effectLst>
+                  <a:outerShdw dist="35921" dir="2700000" algn="ctr" rotWithShape="0">
+                    <a:srgbClr val="808080"/>
+                  </a:outerShdw>
+                </a:effectLst>
+              </a14:hiddenEffects>
+            </a:ext>
+          </a:extLst>
+        </p:spPr>
+        <p:txBody>
+          <a:bodyPr wrap="none" anchor="ctr"/>
+          <a:lstStyle/>
+          <a:p>
+            <a:endParaRPr lang="en-US"/>
+          </a:p>
+        </p:txBody>
+      </p:sp>
+      <p:pic>
+        <p:nvPicPr>
+          <p:cNvPr id="3080" name="Picture 8"/>
+          <p:cNvPicPr>
+            <a:picLocks noChangeAspect="1" noChangeArrowheads="1"/>
+          </p:cNvPicPr>
+          <p:nvPr/>
+        </p:nvPicPr>
+        <p:blipFill>
+          <a:blip r:embed="rId4">
+            <a:extLst>
+              <a:ext uri="{28A0092B-C50C-407E-A947-70E740481C1C}">
+                <a14:useLocalDpi xmlns:a14="http://schemas.microsoft.com/office/drawing/2010/main" val="0"/>
+              </a:ext>
+            </a:extLst>
+          </a:blip>
+          <a:srcRect/>
+          <a:stretch>
+            <a:fillRect/>
+          </a:stretch>
+        </p:blipFill>
+        <p:spPr bwMode="auto">
+          <a:xfrm>
+            <a:off x="839659" y="593179"/>
+            <a:ext cx="1428750" cy="1905000"/>
+          </a:xfrm>
+          <a:prstGeom prst="rect">
+            <a:avLst/>
+          </a:prstGeom>
+          <a:noFill/>
+          <a:ln>
+            <a:noFill/>
+          </a:ln>
+          <a:effectLst/>
+          <a:extLst>
+            <a:ext uri="{909E8E84-426E-40DD-AFC4-6F175D3DCCD1}">
+              <a14:hiddenFill xmlns:a14="http://schemas.microsoft.com/office/drawing/2010/main">
+                <a:blipFill dpi="0" rotWithShape="0">
+                  <a:blip/>
+                  <a:srcRect/>
+                  <a:stretch>
+                    <a:fillRect/>
+                  </a:stretch>
+                </a:blipFill>
+              </a14:hiddenFill>
+            </a:ext>
+            <a:ext uri="{91240B29-F687-4F45-9708-019B960494DF}">
+              <a14:hiddenLine xmlns:a14="http://schemas.microsoft.com/office/drawing/2010/main" w="9525">
+                <a:solidFill>
+                  <a:srgbClr val="000000"/>
+                </a:solidFill>
+                <a:round/>
+                <a:headEnd/>
+                <a:tailEnd/>
+              </a14:hiddenLine>
+            </a:ext>
+            <a:ext uri="{AF507438-7753-43E0-B8FC-AC1667EBCBE1}">
+              <a14:hiddenEffects xmlns:a14="http://schemas.microsoft.com/office/drawing/2010/main">
+                <a:effectLst>
+                  <a:outerShdw dist="35921" dir="2700000" algn="ctr" rotWithShape="0">
+                    <a:srgbClr val="808080"/>
+                  </a:outerShdw>
+                </a:effectLst>
+              </a14:hiddenEffects>
+            </a:ext>
+          </a:extLst>
+        </p:spPr>
+      </p:pic>
+      <p:sp>
+        <p:nvSpPr>
+          <p:cNvPr id="11" name="Subtitle 2"/>
+          <p:cNvSpPr txBox="1">
+            <a:spLocks/>
+          </p:cNvSpPr>
+          <p:nvPr/>
+        </p:nvSpPr>
+        <p:spPr>
+          <a:xfrm>
+            <a:off x="373794" y="4032773"/>
+            <a:ext cx="4496049" cy="1348030"/>
+          </a:xfrm>
+          <a:prstGeom prst="rect">
+            <a:avLst/>
+          </a:prstGeom>
+        </p:spPr>
+        <p:txBody>
+          <a:bodyPr>
+            <a:normAutofit fontScale="85000" lnSpcReduction="20000"/>
+          </a:bodyPr>
+          <a:lstStyle>
+            <a:lvl1pPr marL="182880" indent="-182880" algn="l" defTabSz="914400" rtl="0" eaLnBrk="1" latinLnBrk="0" hangingPunct="1">
+              <a:lnSpc>
+                <a:spcPct val="90000"/>
+              </a:lnSpc>
+              <a:spcBef>
+                <a:spcPts val="1200"/>
+              </a:spcBef>
+              <a:buClr>
+                <a:schemeClr val="accent1">
+                  <a:lumMod val="75000"/>
+                </a:schemeClr>
+              </a:buClr>
+              <a:buSzPct val="85000"/>
+              <a:buFont typeface="Wingdings" pitchFamily="2" charset="2"/>
+              <a:buChar char="§"/>
+              <a:defRPr sz="2000" kern="1200">
+                <a:solidFill>
+                  <a:schemeClr val="tx1"/>
+                </a:solidFill>
+                <a:latin typeface="+mn-lt"/>
+                <a:ea typeface="+mn-ea"/>
+                <a:cs typeface="+mn-cs"/>
+              </a:defRPr>
+            </a:lvl1pPr>
+            <a:lvl2pPr marL="457200" indent="-182880" algn="l" defTabSz="914400" rtl="0" eaLnBrk="1" latinLnBrk="0" hangingPunct="1">
+              <a:lnSpc>
+                <a:spcPct val="90000"/>
+              </a:lnSpc>
+              <a:spcBef>
+                <a:spcPts val="400"/>
+              </a:spcBef>
+              <a:spcAft>
+                <a:spcPts val="200"/>
+              </a:spcAft>
+              <a:buClr>
+                <a:schemeClr val="accent1">
+                  <a:lumMod val="75000"/>
+                </a:schemeClr>
+              </a:buClr>
+              <a:buSzPct val="85000"/>
+              <a:buFont typeface="Wingdings" pitchFamily="2" charset="2"/>
+              <a:buChar char="§"/>
+              <a:defRPr sz="1800" kern="1200">
+                <a:solidFill>
+                  <a:schemeClr val="tx1"/>
+                </a:solidFill>
+                <a:latin typeface="+mn-lt"/>
+                <a:ea typeface="+mn-ea"/>
+                <a:cs typeface="+mn-cs"/>
+              </a:defRPr>
+            </a:lvl2pPr>
+            <a:lvl3pPr marL="731520" indent="-182880" algn="l" defTabSz="914400" rtl="0" eaLnBrk="1" latinLnBrk="0" hangingPunct="1">
+              <a:lnSpc>
+                <a:spcPct val="90000"/>
+              </a:lnSpc>
+              <a:spcBef>
+                <a:spcPts val="400"/>
+              </a:spcBef>
+              <a:spcAft>
+                <a:spcPts val="200"/>
+              </a:spcAft>
+              <a:buClr>
+                <a:schemeClr val="accent1">
+                  <a:lumMod val="75000"/>
+                </a:schemeClr>
+              </a:buClr>
+              <a:buSzPct val="85000"/>
+              <a:buFont typeface="Wingdings" pitchFamily="2" charset="2"/>
+              <a:buChar char="§"/>
+              <a:defRPr sz="1600" kern="1200">
+                <a:solidFill>
+                  <a:schemeClr val="tx1"/>
+                </a:solidFill>
+                <a:latin typeface="+mn-lt"/>
+                <a:ea typeface="+mn-ea"/>
+                <a:cs typeface="+mn-cs"/>
+              </a:defRPr>
+            </a:lvl3pPr>
+            <a:lvl4pPr marL="1005840" indent="-182880" algn="l" defTabSz="914400" rtl="0" eaLnBrk="1" latinLnBrk="0" hangingPunct="1">
+              <a:lnSpc>
+                <a:spcPct val="90000"/>
+              </a:lnSpc>
+              <a:spcBef>
+                <a:spcPts val="400"/>
+              </a:spcBef>
+              <a:spcAft>
+                <a:spcPts val="200"/>
+              </a:spcAft>
+              <a:buClr>
+                <a:schemeClr val="accent1">
+                  <a:lumMod val="75000"/>
+                </a:schemeClr>
+              </a:buClr>
+              <a:buSzPct val="85000"/>
+              <a:buFont typeface="Wingdings" pitchFamily="2" charset="2"/>
+              <a:buChar char="§"/>
+              <a:defRPr sz="1600" kern="1200">
+                <a:solidFill>
+                  <a:schemeClr val="tx1"/>
+                </a:solidFill>
+                <a:latin typeface="+mn-lt"/>
+                <a:ea typeface="+mn-ea"/>
+                <a:cs typeface="+mn-cs"/>
+              </a:defRPr>
+            </a:lvl4pPr>
+            <a:lvl5pPr marL="1280160" indent="-182880" algn="l" defTabSz="914400" rtl="0" eaLnBrk="1" latinLnBrk="0" hangingPunct="1">
+              <a:lnSpc>
+                <a:spcPct val="90000"/>
+              </a:lnSpc>
+              <a:spcBef>
+                <a:spcPts val="400"/>
+              </a:spcBef>
+              <a:spcAft>
+                <a:spcPts val="200"/>
+              </a:spcAft>
+              <a:buClr>
+                <a:schemeClr val="accent1">
+                  <a:lumMod val="75000"/>
+                </a:schemeClr>
+              </a:buClr>
+              <a:buSzPct val="85000"/>
+              <a:buFont typeface="Wingdings" pitchFamily="2" charset="2"/>
+              <a:buChar char="§"/>
+              <a:defRPr sz="1600" kern="1200">
+                <a:solidFill>
+                  <a:schemeClr val="tx1"/>
+                </a:solidFill>
+                <a:latin typeface="+mn-lt"/>
+                <a:ea typeface="+mn-ea"/>
+                <a:cs typeface="+mn-cs"/>
+              </a:defRPr>
+            </a:lvl5pPr>
+            <a:lvl6pPr marL="1600000" indent="-228600" algn="l" defTabSz="914400" rtl="0" eaLnBrk="1" latinLnBrk="0" hangingPunct="1">
+              <a:lnSpc>
+                <a:spcPct val="90000"/>
+              </a:lnSpc>
+              <a:spcBef>
+                <a:spcPts val="400"/>
+              </a:spcBef>
+              <a:spcAft>
+                <a:spcPts val="200"/>
+              </a:spcAft>
+              <a:buClr>
+                <a:schemeClr val="accent1">
+                  <a:lumMod val="75000"/>
+                </a:schemeClr>
+              </a:buClr>
+              <a:buSzPct val="85000"/>
+              <a:buFont typeface="Wingdings" pitchFamily="2" charset="2"/>
+              <a:buChar char="§"/>
+              <a:defRPr sz="1600" kern="1200">
+                <a:solidFill>
+                  <a:schemeClr val="tx1"/>
+                </a:solidFill>
+                <a:latin typeface="+mn-lt"/>
+                <a:ea typeface="+mn-ea"/>
+                <a:cs typeface="+mn-cs"/>
+              </a:defRPr>
+            </a:lvl6pPr>
+            <a:lvl7pPr marL="1900000" indent="-228600" algn="l" defTabSz="914400" rtl="0" eaLnBrk="1" latinLnBrk="0" hangingPunct="1">
+              <a:lnSpc>
+                <a:spcPct val="90000"/>
+              </a:lnSpc>
+              <a:spcBef>
+                <a:spcPts val="400"/>
+              </a:spcBef>
+              <a:spcAft>
+                <a:spcPts val="200"/>
+              </a:spcAft>
+              <a:buClr>
+                <a:schemeClr val="accent1">
+                  <a:lumMod val="75000"/>
+                </a:schemeClr>
+              </a:buClr>
+              <a:buSzPct val="85000"/>
+              <a:buFont typeface="Wingdings" pitchFamily="2" charset="2"/>
+              <a:buChar char="§"/>
+              <a:defRPr sz="1600" kern="1200">
+                <a:solidFill>
+                  <a:schemeClr val="tx1"/>
+                </a:solidFill>
+                <a:latin typeface="+mn-lt"/>
+                <a:ea typeface="+mn-ea"/>
+                <a:cs typeface="+mn-cs"/>
+              </a:defRPr>
+            </a:lvl7pPr>
+            <a:lvl8pPr marL="2200000" indent="-228600" algn="l" defTabSz="914400" rtl="0" eaLnBrk="1" latinLnBrk="0" hangingPunct="1">
+              <a:lnSpc>
+                <a:spcPct val="90000"/>
+              </a:lnSpc>
+              <a:spcBef>
+                <a:spcPts val="400"/>
+              </a:spcBef>
+              <a:spcAft>
+                <a:spcPts val="200"/>
+              </a:spcAft>
+              <a:buClr>
+                <a:schemeClr val="accent1">
+                  <a:lumMod val="75000"/>
+                </a:schemeClr>
+              </a:buClr>
+              <a:buSzPct val="85000"/>
+              <a:buFont typeface="Wingdings" pitchFamily="2" charset="2"/>
+              <a:buChar char="§"/>
+              <a:defRPr sz="1600" kern="1200">
+                <a:solidFill>
+                  <a:schemeClr val="tx1"/>
+                </a:solidFill>
+                <a:latin typeface="+mn-lt"/>
+                <a:ea typeface="+mn-ea"/>
+                <a:cs typeface="+mn-cs"/>
+              </a:defRPr>
+            </a:lvl8pPr>
+            <a:lvl9pPr marL="2500000" indent="-228600" algn="l" defTabSz="914400" rtl="0" eaLnBrk="1" latinLnBrk="0" hangingPunct="1">
+              <a:lnSpc>
+                <a:spcPct val="90000"/>
+              </a:lnSpc>
+              <a:spcBef>
+                <a:spcPts val="400"/>
+              </a:spcBef>
+              <a:spcAft>
+                <a:spcPts val="200"/>
+              </a:spcAft>
+              <a:buClr>
+                <a:schemeClr val="accent1">
+                  <a:lumMod val="75000"/>
+                </a:schemeClr>
+              </a:buClr>
+              <a:buSzPct val="85000"/>
+              <a:buFont typeface="Wingdings" pitchFamily="2" charset="2"/>
+              <a:buChar char="§"/>
+              <a:defRPr sz="1600" kern="1200">
+                <a:solidFill>
+                  <a:schemeClr val="tx1"/>
+                </a:solidFill>
+                <a:latin typeface="+mn-lt"/>
+                <a:ea typeface="+mn-ea"/>
+                <a:cs typeface="+mn-cs"/>
+              </a:defRPr>
+            </a:lvl9pPr>
+          </a:lstStyle>
+          <a:p>
+            <a:pPr marL="0" indent="0">
+              <a:buNone/>
+            </a:pPr>
+            <a:r>
+              <a:rPr lang="az-Cyrl-AZ" sz="2400" dirty="0" smtClean="0">
+                <a:cs typeface="+mj-cs"/>
+              </a:rPr>
+              <a:t>Михаил Ярийчук</a:t>
+            </a:r>
+            <a:endParaRPr lang="en-US" sz="2400" dirty="0" smtClean="0">
+              <a:latin typeface="Rockwell" panose="02060603020205020403" pitchFamily="18" charset="0"/>
+              <a:cs typeface="+mj-cs"/>
+            </a:endParaRPr>
+          </a:p>
+          <a:p>
+            <a:pPr marL="0" indent="0">
+              <a:buNone/>
+            </a:pPr>
+            <a:r>
+              <a:rPr lang="en-US" i="1" dirty="0" smtClean="0"/>
+              <a:t>Hibernating Rhinos</a:t>
+            </a:r>
+          </a:p>
+          <a:p>
+            <a:pPr marL="0" indent="0">
+              <a:buNone/>
+            </a:pPr>
+            <a:endParaRPr lang="en-US" dirty="0"/>
+          </a:p>
+          <a:p>
+            <a:pPr marL="0" indent="0">
+              <a:buNone/>
+            </a:pPr>
+            <a:r>
+              <a:rPr lang="en-US" dirty="0"/>
+              <a:t>michael.yarichuk@hibernatingrhinos.com</a:t>
+            </a:r>
+            <a:endParaRPr lang="en-US" dirty="0" smtClean="0"/>
+          </a:p>
+        </p:txBody>
+      </p:sp>
+      <p:pic>
+        <p:nvPicPr>
+          <p:cNvPr id="13" name="Picture 12"/>
+          <p:cNvPicPr>
+            <a:picLocks noChangeAspect="1"/>
+          </p:cNvPicPr>
+          <p:nvPr/>
+        </p:nvPicPr>
+        <p:blipFill>
+          <a:blip r:embed="rId5">
+            <a:extLst>
+              <a:ext uri="{28A0092B-C50C-407E-A947-70E740481C1C}">
+                <a14:useLocalDpi xmlns:a14="http://schemas.microsoft.com/office/drawing/2010/main" val="0"/>
+              </a:ext>
+            </a:extLst>
+          </a:blip>
+          <a:stretch>
+            <a:fillRect/>
+          </a:stretch>
+        </p:blipFill>
+        <p:spPr>
+          <a:xfrm>
+            <a:off x="10383505" y="4425916"/>
+            <a:ext cx="850107" cy="947737"/>
+          </a:xfrm>
+          <a:prstGeom prst="rect">
+            <a:avLst/>
+          </a:prstGeom>
+        </p:spPr>
+      </p:pic>
+      <p:pic>
+        <p:nvPicPr>
+          <p:cNvPr id="2050" name="Picture 2" descr="question.jpg (1800×1275)"/>
+          <p:cNvPicPr>
+            <a:picLocks noChangeAspect="1" noChangeArrowheads="1"/>
+          </p:cNvPicPr>
+          <p:nvPr/>
+        </p:nvPicPr>
+        <p:blipFill>
+          <a:blip r:embed="rId6" cstate="print">
+            <a:extLst>
+              <a:ext uri="{28A0092B-C50C-407E-A947-70E740481C1C}">
+                <a14:useLocalDpi xmlns:a14="http://schemas.microsoft.com/office/drawing/2010/main" val="0"/>
+              </a:ext>
+            </a:extLst>
+          </a:blip>
+          <a:srcRect/>
+          <a:stretch>
+            <a:fillRect/>
+          </a:stretch>
+        </p:blipFill>
+        <p:spPr bwMode="auto">
+          <a:xfrm>
+            <a:off x="5059375" y="1993900"/>
+            <a:ext cx="4771416" cy="3379753"/>
           </a:xfrm>
           <a:prstGeom prst="rect">
             <a:avLst/>
@@ -8909,80 +10386,348 @@
           </a:extLst>
         </p:spPr>
       </p:pic>
-      <p:pic>
-        <p:nvPicPr>
-          <p:cNvPr id="9" name="Content Placeholder 5"/>
-          <p:cNvPicPr>
-            <a:picLocks noChangeAspect="1"/>
-          </p:cNvPicPr>
+      <p:sp>
+        <p:nvSpPr>
+          <p:cNvPr id="14" name="Text Placeholder 5"/>
+          <p:cNvSpPr txBox="1">
+            <a:spLocks/>
+          </p:cNvSpPr>
           <p:nvPr/>
-        </p:nvPicPr>
-        <p:blipFill>
-          <a:blip r:embed="rId3" cstate="print">
-            <a:extLst>
-              <a:ext uri="{28A0092B-C50C-407E-A947-70E740481C1C}">
-                <a14:useLocalDpi xmlns:a14="http://schemas.microsoft.com/office/drawing/2010/main" val="0"/>
-              </a:ext>
-            </a:extLst>
-          </a:blip>
-          <a:stretch>
-            <a:fillRect/>
-          </a:stretch>
-        </p:blipFill>
+        </p:nvSpPr>
         <p:spPr>
           <a:xfrm>
-            <a:off x="9218790" y="5185316"/>
-            <a:ext cx="2854321" cy="1532519"/>
+            <a:off x="2955449" y="726768"/>
+            <a:ext cx="9052560" cy="1066800"/>
           </a:xfrm>
           <a:prstGeom prst="rect">
             <a:avLst/>
           </a:prstGeom>
         </p:spPr>
-      </p:pic>
-      <p:pic>
-        <p:nvPicPr>
-          <p:cNvPr id="10" name="Picture 9"/>
-          <p:cNvPicPr>
-            <a:picLocks noChangeAspect="1"/>
-          </p:cNvPicPr>
+        <p:txBody>
+          <a:bodyPr>
+            <a:normAutofit/>
+          </a:bodyPr>
+          <a:lstStyle>
+            <a:lvl1pPr marL="182880" indent="-182880" algn="l" defTabSz="914400" rtl="0" eaLnBrk="1" latinLnBrk="0" hangingPunct="1">
+              <a:lnSpc>
+                <a:spcPct val="90000"/>
+              </a:lnSpc>
+              <a:spcBef>
+                <a:spcPts val="1200"/>
+              </a:spcBef>
+              <a:buClr>
+                <a:schemeClr val="accent1">
+                  <a:lumMod val="75000"/>
+                </a:schemeClr>
+              </a:buClr>
+              <a:buSzPct val="85000"/>
+              <a:buFont typeface="Wingdings" pitchFamily="2" charset="2"/>
+              <a:buChar char="§"/>
+              <a:defRPr sz="2000" kern="1200">
+                <a:solidFill>
+                  <a:schemeClr val="tx1"/>
+                </a:solidFill>
+                <a:latin typeface="+mn-lt"/>
+                <a:ea typeface="+mn-ea"/>
+                <a:cs typeface="+mn-cs"/>
+              </a:defRPr>
+            </a:lvl1pPr>
+            <a:lvl2pPr marL="457200" indent="-182880" algn="l" defTabSz="914400" rtl="0" eaLnBrk="1" latinLnBrk="0" hangingPunct="1">
+              <a:lnSpc>
+                <a:spcPct val="90000"/>
+              </a:lnSpc>
+              <a:spcBef>
+                <a:spcPts val="400"/>
+              </a:spcBef>
+              <a:spcAft>
+                <a:spcPts val="200"/>
+              </a:spcAft>
+              <a:buClr>
+                <a:schemeClr val="accent1">
+                  <a:lumMod val="75000"/>
+                </a:schemeClr>
+              </a:buClr>
+              <a:buSzPct val="85000"/>
+              <a:buFont typeface="Wingdings" pitchFamily="2" charset="2"/>
+              <a:buChar char="§"/>
+              <a:defRPr sz="1800" kern="1200">
+                <a:solidFill>
+                  <a:schemeClr val="tx1"/>
+                </a:solidFill>
+                <a:latin typeface="+mn-lt"/>
+                <a:ea typeface="+mn-ea"/>
+                <a:cs typeface="+mn-cs"/>
+              </a:defRPr>
+            </a:lvl2pPr>
+            <a:lvl3pPr marL="731520" indent="-182880" algn="l" defTabSz="914400" rtl="0" eaLnBrk="1" latinLnBrk="0" hangingPunct="1">
+              <a:lnSpc>
+                <a:spcPct val="90000"/>
+              </a:lnSpc>
+              <a:spcBef>
+                <a:spcPts val="400"/>
+              </a:spcBef>
+              <a:spcAft>
+                <a:spcPts val="200"/>
+              </a:spcAft>
+              <a:buClr>
+                <a:schemeClr val="accent1">
+                  <a:lumMod val="75000"/>
+                </a:schemeClr>
+              </a:buClr>
+              <a:buSzPct val="85000"/>
+              <a:buFont typeface="Wingdings" pitchFamily="2" charset="2"/>
+              <a:buChar char="§"/>
+              <a:defRPr sz="1600" kern="1200">
+                <a:solidFill>
+                  <a:schemeClr val="tx1"/>
+                </a:solidFill>
+                <a:latin typeface="+mn-lt"/>
+                <a:ea typeface="+mn-ea"/>
+                <a:cs typeface="+mn-cs"/>
+              </a:defRPr>
+            </a:lvl3pPr>
+            <a:lvl4pPr marL="1005840" indent="-182880" algn="l" defTabSz="914400" rtl="0" eaLnBrk="1" latinLnBrk="0" hangingPunct="1">
+              <a:lnSpc>
+                <a:spcPct val="90000"/>
+              </a:lnSpc>
+              <a:spcBef>
+                <a:spcPts val="400"/>
+              </a:spcBef>
+              <a:spcAft>
+                <a:spcPts val="200"/>
+              </a:spcAft>
+              <a:buClr>
+                <a:schemeClr val="accent1">
+                  <a:lumMod val="75000"/>
+                </a:schemeClr>
+              </a:buClr>
+              <a:buSzPct val="85000"/>
+              <a:buFont typeface="Wingdings" pitchFamily="2" charset="2"/>
+              <a:buChar char="§"/>
+              <a:defRPr sz="1600" kern="1200">
+                <a:solidFill>
+                  <a:schemeClr val="tx1"/>
+                </a:solidFill>
+                <a:latin typeface="+mn-lt"/>
+                <a:ea typeface="+mn-ea"/>
+                <a:cs typeface="+mn-cs"/>
+              </a:defRPr>
+            </a:lvl4pPr>
+            <a:lvl5pPr marL="1280160" indent="-182880" algn="l" defTabSz="914400" rtl="0" eaLnBrk="1" latinLnBrk="0" hangingPunct="1">
+              <a:lnSpc>
+                <a:spcPct val="90000"/>
+              </a:lnSpc>
+              <a:spcBef>
+                <a:spcPts val="400"/>
+              </a:spcBef>
+              <a:spcAft>
+                <a:spcPts val="200"/>
+              </a:spcAft>
+              <a:buClr>
+                <a:schemeClr val="accent1">
+                  <a:lumMod val="75000"/>
+                </a:schemeClr>
+              </a:buClr>
+              <a:buSzPct val="85000"/>
+              <a:buFont typeface="Wingdings" pitchFamily="2" charset="2"/>
+              <a:buChar char="§"/>
+              <a:defRPr sz="1600" kern="1200">
+                <a:solidFill>
+                  <a:schemeClr val="tx1"/>
+                </a:solidFill>
+                <a:latin typeface="+mn-lt"/>
+                <a:ea typeface="+mn-ea"/>
+                <a:cs typeface="+mn-cs"/>
+              </a:defRPr>
+            </a:lvl5pPr>
+            <a:lvl6pPr marL="1600000" indent="-228600" algn="l" defTabSz="914400" rtl="0" eaLnBrk="1" latinLnBrk="0" hangingPunct="1">
+              <a:lnSpc>
+                <a:spcPct val="90000"/>
+              </a:lnSpc>
+              <a:spcBef>
+                <a:spcPts val="400"/>
+              </a:spcBef>
+              <a:spcAft>
+                <a:spcPts val="200"/>
+              </a:spcAft>
+              <a:buClr>
+                <a:schemeClr val="accent1">
+                  <a:lumMod val="75000"/>
+                </a:schemeClr>
+              </a:buClr>
+              <a:buSzPct val="85000"/>
+              <a:buFont typeface="Wingdings" pitchFamily="2" charset="2"/>
+              <a:buChar char="§"/>
+              <a:defRPr sz="1600" kern="1200">
+                <a:solidFill>
+                  <a:schemeClr val="tx1"/>
+                </a:solidFill>
+                <a:latin typeface="+mn-lt"/>
+                <a:ea typeface="+mn-ea"/>
+                <a:cs typeface="+mn-cs"/>
+              </a:defRPr>
+            </a:lvl6pPr>
+            <a:lvl7pPr marL="1900000" indent="-228600" algn="l" defTabSz="914400" rtl="0" eaLnBrk="1" latinLnBrk="0" hangingPunct="1">
+              <a:lnSpc>
+                <a:spcPct val="90000"/>
+              </a:lnSpc>
+              <a:spcBef>
+                <a:spcPts val="400"/>
+              </a:spcBef>
+              <a:spcAft>
+                <a:spcPts val="200"/>
+              </a:spcAft>
+              <a:buClr>
+                <a:schemeClr val="accent1">
+                  <a:lumMod val="75000"/>
+                </a:schemeClr>
+              </a:buClr>
+              <a:buSzPct val="85000"/>
+              <a:buFont typeface="Wingdings" pitchFamily="2" charset="2"/>
+              <a:buChar char="§"/>
+              <a:defRPr sz="1600" kern="1200">
+                <a:solidFill>
+                  <a:schemeClr val="tx1"/>
+                </a:solidFill>
+                <a:latin typeface="+mn-lt"/>
+                <a:ea typeface="+mn-ea"/>
+                <a:cs typeface="+mn-cs"/>
+              </a:defRPr>
+            </a:lvl7pPr>
+            <a:lvl8pPr marL="2200000" indent="-228600" algn="l" defTabSz="914400" rtl="0" eaLnBrk="1" latinLnBrk="0" hangingPunct="1">
+              <a:lnSpc>
+                <a:spcPct val="90000"/>
+              </a:lnSpc>
+              <a:spcBef>
+                <a:spcPts val="400"/>
+              </a:spcBef>
+              <a:spcAft>
+                <a:spcPts val="200"/>
+              </a:spcAft>
+              <a:buClr>
+                <a:schemeClr val="accent1">
+                  <a:lumMod val="75000"/>
+                </a:schemeClr>
+              </a:buClr>
+              <a:buSzPct val="85000"/>
+              <a:buFont typeface="Wingdings" pitchFamily="2" charset="2"/>
+              <a:buChar char="§"/>
+              <a:defRPr sz="1600" kern="1200">
+                <a:solidFill>
+                  <a:schemeClr val="tx1"/>
+                </a:solidFill>
+                <a:latin typeface="+mn-lt"/>
+                <a:ea typeface="+mn-ea"/>
+                <a:cs typeface="+mn-cs"/>
+              </a:defRPr>
+            </a:lvl8pPr>
+            <a:lvl9pPr marL="2500000" indent="-228600" algn="l" defTabSz="914400" rtl="0" eaLnBrk="1" latinLnBrk="0" hangingPunct="1">
+              <a:lnSpc>
+                <a:spcPct val="90000"/>
+              </a:lnSpc>
+              <a:spcBef>
+                <a:spcPts val="400"/>
+              </a:spcBef>
+              <a:spcAft>
+                <a:spcPts val="200"/>
+              </a:spcAft>
+              <a:buClr>
+                <a:schemeClr val="accent1">
+                  <a:lumMod val="75000"/>
+                </a:schemeClr>
+              </a:buClr>
+              <a:buSzPct val="85000"/>
+              <a:buFont typeface="Wingdings" pitchFamily="2" charset="2"/>
+              <a:buChar char="§"/>
+              <a:defRPr sz="1600" kern="1200">
+                <a:solidFill>
+                  <a:schemeClr val="tx1"/>
+                </a:solidFill>
+                <a:latin typeface="+mn-lt"/>
+                <a:ea typeface="+mn-ea"/>
+                <a:cs typeface="+mn-cs"/>
+              </a:defRPr>
+            </a:lvl9pPr>
+          </a:lstStyle>
+          <a:p>
+            <a:pPr marL="0" indent="0">
+              <a:buNone/>
+            </a:pPr>
+            <a:r>
+              <a:rPr lang="az-Cyrl-AZ" sz="5400" dirty="0" smtClean="0"/>
+              <a:t>Вопросы</a:t>
+            </a:r>
+            <a:r>
+              <a:rPr lang="az-Cyrl-AZ" sz="4000" dirty="0" smtClean="0"/>
+              <a:t>?</a:t>
+            </a:r>
+            <a:endParaRPr lang="en-US" sz="4000" dirty="0"/>
+          </a:p>
+        </p:txBody>
+      </p:sp>
+      <p:sp>
+        <p:nvSpPr>
+          <p:cNvPr id="2" name="Rectangle 1"/>
+          <p:cNvSpPr/>
           <p:nvPr/>
-        </p:nvPicPr>
-        <p:blipFill>
-          <a:blip r:embed="rId4">
-            <a:extLst>
-              <a:ext uri="{28A0092B-C50C-407E-A947-70E740481C1C}">
-                <a14:useLocalDpi xmlns:a14="http://schemas.microsoft.com/office/drawing/2010/main" val="0"/>
-              </a:ext>
-            </a:extLst>
-          </a:blip>
-          <a:stretch>
-            <a:fillRect/>
-          </a:stretch>
-        </p:blipFill>
+        </p:nvSpPr>
         <p:spPr>
           <a:xfrm>
-            <a:off x="1017586" y="2425700"/>
-            <a:ext cx="850107" cy="947737"/>
+            <a:off x="7391400" y="5492773"/>
+            <a:ext cx="4575222" cy="646331"/>
           </a:xfrm>
           <a:prstGeom prst="rect">
             <a:avLst/>
           </a:prstGeom>
         </p:spPr>
-      </p:pic>
+        <p:txBody>
+          <a:bodyPr wrap="square">
+            <a:spAutoFit/>
+          </a:bodyPr>
+          <a:lstStyle/>
+          <a:p>
+            <a:r>
+              <a:rPr lang="en-US" dirty="0"/>
+              <a:t>http://www.eyeflow.com/12-questions-to-ask-a-prospective-seo-consultant/</a:t>
+            </a:r>
+          </a:p>
+        </p:txBody>
+      </p:sp>
     </p:spTree>
     <p:extLst>
       <p:ext uri="{BB962C8B-B14F-4D97-AF65-F5344CB8AC3E}">
-        <p14:creationId xmlns:p14="http://schemas.microsoft.com/office/powerpoint/2010/main" val="3765589847"/>
+        <p14:creationId xmlns:p14="http://schemas.microsoft.com/office/powerpoint/2010/main" val="2990719169"/>
       </p:ext>
     </p:extLst>
   </p:cSld>
   <p:clrMapOvr>
     <a:masterClrMapping/>
   </p:clrMapOvr>
+  <p:transition spd="med"/>
   <p:timing>
     <p:tnLst>
       <p:par>
-        <p:cTn id="1" dur="indefinite" restart="never" nodeType="tmRoot"/>
+        <p:cTn id="1" dur="indefinite" restart="never" nodeType="tmRoot">
+          <p:childTnLst>
+            <p:seq concurrent="1" nextAc="seek">
+              <p:cTn id="2" dur="indefinite" nodeType="mainSeq"/>
+              <p:prevCondLst>
+                <p:cond evt="onPrev" delay="0">
+                  <p:tgtEl>
+                    <p:sldTgt/>
+                  </p:tgtEl>
+                </p:cond>
+              </p:prevCondLst>
+              <p:nextCondLst>
+                <p:cond evt="onNext" delay="0">
+                  <p:tgtEl>
+                    <p:sldTgt/>
+                  </p:tgtEl>
+                </p:cond>
+              </p:nextCondLst>
+            </p:seq>
+          </p:childTnLst>
+        </p:cTn>
       </p:par>
     </p:tnLst>
   </p:timing>

</xml_diff>